<commit_message>
update sprint 5 ppt
</commit_message>
<xml_diff>
--- a/docs/Sprint 5 report/Sprint 5 presentation.pptx
+++ b/docs/Sprint 5 report/Sprint 5 presentation.pptx
@@ -38,16 +38,6 @@
     <p:sldId id="283" r:id="rId33"/>
     <p:sldId id="284" r:id="rId34"/>
     <p:sldId id="285" r:id="rId35"/>
-    <p:sldId id="286" r:id="rId36"/>
-    <p:sldId id="287" r:id="rId37"/>
-    <p:sldId id="288" r:id="rId38"/>
-    <p:sldId id="289" r:id="rId39"/>
-    <p:sldId id="290" r:id="rId40"/>
-    <p:sldId id="291" r:id="rId41"/>
-    <p:sldId id="292" r:id="rId42"/>
-    <p:sldId id="293" r:id="rId43"/>
-    <p:sldId id="294" r:id="rId44"/>
-    <p:sldId id="295" r:id="rId45"/>
   </p:sldIdLst>
   <p:sldSz cy="5143500" cx="9144000"/>
   <p:notesSz cx="6858000" cy="9144000"/>
@@ -1734,7 +1724,7 @@
       </p:grpSpPr>
       <p:sp>
         <p:nvSpPr>
-          <p:cNvPr id="161" name="Google Shape;161;g11193b24fb4_0_42:notes"/>
+          <p:cNvPr id="161" name="Google Shape;161;g11193b24fb4_0_47:notes"/>
           <p:cNvSpPr/>
           <p:nvPr>
             <p:ph idx="2" type="sldImg"/>
@@ -1769,7 +1759,7 @@
       </p:sp>
       <p:sp>
         <p:nvSpPr>
-          <p:cNvPr id="162" name="Google Shape;162;g11193b24fb4_0_42:notes"/>
+          <p:cNvPr id="162" name="Google Shape;162;g11193b24fb4_0_47:notes"/>
           <p:cNvSpPr txBox="1"/>
           <p:nvPr>
             <p:ph idx="1" type="body"/>
@@ -1932,7 +1922,7 @@
       </p:grpSpPr>
       <p:sp>
         <p:nvSpPr>
-          <p:cNvPr id="166" name="Google Shape;166;g111b5217d00_0_110:notes"/>
+          <p:cNvPr id="166" name="Google Shape;166;g11dfe98ce93_0_68:notes"/>
           <p:cNvSpPr/>
           <p:nvPr>
             <p:ph idx="2" type="sldImg"/>
@@ -1967,7 +1957,7 @@
       </p:sp>
       <p:sp>
         <p:nvSpPr>
-          <p:cNvPr id="167" name="Google Shape;167;g111b5217d00_0_110:notes"/>
+          <p:cNvPr id="167" name="Google Shape;167;g11dfe98ce93_0_68:notes"/>
           <p:cNvSpPr txBox="1"/>
           <p:nvPr>
             <p:ph idx="1" type="body"/>
@@ -2017,7 +2007,7 @@
   <p:cSld>
     <p:spTree>
       <p:nvGrpSpPr>
-        <p:cNvPr id="170" name="Shape 170"/>
+        <p:cNvPr id="171" name="Shape 171"/>
         <p:cNvGrpSpPr/>
         <p:nvPr/>
       </p:nvGrpSpPr>
@@ -2031,7 +2021,7 @@
       </p:grpSpPr>
       <p:sp>
         <p:nvSpPr>
-          <p:cNvPr id="171" name="Google Shape;171;g11193b24fb4_0_47:notes"/>
+          <p:cNvPr id="172" name="Google Shape;172;g111b5217d00_0_187:notes"/>
           <p:cNvSpPr/>
           <p:nvPr>
             <p:ph idx="2" type="sldImg"/>
@@ -2066,7 +2056,7 @@
       </p:sp>
       <p:sp>
         <p:nvSpPr>
-          <p:cNvPr id="172" name="Google Shape;172;g11193b24fb4_0_47:notes"/>
+          <p:cNvPr id="173" name="Google Shape;173;g111b5217d00_0_187:notes"/>
           <p:cNvSpPr txBox="1"/>
           <p:nvPr>
             <p:ph idx="1" type="body"/>
@@ -2116,7 +2106,7 @@
   <p:cSld>
     <p:spTree>
       <p:nvGrpSpPr>
-        <p:cNvPr id="175" name="Shape 175"/>
+        <p:cNvPr id="178" name="Shape 178"/>
         <p:cNvGrpSpPr/>
         <p:nvPr/>
       </p:nvGrpSpPr>
@@ -2130,7 +2120,7 @@
       </p:grpSpPr>
       <p:sp>
         <p:nvSpPr>
-          <p:cNvPr id="176" name="Google Shape;176;g11dfe98ce93_0_68:notes"/>
+          <p:cNvPr id="179" name="Google Shape;179;g11193b24fb4_0_52:notes"/>
           <p:cNvSpPr/>
           <p:nvPr>
             <p:ph idx="2" type="sldImg"/>
@@ -2165,7 +2155,7 @@
       </p:sp>
       <p:sp>
         <p:nvSpPr>
-          <p:cNvPr id="177" name="Google Shape;177;g11dfe98ce93_0_68:notes"/>
+          <p:cNvPr id="180" name="Google Shape;180;g11193b24fb4_0_52:notes"/>
           <p:cNvSpPr txBox="1"/>
           <p:nvPr>
             <p:ph idx="1" type="body"/>
@@ -2215,7 +2205,7 @@
   <p:cSld>
     <p:spTree>
       <p:nvGrpSpPr>
-        <p:cNvPr id="181" name="Shape 181"/>
+        <p:cNvPr id="183" name="Shape 183"/>
         <p:cNvGrpSpPr/>
         <p:nvPr/>
       </p:nvGrpSpPr>
@@ -2229,7 +2219,7 @@
       </p:grpSpPr>
       <p:sp>
         <p:nvSpPr>
-          <p:cNvPr id="182" name="Google Shape;182;g1236e4dbf69_0_12:notes"/>
+          <p:cNvPr id="184" name="Google Shape;184;g111b5217d00_0_172:notes"/>
           <p:cNvSpPr/>
           <p:nvPr>
             <p:ph idx="2" type="sldImg"/>
@@ -2264,7 +2254,7 @@
       </p:sp>
       <p:sp>
         <p:nvSpPr>
-          <p:cNvPr id="183" name="Google Shape;183;g1236e4dbf69_0_12:notes"/>
+          <p:cNvPr id="185" name="Google Shape;185;g111b5217d00_0_172:notes"/>
           <p:cNvSpPr txBox="1"/>
           <p:nvPr>
             <p:ph idx="1" type="body"/>
@@ -2314,7 +2304,7 @@
   <p:cSld>
     <p:spTree>
       <p:nvGrpSpPr>
-        <p:cNvPr id="187" name="Shape 187"/>
+        <p:cNvPr id="189" name="Shape 189"/>
         <p:cNvGrpSpPr/>
         <p:nvPr/>
       </p:nvGrpSpPr>
@@ -2328,7 +2318,7 @@
       </p:grpSpPr>
       <p:sp>
         <p:nvSpPr>
-          <p:cNvPr id="188" name="Google Shape;188;g1236e4dbf69_0_17:notes"/>
+          <p:cNvPr id="190" name="Google Shape;190;g111b5217d00_0_207:notes"/>
           <p:cNvSpPr/>
           <p:nvPr>
             <p:ph idx="2" type="sldImg"/>
@@ -2363,7 +2353,7 @@
       </p:sp>
       <p:sp>
         <p:nvSpPr>
-          <p:cNvPr id="189" name="Google Shape;189;g1236e4dbf69_0_17:notes"/>
+          <p:cNvPr id="191" name="Google Shape;191;g111b5217d00_0_207:notes"/>
           <p:cNvSpPr txBox="1"/>
           <p:nvPr>
             <p:ph idx="1" type="body"/>
@@ -2413,7 +2403,7 @@
   <p:cSld>
     <p:spTree>
       <p:nvGrpSpPr>
-        <p:cNvPr id="193" name="Shape 193"/>
+        <p:cNvPr id="196" name="Shape 196"/>
         <p:cNvGrpSpPr/>
         <p:nvPr/>
       </p:nvGrpSpPr>
@@ -2427,7 +2417,7 @@
       </p:grpSpPr>
       <p:sp>
         <p:nvSpPr>
-          <p:cNvPr id="194" name="Google Shape;194;g1236e4dbf69_0_22:notes"/>
+          <p:cNvPr id="197" name="Google Shape;197;g111b5217d00_0_202:notes"/>
           <p:cNvSpPr/>
           <p:nvPr>
             <p:ph idx="2" type="sldImg"/>
@@ -2462,7 +2452,7 @@
       </p:sp>
       <p:sp>
         <p:nvSpPr>
-          <p:cNvPr id="195" name="Google Shape;195;g1236e4dbf69_0_22:notes"/>
+          <p:cNvPr id="198" name="Google Shape;198;g111b5217d00_0_202:notes"/>
           <p:cNvSpPr txBox="1"/>
           <p:nvPr>
             <p:ph idx="1" type="body"/>
@@ -2512,7 +2502,7 @@
   <p:cSld>
     <p:spTree>
       <p:nvGrpSpPr>
-        <p:cNvPr id="199" name="Shape 199"/>
+        <p:cNvPr id="203" name="Shape 203"/>
         <p:cNvGrpSpPr/>
         <p:nvPr/>
       </p:nvGrpSpPr>
@@ -2526,7 +2516,7 @@
       </p:grpSpPr>
       <p:sp>
         <p:nvSpPr>
-          <p:cNvPr id="200" name="Google Shape;200;g1236e4dbf69_0_27:notes"/>
+          <p:cNvPr id="204" name="Google Shape;204;g111b5217d00_0_197:notes"/>
           <p:cNvSpPr/>
           <p:nvPr>
             <p:ph idx="2" type="sldImg"/>
@@ -2561,7 +2551,7 @@
       </p:sp>
       <p:sp>
         <p:nvSpPr>
-          <p:cNvPr id="201" name="Google Shape;201;g1236e4dbf69_0_27:notes"/>
+          <p:cNvPr id="205" name="Google Shape;205;g111b5217d00_0_197:notes"/>
           <p:cNvSpPr txBox="1"/>
           <p:nvPr>
             <p:ph idx="1" type="body"/>
@@ -2611,7 +2601,7 @@
   <p:cSld>
     <p:spTree>
       <p:nvGrpSpPr>
-        <p:cNvPr id="205" name="Shape 205"/>
+        <p:cNvPr id="209" name="Shape 209"/>
         <p:cNvGrpSpPr/>
         <p:nvPr/>
       </p:nvGrpSpPr>
@@ -2625,7 +2615,7 @@
       </p:grpSpPr>
       <p:sp>
         <p:nvSpPr>
-          <p:cNvPr id="206" name="Google Shape;206;g1236e4dbf69_0_32:notes"/>
+          <p:cNvPr id="210" name="Google Shape;210;g111b5217d00_0_219:notes"/>
           <p:cNvSpPr/>
           <p:nvPr>
             <p:ph idx="2" type="sldImg"/>
@@ -2660,7 +2650,7 @@
       </p:sp>
       <p:sp>
         <p:nvSpPr>
-          <p:cNvPr id="207" name="Google Shape;207;g1236e4dbf69_0_32:notes"/>
+          <p:cNvPr id="211" name="Google Shape;211;g111b5217d00_0_219:notes"/>
           <p:cNvSpPr txBox="1"/>
           <p:nvPr>
             <p:ph idx="1" type="body"/>
@@ -2710,7 +2700,7 @@
   <p:cSld>
     <p:spTree>
       <p:nvGrpSpPr>
-        <p:cNvPr id="211" name="Shape 211"/>
+        <p:cNvPr id="215" name="Shape 215"/>
         <p:cNvGrpSpPr/>
         <p:nvPr/>
       </p:nvGrpSpPr>
@@ -2724,7 +2714,7 @@
       </p:grpSpPr>
       <p:sp>
         <p:nvSpPr>
-          <p:cNvPr id="212" name="Google Shape;212;g111b5217d00_0_187:notes"/>
+          <p:cNvPr id="216" name="Google Shape;216;g111b5217d00_0_224:notes"/>
           <p:cNvSpPr/>
           <p:nvPr>
             <p:ph idx="2" type="sldImg"/>
@@ -2759,7 +2749,7 @@
       </p:sp>
       <p:sp>
         <p:nvSpPr>
-          <p:cNvPr id="213" name="Google Shape;213;g111b5217d00_0_187:notes"/>
+          <p:cNvPr id="217" name="Google Shape;217;g111b5217d00_0_224:notes"/>
           <p:cNvSpPr txBox="1"/>
           <p:nvPr>
             <p:ph idx="1" type="body"/>
@@ -2809,7 +2799,7 @@
   <p:cSld>
     <p:spTree>
       <p:nvGrpSpPr>
-        <p:cNvPr id="218" name="Shape 218"/>
+        <p:cNvPr id="221" name="Shape 221"/>
         <p:cNvGrpSpPr/>
         <p:nvPr/>
       </p:nvGrpSpPr>
@@ -2823,7 +2813,7 @@
       </p:grpSpPr>
       <p:sp>
         <p:nvSpPr>
-          <p:cNvPr id="219" name="Google Shape;219;g11193b24fb4_0_52:notes"/>
+          <p:cNvPr id="222" name="Google Shape;222;g11193b24fb4_0_57:notes"/>
           <p:cNvSpPr/>
           <p:nvPr>
             <p:ph idx="2" type="sldImg"/>
@@ -2858,7 +2848,7 @@
       </p:sp>
       <p:sp>
         <p:nvSpPr>
-          <p:cNvPr id="220" name="Google Shape;220;g11193b24fb4_0_52:notes"/>
+          <p:cNvPr id="223" name="Google Shape;223;g11193b24fb4_0_57:notes"/>
           <p:cNvSpPr txBox="1"/>
           <p:nvPr>
             <p:ph idx="1" type="body"/>
@@ -3007,7 +2997,7 @@
   <p:cSld>
     <p:spTree>
       <p:nvGrpSpPr>
-        <p:cNvPr id="223" name="Shape 223"/>
+        <p:cNvPr id="226" name="Shape 226"/>
         <p:cNvGrpSpPr/>
         <p:nvPr/>
       </p:nvGrpSpPr>
@@ -3021,7 +3011,7 @@
       </p:grpSpPr>
       <p:sp>
         <p:nvSpPr>
-          <p:cNvPr id="224" name="Google Shape;224;g111b5217d00_0_172:notes"/>
+          <p:cNvPr id="227" name="Google Shape;227;g11193b24fb4_0_67:notes"/>
           <p:cNvSpPr/>
           <p:nvPr>
             <p:ph idx="2" type="sldImg"/>
@@ -3056,898 +3046,7 @@
       </p:sp>
       <p:sp>
         <p:nvSpPr>
-          <p:cNvPr id="225" name="Google Shape;225;g111b5217d00_0_172:notes"/>
-          <p:cNvSpPr txBox="1"/>
-          <p:nvPr>
-            <p:ph idx="1" type="body"/>
-          </p:nvPr>
-        </p:nvSpPr>
-        <p:spPr>
-          <a:xfrm>
-            <a:off x="685800" y="4343400"/>
-            <a:ext cx="5486400" cy="4114800"/>
-          </a:xfrm>
-          <a:prstGeom prst="rect">
-            <a:avLst/>
-          </a:prstGeom>
-        </p:spPr>
-        <p:txBody>
-          <a:bodyPr anchorCtr="0" anchor="t" bIns="91425" lIns="91425" spcFirstLastPara="1" rIns="91425" wrap="square" tIns="91425">
-            <a:noAutofit/>
-          </a:bodyPr>
-          <a:lstStyle/>
-          <a:p>
-            <a:pPr indent="0" lvl="0" marL="0" rtl="0" algn="l">
-              <a:spcBef>
-                <a:spcPts val="0"/>
-              </a:spcBef>
-              <a:spcAft>
-                <a:spcPts val="0"/>
-              </a:spcAft>
-              <a:buNone/>
-            </a:pPr>
-            <a:r>
-              <a:t/>
-            </a:r>
-            <a:endParaRPr/>
-          </a:p>
-        </p:txBody>
-      </p:sp>
-    </p:spTree>
-  </p:cSld>
-  <p:clrMapOvr>
-    <a:masterClrMapping/>
-  </p:clrMapOvr>
-</p:notes>
-</file>
-
-<file path=ppt/notesSlides/notesSlide31.xml><?xml version="1.0" encoding="utf-8"?>
-<p:notes xmlns:a="http://schemas.openxmlformats.org/drawingml/2006/main" xmlns:r="http://schemas.openxmlformats.org/officeDocument/2006/relationships" xmlns:mc="http://schemas.openxmlformats.org/markup-compatibility/2006" xmlns:mv="urn:schemas-microsoft-com:mac:vml" xmlns:p="http://schemas.openxmlformats.org/presentationml/2006/main" xmlns:c="http://schemas.openxmlformats.org/drawingml/2006/chart" xmlns:dgm="http://schemas.openxmlformats.org/drawingml/2006/diagram" xmlns:o="urn:schemas-microsoft-com:office:office" xmlns:v="urn:schemas-microsoft-com:vml" xmlns:pvml="urn:schemas-microsoft-com:office:powerpoint" xmlns:com="http://schemas.openxmlformats.org/drawingml/2006/compatibility" xmlns:p14="http://schemas.microsoft.com/office/powerpoint/2010/main" xmlns:p15="http://schemas.microsoft.com/office/powerpoint/2012/main" xmlns:ahyp="http://schemas.microsoft.com/office/drawing/2018/hyperlinkcolor" showMasterPhAnim="0" showMasterSp="0">
-  <p:cSld>
-    <p:spTree>
-      <p:nvGrpSpPr>
-        <p:cNvPr id="229" name="Shape 229"/>
-        <p:cNvGrpSpPr/>
-        <p:nvPr/>
-      </p:nvGrpSpPr>
-      <p:grpSpPr>
-        <a:xfrm>
-          <a:off x="0" y="0"/>
-          <a:ext cx="0" cy="0"/>
-          <a:chOff x="0" y="0"/>
-          <a:chExt cx="0" cy="0"/>
-        </a:xfrm>
-      </p:grpSpPr>
-      <p:sp>
-        <p:nvSpPr>
-          <p:cNvPr id="230" name="Google Shape;230;g111b5217d00_0_207:notes"/>
-          <p:cNvSpPr/>
-          <p:nvPr>
-            <p:ph idx="2" type="sldImg"/>
-          </p:nvPr>
-        </p:nvSpPr>
-        <p:spPr>
-          <a:xfrm>
-            <a:off x="381300" y="685800"/>
-            <a:ext cx="6096000" cy="3429000"/>
-          </a:xfrm>
-          <a:custGeom>
-            <a:rect b="b" l="l" r="r" t="t"/>
-            <a:pathLst>
-              <a:path extrusionOk="0" h="120000" w="120000">
-                <a:moveTo>
-                  <a:pt x="0" y="0"/>
-                </a:moveTo>
-                <a:lnTo>
-                  <a:pt x="120000" y="0"/>
-                </a:lnTo>
-                <a:lnTo>
-                  <a:pt x="120000" y="120000"/>
-                </a:lnTo>
-                <a:lnTo>
-                  <a:pt x="0" y="120000"/>
-                </a:lnTo>
-                <a:close/>
-              </a:path>
-            </a:pathLst>
-          </a:custGeom>
-        </p:spPr>
-      </p:sp>
-      <p:sp>
-        <p:nvSpPr>
-          <p:cNvPr id="231" name="Google Shape;231;g111b5217d00_0_207:notes"/>
-          <p:cNvSpPr txBox="1"/>
-          <p:nvPr>
-            <p:ph idx="1" type="body"/>
-          </p:nvPr>
-        </p:nvSpPr>
-        <p:spPr>
-          <a:xfrm>
-            <a:off x="685800" y="4343400"/>
-            <a:ext cx="5486400" cy="4114800"/>
-          </a:xfrm>
-          <a:prstGeom prst="rect">
-            <a:avLst/>
-          </a:prstGeom>
-        </p:spPr>
-        <p:txBody>
-          <a:bodyPr anchorCtr="0" anchor="t" bIns="91425" lIns="91425" spcFirstLastPara="1" rIns="91425" wrap="square" tIns="91425">
-            <a:noAutofit/>
-          </a:bodyPr>
-          <a:lstStyle/>
-          <a:p>
-            <a:pPr indent="0" lvl="0" marL="0" rtl="0" algn="l">
-              <a:spcBef>
-                <a:spcPts val="0"/>
-              </a:spcBef>
-              <a:spcAft>
-                <a:spcPts val="0"/>
-              </a:spcAft>
-              <a:buNone/>
-            </a:pPr>
-            <a:r>
-              <a:t/>
-            </a:r>
-            <a:endParaRPr/>
-          </a:p>
-        </p:txBody>
-      </p:sp>
-    </p:spTree>
-  </p:cSld>
-  <p:clrMapOvr>
-    <a:masterClrMapping/>
-  </p:clrMapOvr>
-</p:notes>
-</file>
-
-<file path=ppt/notesSlides/notesSlide32.xml><?xml version="1.0" encoding="utf-8"?>
-<p:notes xmlns:a="http://schemas.openxmlformats.org/drawingml/2006/main" xmlns:r="http://schemas.openxmlformats.org/officeDocument/2006/relationships" xmlns:mc="http://schemas.openxmlformats.org/markup-compatibility/2006" xmlns:mv="urn:schemas-microsoft-com:mac:vml" xmlns:p="http://schemas.openxmlformats.org/presentationml/2006/main" xmlns:c="http://schemas.openxmlformats.org/drawingml/2006/chart" xmlns:dgm="http://schemas.openxmlformats.org/drawingml/2006/diagram" xmlns:o="urn:schemas-microsoft-com:office:office" xmlns:v="urn:schemas-microsoft-com:vml" xmlns:pvml="urn:schemas-microsoft-com:office:powerpoint" xmlns:com="http://schemas.openxmlformats.org/drawingml/2006/compatibility" xmlns:p14="http://schemas.microsoft.com/office/powerpoint/2010/main" xmlns:p15="http://schemas.microsoft.com/office/powerpoint/2012/main" xmlns:ahyp="http://schemas.microsoft.com/office/drawing/2018/hyperlinkcolor" showMasterPhAnim="0" showMasterSp="0">
-  <p:cSld>
-    <p:spTree>
-      <p:nvGrpSpPr>
-        <p:cNvPr id="236" name="Shape 236"/>
-        <p:cNvGrpSpPr/>
-        <p:nvPr/>
-      </p:nvGrpSpPr>
-      <p:grpSpPr>
-        <a:xfrm>
-          <a:off x="0" y="0"/>
-          <a:ext cx="0" cy="0"/>
-          <a:chOff x="0" y="0"/>
-          <a:chExt cx="0" cy="0"/>
-        </a:xfrm>
-      </p:grpSpPr>
-      <p:sp>
-        <p:nvSpPr>
-          <p:cNvPr id="237" name="Google Shape;237;g111b5217d00_0_202:notes"/>
-          <p:cNvSpPr/>
-          <p:nvPr>
-            <p:ph idx="2" type="sldImg"/>
-          </p:nvPr>
-        </p:nvSpPr>
-        <p:spPr>
-          <a:xfrm>
-            <a:off x="381300" y="685800"/>
-            <a:ext cx="6096000" cy="3429000"/>
-          </a:xfrm>
-          <a:custGeom>
-            <a:rect b="b" l="l" r="r" t="t"/>
-            <a:pathLst>
-              <a:path extrusionOk="0" h="120000" w="120000">
-                <a:moveTo>
-                  <a:pt x="0" y="0"/>
-                </a:moveTo>
-                <a:lnTo>
-                  <a:pt x="120000" y="0"/>
-                </a:lnTo>
-                <a:lnTo>
-                  <a:pt x="120000" y="120000"/>
-                </a:lnTo>
-                <a:lnTo>
-                  <a:pt x="0" y="120000"/>
-                </a:lnTo>
-                <a:close/>
-              </a:path>
-            </a:pathLst>
-          </a:custGeom>
-        </p:spPr>
-      </p:sp>
-      <p:sp>
-        <p:nvSpPr>
-          <p:cNvPr id="238" name="Google Shape;238;g111b5217d00_0_202:notes"/>
-          <p:cNvSpPr txBox="1"/>
-          <p:nvPr>
-            <p:ph idx="1" type="body"/>
-          </p:nvPr>
-        </p:nvSpPr>
-        <p:spPr>
-          <a:xfrm>
-            <a:off x="685800" y="4343400"/>
-            <a:ext cx="5486400" cy="4114800"/>
-          </a:xfrm>
-          <a:prstGeom prst="rect">
-            <a:avLst/>
-          </a:prstGeom>
-        </p:spPr>
-        <p:txBody>
-          <a:bodyPr anchorCtr="0" anchor="t" bIns="91425" lIns="91425" spcFirstLastPara="1" rIns="91425" wrap="square" tIns="91425">
-            <a:noAutofit/>
-          </a:bodyPr>
-          <a:lstStyle/>
-          <a:p>
-            <a:pPr indent="0" lvl="0" marL="0" rtl="0" algn="l">
-              <a:spcBef>
-                <a:spcPts val="0"/>
-              </a:spcBef>
-              <a:spcAft>
-                <a:spcPts val="0"/>
-              </a:spcAft>
-              <a:buNone/>
-            </a:pPr>
-            <a:r>
-              <a:t/>
-            </a:r>
-            <a:endParaRPr/>
-          </a:p>
-        </p:txBody>
-      </p:sp>
-    </p:spTree>
-  </p:cSld>
-  <p:clrMapOvr>
-    <a:masterClrMapping/>
-  </p:clrMapOvr>
-</p:notes>
-</file>
-
-<file path=ppt/notesSlides/notesSlide33.xml><?xml version="1.0" encoding="utf-8"?>
-<p:notes xmlns:a="http://schemas.openxmlformats.org/drawingml/2006/main" xmlns:r="http://schemas.openxmlformats.org/officeDocument/2006/relationships" xmlns:mc="http://schemas.openxmlformats.org/markup-compatibility/2006" xmlns:mv="urn:schemas-microsoft-com:mac:vml" xmlns:p="http://schemas.openxmlformats.org/presentationml/2006/main" xmlns:c="http://schemas.openxmlformats.org/drawingml/2006/chart" xmlns:dgm="http://schemas.openxmlformats.org/drawingml/2006/diagram" xmlns:o="urn:schemas-microsoft-com:office:office" xmlns:v="urn:schemas-microsoft-com:vml" xmlns:pvml="urn:schemas-microsoft-com:office:powerpoint" xmlns:com="http://schemas.openxmlformats.org/drawingml/2006/compatibility" xmlns:p14="http://schemas.microsoft.com/office/powerpoint/2010/main" xmlns:p15="http://schemas.microsoft.com/office/powerpoint/2012/main" xmlns:ahyp="http://schemas.microsoft.com/office/drawing/2018/hyperlinkcolor" showMasterPhAnim="0" showMasterSp="0">
-  <p:cSld>
-    <p:spTree>
-      <p:nvGrpSpPr>
-        <p:cNvPr id="243" name="Shape 243"/>
-        <p:cNvGrpSpPr/>
-        <p:nvPr/>
-      </p:nvGrpSpPr>
-      <p:grpSpPr>
-        <a:xfrm>
-          <a:off x="0" y="0"/>
-          <a:ext cx="0" cy="0"/>
-          <a:chOff x="0" y="0"/>
-          <a:chExt cx="0" cy="0"/>
-        </a:xfrm>
-      </p:grpSpPr>
-      <p:sp>
-        <p:nvSpPr>
-          <p:cNvPr id="244" name="Google Shape;244;g111b5217d00_0_197:notes"/>
-          <p:cNvSpPr/>
-          <p:nvPr>
-            <p:ph idx="2" type="sldImg"/>
-          </p:nvPr>
-        </p:nvSpPr>
-        <p:spPr>
-          <a:xfrm>
-            <a:off x="381300" y="685800"/>
-            <a:ext cx="6096000" cy="3429000"/>
-          </a:xfrm>
-          <a:custGeom>
-            <a:rect b="b" l="l" r="r" t="t"/>
-            <a:pathLst>
-              <a:path extrusionOk="0" h="120000" w="120000">
-                <a:moveTo>
-                  <a:pt x="0" y="0"/>
-                </a:moveTo>
-                <a:lnTo>
-                  <a:pt x="120000" y="0"/>
-                </a:lnTo>
-                <a:lnTo>
-                  <a:pt x="120000" y="120000"/>
-                </a:lnTo>
-                <a:lnTo>
-                  <a:pt x="0" y="120000"/>
-                </a:lnTo>
-                <a:close/>
-              </a:path>
-            </a:pathLst>
-          </a:custGeom>
-        </p:spPr>
-      </p:sp>
-      <p:sp>
-        <p:nvSpPr>
-          <p:cNvPr id="245" name="Google Shape;245;g111b5217d00_0_197:notes"/>
-          <p:cNvSpPr txBox="1"/>
-          <p:nvPr>
-            <p:ph idx="1" type="body"/>
-          </p:nvPr>
-        </p:nvSpPr>
-        <p:spPr>
-          <a:xfrm>
-            <a:off x="685800" y="4343400"/>
-            <a:ext cx="5486400" cy="4114800"/>
-          </a:xfrm>
-          <a:prstGeom prst="rect">
-            <a:avLst/>
-          </a:prstGeom>
-        </p:spPr>
-        <p:txBody>
-          <a:bodyPr anchorCtr="0" anchor="t" bIns="91425" lIns="91425" spcFirstLastPara="1" rIns="91425" wrap="square" tIns="91425">
-            <a:noAutofit/>
-          </a:bodyPr>
-          <a:lstStyle/>
-          <a:p>
-            <a:pPr indent="0" lvl="0" marL="0" rtl="0" algn="l">
-              <a:spcBef>
-                <a:spcPts val="0"/>
-              </a:spcBef>
-              <a:spcAft>
-                <a:spcPts val="0"/>
-              </a:spcAft>
-              <a:buNone/>
-            </a:pPr>
-            <a:r>
-              <a:t/>
-            </a:r>
-            <a:endParaRPr/>
-          </a:p>
-        </p:txBody>
-      </p:sp>
-    </p:spTree>
-  </p:cSld>
-  <p:clrMapOvr>
-    <a:masterClrMapping/>
-  </p:clrMapOvr>
-</p:notes>
-</file>
-
-<file path=ppt/notesSlides/notesSlide34.xml><?xml version="1.0" encoding="utf-8"?>
-<p:notes xmlns:a="http://schemas.openxmlformats.org/drawingml/2006/main" xmlns:r="http://schemas.openxmlformats.org/officeDocument/2006/relationships" xmlns:mc="http://schemas.openxmlformats.org/markup-compatibility/2006" xmlns:mv="urn:schemas-microsoft-com:mac:vml" xmlns:p="http://schemas.openxmlformats.org/presentationml/2006/main" xmlns:c="http://schemas.openxmlformats.org/drawingml/2006/chart" xmlns:dgm="http://schemas.openxmlformats.org/drawingml/2006/diagram" xmlns:o="urn:schemas-microsoft-com:office:office" xmlns:v="urn:schemas-microsoft-com:vml" xmlns:pvml="urn:schemas-microsoft-com:office:powerpoint" xmlns:com="http://schemas.openxmlformats.org/drawingml/2006/compatibility" xmlns:p14="http://schemas.microsoft.com/office/powerpoint/2010/main" xmlns:p15="http://schemas.microsoft.com/office/powerpoint/2012/main" xmlns:ahyp="http://schemas.microsoft.com/office/drawing/2018/hyperlinkcolor" showMasterPhAnim="0" showMasterSp="0">
-  <p:cSld>
-    <p:spTree>
-      <p:nvGrpSpPr>
-        <p:cNvPr id="249" name="Shape 249"/>
-        <p:cNvGrpSpPr/>
-        <p:nvPr/>
-      </p:nvGrpSpPr>
-      <p:grpSpPr>
-        <a:xfrm>
-          <a:off x="0" y="0"/>
-          <a:ext cx="0" cy="0"/>
-          <a:chOff x="0" y="0"/>
-          <a:chExt cx="0" cy="0"/>
-        </a:xfrm>
-      </p:grpSpPr>
-      <p:sp>
-        <p:nvSpPr>
-          <p:cNvPr id="250" name="Google Shape;250;g111b5217d00_0_219:notes"/>
-          <p:cNvSpPr/>
-          <p:nvPr>
-            <p:ph idx="2" type="sldImg"/>
-          </p:nvPr>
-        </p:nvSpPr>
-        <p:spPr>
-          <a:xfrm>
-            <a:off x="381300" y="685800"/>
-            <a:ext cx="6096000" cy="3429000"/>
-          </a:xfrm>
-          <a:custGeom>
-            <a:rect b="b" l="l" r="r" t="t"/>
-            <a:pathLst>
-              <a:path extrusionOk="0" h="120000" w="120000">
-                <a:moveTo>
-                  <a:pt x="0" y="0"/>
-                </a:moveTo>
-                <a:lnTo>
-                  <a:pt x="120000" y="0"/>
-                </a:lnTo>
-                <a:lnTo>
-                  <a:pt x="120000" y="120000"/>
-                </a:lnTo>
-                <a:lnTo>
-                  <a:pt x="0" y="120000"/>
-                </a:lnTo>
-                <a:close/>
-              </a:path>
-            </a:pathLst>
-          </a:custGeom>
-        </p:spPr>
-      </p:sp>
-      <p:sp>
-        <p:nvSpPr>
-          <p:cNvPr id="251" name="Google Shape;251;g111b5217d00_0_219:notes"/>
-          <p:cNvSpPr txBox="1"/>
-          <p:nvPr>
-            <p:ph idx="1" type="body"/>
-          </p:nvPr>
-        </p:nvSpPr>
-        <p:spPr>
-          <a:xfrm>
-            <a:off x="685800" y="4343400"/>
-            <a:ext cx="5486400" cy="4114800"/>
-          </a:xfrm>
-          <a:prstGeom prst="rect">
-            <a:avLst/>
-          </a:prstGeom>
-        </p:spPr>
-        <p:txBody>
-          <a:bodyPr anchorCtr="0" anchor="t" bIns="91425" lIns="91425" spcFirstLastPara="1" rIns="91425" wrap="square" tIns="91425">
-            <a:noAutofit/>
-          </a:bodyPr>
-          <a:lstStyle/>
-          <a:p>
-            <a:pPr indent="0" lvl="0" marL="0" rtl="0" algn="l">
-              <a:spcBef>
-                <a:spcPts val="0"/>
-              </a:spcBef>
-              <a:spcAft>
-                <a:spcPts val="0"/>
-              </a:spcAft>
-              <a:buNone/>
-            </a:pPr>
-            <a:r>
-              <a:t/>
-            </a:r>
-            <a:endParaRPr/>
-          </a:p>
-        </p:txBody>
-      </p:sp>
-    </p:spTree>
-  </p:cSld>
-  <p:clrMapOvr>
-    <a:masterClrMapping/>
-  </p:clrMapOvr>
-</p:notes>
-</file>
-
-<file path=ppt/notesSlides/notesSlide35.xml><?xml version="1.0" encoding="utf-8"?>
-<p:notes xmlns:a="http://schemas.openxmlformats.org/drawingml/2006/main" xmlns:r="http://schemas.openxmlformats.org/officeDocument/2006/relationships" xmlns:mc="http://schemas.openxmlformats.org/markup-compatibility/2006" xmlns:mv="urn:schemas-microsoft-com:mac:vml" xmlns:p="http://schemas.openxmlformats.org/presentationml/2006/main" xmlns:c="http://schemas.openxmlformats.org/drawingml/2006/chart" xmlns:dgm="http://schemas.openxmlformats.org/drawingml/2006/diagram" xmlns:o="urn:schemas-microsoft-com:office:office" xmlns:v="urn:schemas-microsoft-com:vml" xmlns:pvml="urn:schemas-microsoft-com:office:powerpoint" xmlns:com="http://schemas.openxmlformats.org/drawingml/2006/compatibility" xmlns:p14="http://schemas.microsoft.com/office/powerpoint/2010/main" xmlns:p15="http://schemas.microsoft.com/office/powerpoint/2012/main" xmlns:ahyp="http://schemas.microsoft.com/office/drawing/2018/hyperlinkcolor" showMasterPhAnim="0" showMasterSp="0">
-  <p:cSld>
-    <p:spTree>
-      <p:nvGrpSpPr>
-        <p:cNvPr id="255" name="Shape 255"/>
-        <p:cNvGrpSpPr/>
-        <p:nvPr/>
-      </p:nvGrpSpPr>
-      <p:grpSpPr>
-        <a:xfrm>
-          <a:off x="0" y="0"/>
-          <a:ext cx="0" cy="0"/>
-          <a:chOff x="0" y="0"/>
-          <a:chExt cx="0" cy="0"/>
-        </a:xfrm>
-      </p:grpSpPr>
-      <p:sp>
-        <p:nvSpPr>
-          <p:cNvPr id="256" name="Google Shape;256;g111b5217d00_0_224:notes"/>
-          <p:cNvSpPr/>
-          <p:nvPr>
-            <p:ph idx="2" type="sldImg"/>
-          </p:nvPr>
-        </p:nvSpPr>
-        <p:spPr>
-          <a:xfrm>
-            <a:off x="381300" y="685800"/>
-            <a:ext cx="6096000" cy="3429000"/>
-          </a:xfrm>
-          <a:custGeom>
-            <a:rect b="b" l="l" r="r" t="t"/>
-            <a:pathLst>
-              <a:path extrusionOk="0" h="120000" w="120000">
-                <a:moveTo>
-                  <a:pt x="0" y="0"/>
-                </a:moveTo>
-                <a:lnTo>
-                  <a:pt x="120000" y="0"/>
-                </a:lnTo>
-                <a:lnTo>
-                  <a:pt x="120000" y="120000"/>
-                </a:lnTo>
-                <a:lnTo>
-                  <a:pt x="0" y="120000"/>
-                </a:lnTo>
-                <a:close/>
-              </a:path>
-            </a:pathLst>
-          </a:custGeom>
-        </p:spPr>
-      </p:sp>
-      <p:sp>
-        <p:nvSpPr>
-          <p:cNvPr id="257" name="Google Shape;257;g111b5217d00_0_224:notes"/>
-          <p:cNvSpPr txBox="1"/>
-          <p:nvPr>
-            <p:ph idx="1" type="body"/>
-          </p:nvPr>
-        </p:nvSpPr>
-        <p:spPr>
-          <a:xfrm>
-            <a:off x="685800" y="4343400"/>
-            <a:ext cx="5486400" cy="4114800"/>
-          </a:xfrm>
-          <a:prstGeom prst="rect">
-            <a:avLst/>
-          </a:prstGeom>
-        </p:spPr>
-        <p:txBody>
-          <a:bodyPr anchorCtr="0" anchor="t" bIns="91425" lIns="91425" spcFirstLastPara="1" rIns="91425" wrap="square" tIns="91425">
-            <a:noAutofit/>
-          </a:bodyPr>
-          <a:lstStyle/>
-          <a:p>
-            <a:pPr indent="0" lvl="0" marL="0" rtl="0" algn="l">
-              <a:spcBef>
-                <a:spcPts val="0"/>
-              </a:spcBef>
-              <a:spcAft>
-                <a:spcPts val="0"/>
-              </a:spcAft>
-              <a:buNone/>
-            </a:pPr>
-            <a:r>
-              <a:t/>
-            </a:r>
-            <a:endParaRPr/>
-          </a:p>
-        </p:txBody>
-      </p:sp>
-    </p:spTree>
-  </p:cSld>
-  <p:clrMapOvr>
-    <a:masterClrMapping/>
-  </p:clrMapOvr>
-</p:notes>
-</file>
-
-<file path=ppt/notesSlides/notesSlide36.xml><?xml version="1.0" encoding="utf-8"?>
-<p:notes xmlns:a="http://schemas.openxmlformats.org/drawingml/2006/main" xmlns:r="http://schemas.openxmlformats.org/officeDocument/2006/relationships" xmlns:mc="http://schemas.openxmlformats.org/markup-compatibility/2006" xmlns:mv="urn:schemas-microsoft-com:mac:vml" xmlns:p="http://schemas.openxmlformats.org/presentationml/2006/main" xmlns:c="http://schemas.openxmlformats.org/drawingml/2006/chart" xmlns:dgm="http://schemas.openxmlformats.org/drawingml/2006/diagram" xmlns:o="urn:schemas-microsoft-com:office:office" xmlns:v="urn:schemas-microsoft-com:vml" xmlns:pvml="urn:schemas-microsoft-com:office:powerpoint" xmlns:com="http://schemas.openxmlformats.org/drawingml/2006/compatibility" xmlns:p14="http://schemas.microsoft.com/office/powerpoint/2010/main" xmlns:p15="http://schemas.microsoft.com/office/powerpoint/2012/main" xmlns:ahyp="http://schemas.microsoft.com/office/drawing/2018/hyperlinkcolor" showMasterPhAnim="0" showMasterSp="0">
-  <p:cSld>
-    <p:spTree>
-      <p:nvGrpSpPr>
-        <p:cNvPr id="261" name="Shape 261"/>
-        <p:cNvGrpSpPr/>
-        <p:nvPr/>
-      </p:nvGrpSpPr>
-      <p:grpSpPr>
-        <a:xfrm>
-          <a:off x="0" y="0"/>
-          <a:ext cx="0" cy="0"/>
-          <a:chOff x="0" y="0"/>
-          <a:chExt cx="0" cy="0"/>
-        </a:xfrm>
-      </p:grpSpPr>
-      <p:sp>
-        <p:nvSpPr>
-          <p:cNvPr id="262" name="Google Shape;262;g11193b24fb4_0_57:notes"/>
-          <p:cNvSpPr/>
-          <p:nvPr>
-            <p:ph idx="2" type="sldImg"/>
-          </p:nvPr>
-        </p:nvSpPr>
-        <p:spPr>
-          <a:xfrm>
-            <a:off x="381300" y="685800"/>
-            <a:ext cx="6096000" cy="3429000"/>
-          </a:xfrm>
-          <a:custGeom>
-            <a:rect b="b" l="l" r="r" t="t"/>
-            <a:pathLst>
-              <a:path extrusionOk="0" h="120000" w="120000">
-                <a:moveTo>
-                  <a:pt x="0" y="0"/>
-                </a:moveTo>
-                <a:lnTo>
-                  <a:pt x="120000" y="0"/>
-                </a:lnTo>
-                <a:lnTo>
-                  <a:pt x="120000" y="120000"/>
-                </a:lnTo>
-                <a:lnTo>
-                  <a:pt x="0" y="120000"/>
-                </a:lnTo>
-                <a:close/>
-              </a:path>
-            </a:pathLst>
-          </a:custGeom>
-        </p:spPr>
-      </p:sp>
-      <p:sp>
-        <p:nvSpPr>
-          <p:cNvPr id="263" name="Google Shape;263;g11193b24fb4_0_57:notes"/>
-          <p:cNvSpPr txBox="1"/>
-          <p:nvPr>
-            <p:ph idx="1" type="body"/>
-          </p:nvPr>
-        </p:nvSpPr>
-        <p:spPr>
-          <a:xfrm>
-            <a:off x="685800" y="4343400"/>
-            <a:ext cx="5486400" cy="4114800"/>
-          </a:xfrm>
-          <a:prstGeom prst="rect">
-            <a:avLst/>
-          </a:prstGeom>
-        </p:spPr>
-        <p:txBody>
-          <a:bodyPr anchorCtr="0" anchor="t" bIns="91425" lIns="91425" spcFirstLastPara="1" rIns="91425" wrap="square" tIns="91425">
-            <a:noAutofit/>
-          </a:bodyPr>
-          <a:lstStyle/>
-          <a:p>
-            <a:pPr indent="0" lvl="0" marL="0" rtl="0" algn="l">
-              <a:spcBef>
-                <a:spcPts val="0"/>
-              </a:spcBef>
-              <a:spcAft>
-                <a:spcPts val="0"/>
-              </a:spcAft>
-              <a:buNone/>
-            </a:pPr>
-            <a:r>
-              <a:t/>
-            </a:r>
-            <a:endParaRPr/>
-          </a:p>
-        </p:txBody>
-      </p:sp>
-    </p:spTree>
-  </p:cSld>
-  <p:clrMapOvr>
-    <a:masterClrMapping/>
-  </p:clrMapOvr>
-</p:notes>
-</file>
-
-<file path=ppt/notesSlides/notesSlide37.xml><?xml version="1.0" encoding="utf-8"?>
-<p:notes xmlns:a="http://schemas.openxmlformats.org/drawingml/2006/main" xmlns:r="http://schemas.openxmlformats.org/officeDocument/2006/relationships" xmlns:mc="http://schemas.openxmlformats.org/markup-compatibility/2006" xmlns:mv="urn:schemas-microsoft-com:mac:vml" xmlns:p="http://schemas.openxmlformats.org/presentationml/2006/main" xmlns:c="http://schemas.openxmlformats.org/drawingml/2006/chart" xmlns:dgm="http://schemas.openxmlformats.org/drawingml/2006/diagram" xmlns:o="urn:schemas-microsoft-com:office:office" xmlns:v="urn:schemas-microsoft-com:vml" xmlns:pvml="urn:schemas-microsoft-com:office:powerpoint" xmlns:com="http://schemas.openxmlformats.org/drawingml/2006/compatibility" xmlns:p14="http://schemas.microsoft.com/office/powerpoint/2010/main" xmlns:p15="http://schemas.microsoft.com/office/powerpoint/2012/main" xmlns:ahyp="http://schemas.microsoft.com/office/drawing/2018/hyperlinkcolor" showMasterPhAnim="0" showMasterSp="0">
-  <p:cSld>
-    <p:spTree>
-      <p:nvGrpSpPr>
-        <p:cNvPr id="266" name="Shape 266"/>
-        <p:cNvGrpSpPr/>
-        <p:nvPr/>
-      </p:nvGrpSpPr>
-      <p:grpSpPr>
-        <a:xfrm>
-          <a:off x="0" y="0"/>
-          <a:ext cx="0" cy="0"/>
-          <a:chOff x="0" y="0"/>
-          <a:chExt cx="0" cy="0"/>
-        </a:xfrm>
-      </p:grpSpPr>
-      <p:sp>
-        <p:nvSpPr>
-          <p:cNvPr id="267" name="Google Shape;267;g11193b24fb4_0_62:notes"/>
-          <p:cNvSpPr/>
-          <p:nvPr>
-            <p:ph idx="2" type="sldImg"/>
-          </p:nvPr>
-        </p:nvSpPr>
-        <p:spPr>
-          <a:xfrm>
-            <a:off x="381300" y="685800"/>
-            <a:ext cx="6096000" cy="3429000"/>
-          </a:xfrm>
-          <a:custGeom>
-            <a:rect b="b" l="l" r="r" t="t"/>
-            <a:pathLst>
-              <a:path extrusionOk="0" h="120000" w="120000">
-                <a:moveTo>
-                  <a:pt x="0" y="0"/>
-                </a:moveTo>
-                <a:lnTo>
-                  <a:pt x="120000" y="0"/>
-                </a:lnTo>
-                <a:lnTo>
-                  <a:pt x="120000" y="120000"/>
-                </a:lnTo>
-                <a:lnTo>
-                  <a:pt x="0" y="120000"/>
-                </a:lnTo>
-                <a:close/>
-              </a:path>
-            </a:pathLst>
-          </a:custGeom>
-        </p:spPr>
-      </p:sp>
-      <p:sp>
-        <p:nvSpPr>
-          <p:cNvPr id="268" name="Google Shape;268;g11193b24fb4_0_62:notes"/>
-          <p:cNvSpPr txBox="1"/>
-          <p:nvPr>
-            <p:ph idx="1" type="body"/>
-          </p:nvPr>
-        </p:nvSpPr>
-        <p:spPr>
-          <a:xfrm>
-            <a:off x="685800" y="4343400"/>
-            <a:ext cx="5486400" cy="4114800"/>
-          </a:xfrm>
-          <a:prstGeom prst="rect">
-            <a:avLst/>
-          </a:prstGeom>
-        </p:spPr>
-        <p:txBody>
-          <a:bodyPr anchorCtr="0" anchor="t" bIns="91425" lIns="91425" spcFirstLastPara="1" rIns="91425" wrap="square" tIns="91425">
-            <a:noAutofit/>
-          </a:bodyPr>
-          <a:lstStyle/>
-          <a:p>
-            <a:pPr indent="0" lvl="0" marL="0" rtl="0" algn="l">
-              <a:spcBef>
-                <a:spcPts val="0"/>
-              </a:spcBef>
-              <a:spcAft>
-                <a:spcPts val="0"/>
-              </a:spcAft>
-              <a:buNone/>
-            </a:pPr>
-            <a:r>
-              <a:t/>
-            </a:r>
-            <a:endParaRPr/>
-          </a:p>
-        </p:txBody>
-      </p:sp>
-    </p:spTree>
-  </p:cSld>
-  <p:clrMapOvr>
-    <a:masterClrMapping/>
-  </p:clrMapOvr>
-</p:notes>
-</file>
-
-<file path=ppt/notesSlides/notesSlide38.xml><?xml version="1.0" encoding="utf-8"?>
-<p:notes xmlns:a="http://schemas.openxmlformats.org/drawingml/2006/main" xmlns:r="http://schemas.openxmlformats.org/officeDocument/2006/relationships" xmlns:mc="http://schemas.openxmlformats.org/markup-compatibility/2006" xmlns:mv="urn:schemas-microsoft-com:mac:vml" xmlns:p="http://schemas.openxmlformats.org/presentationml/2006/main" xmlns:c="http://schemas.openxmlformats.org/drawingml/2006/chart" xmlns:dgm="http://schemas.openxmlformats.org/drawingml/2006/diagram" xmlns:o="urn:schemas-microsoft-com:office:office" xmlns:v="urn:schemas-microsoft-com:vml" xmlns:pvml="urn:schemas-microsoft-com:office:powerpoint" xmlns:com="http://schemas.openxmlformats.org/drawingml/2006/compatibility" xmlns:p14="http://schemas.microsoft.com/office/powerpoint/2010/main" xmlns:p15="http://schemas.microsoft.com/office/powerpoint/2012/main" xmlns:ahyp="http://schemas.microsoft.com/office/drawing/2018/hyperlinkcolor" showMasterPhAnim="0" showMasterSp="0">
-  <p:cSld>
-    <p:spTree>
-      <p:nvGrpSpPr>
-        <p:cNvPr id="271" name="Shape 271"/>
-        <p:cNvGrpSpPr/>
-        <p:nvPr/>
-      </p:nvGrpSpPr>
-      <p:grpSpPr>
-        <a:xfrm>
-          <a:off x="0" y="0"/>
-          <a:ext cx="0" cy="0"/>
-          <a:chOff x="0" y="0"/>
-          <a:chExt cx="0" cy="0"/>
-        </a:xfrm>
-      </p:grpSpPr>
-      <p:sp>
-        <p:nvSpPr>
-          <p:cNvPr id="272" name="Google Shape;272;g111b5217d00_0_320:notes"/>
-          <p:cNvSpPr/>
-          <p:nvPr>
-            <p:ph idx="2" type="sldImg"/>
-          </p:nvPr>
-        </p:nvSpPr>
-        <p:spPr>
-          <a:xfrm>
-            <a:off x="381300" y="685800"/>
-            <a:ext cx="6096000" cy="3429000"/>
-          </a:xfrm>
-          <a:custGeom>
-            <a:rect b="b" l="l" r="r" t="t"/>
-            <a:pathLst>
-              <a:path extrusionOk="0" h="120000" w="120000">
-                <a:moveTo>
-                  <a:pt x="0" y="0"/>
-                </a:moveTo>
-                <a:lnTo>
-                  <a:pt x="120000" y="0"/>
-                </a:lnTo>
-                <a:lnTo>
-                  <a:pt x="120000" y="120000"/>
-                </a:lnTo>
-                <a:lnTo>
-                  <a:pt x="0" y="120000"/>
-                </a:lnTo>
-                <a:close/>
-              </a:path>
-            </a:pathLst>
-          </a:custGeom>
-        </p:spPr>
-      </p:sp>
-      <p:sp>
-        <p:nvSpPr>
-          <p:cNvPr id="273" name="Google Shape;273;g111b5217d00_0_320:notes"/>
-          <p:cNvSpPr txBox="1"/>
-          <p:nvPr>
-            <p:ph idx="1" type="body"/>
-          </p:nvPr>
-        </p:nvSpPr>
-        <p:spPr>
-          <a:xfrm>
-            <a:off x="685800" y="4343400"/>
-            <a:ext cx="5486400" cy="4114800"/>
-          </a:xfrm>
-          <a:prstGeom prst="rect">
-            <a:avLst/>
-          </a:prstGeom>
-        </p:spPr>
-        <p:txBody>
-          <a:bodyPr anchorCtr="0" anchor="t" bIns="91425" lIns="91425" spcFirstLastPara="1" rIns="91425" wrap="square" tIns="91425">
-            <a:noAutofit/>
-          </a:bodyPr>
-          <a:lstStyle/>
-          <a:p>
-            <a:pPr indent="0" lvl="0" marL="0" rtl="0" algn="l">
-              <a:spcBef>
-                <a:spcPts val="0"/>
-              </a:spcBef>
-              <a:spcAft>
-                <a:spcPts val="0"/>
-              </a:spcAft>
-              <a:buNone/>
-            </a:pPr>
-            <a:r>
-              <a:t/>
-            </a:r>
-            <a:endParaRPr/>
-          </a:p>
-        </p:txBody>
-      </p:sp>
-    </p:spTree>
-  </p:cSld>
-  <p:clrMapOvr>
-    <a:masterClrMapping/>
-  </p:clrMapOvr>
-</p:notes>
-</file>
-
-<file path=ppt/notesSlides/notesSlide39.xml><?xml version="1.0" encoding="utf-8"?>
-<p:notes xmlns:a="http://schemas.openxmlformats.org/drawingml/2006/main" xmlns:r="http://schemas.openxmlformats.org/officeDocument/2006/relationships" xmlns:mc="http://schemas.openxmlformats.org/markup-compatibility/2006" xmlns:mv="urn:schemas-microsoft-com:mac:vml" xmlns:p="http://schemas.openxmlformats.org/presentationml/2006/main" xmlns:c="http://schemas.openxmlformats.org/drawingml/2006/chart" xmlns:dgm="http://schemas.openxmlformats.org/drawingml/2006/diagram" xmlns:o="urn:schemas-microsoft-com:office:office" xmlns:v="urn:schemas-microsoft-com:vml" xmlns:pvml="urn:schemas-microsoft-com:office:powerpoint" xmlns:com="http://schemas.openxmlformats.org/drawingml/2006/compatibility" xmlns:p14="http://schemas.microsoft.com/office/powerpoint/2010/main" xmlns:p15="http://schemas.microsoft.com/office/powerpoint/2012/main" xmlns:ahyp="http://schemas.microsoft.com/office/drawing/2018/hyperlinkcolor" showMasterPhAnim="0" showMasterSp="0">
-  <p:cSld>
-    <p:spTree>
-      <p:nvGrpSpPr>
-        <p:cNvPr id="277" name="Shape 277"/>
-        <p:cNvGrpSpPr/>
-        <p:nvPr/>
-      </p:nvGrpSpPr>
-      <p:grpSpPr>
-        <a:xfrm>
-          <a:off x="0" y="0"/>
-          <a:ext cx="0" cy="0"/>
-          <a:chOff x="0" y="0"/>
-          <a:chExt cx="0" cy="0"/>
-        </a:xfrm>
-      </p:grpSpPr>
-      <p:sp>
-        <p:nvSpPr>
-          <p:cNvPr id="278" name="Google Shape;278;g111b5217d00_0_351:notes"/>
-          <p:cNvSpPr/>
-          <p:nvPr>
-            <p:ph idx="2" type="sldImg"/>
-          </p:nvPr>
-        </p:nvSpPr>
-        <p:spPr>
-          <a:xfrm>
-            <a:off x="381300" y="685800"/>
-            <a:ext cx="6096000" cy="3429000"/>
-          </a:xfrm>
-          <a:custGeom>
-            <a:rect b="b" l="l" r="r" t="t"/>
-            <a:pathLst>
-              <a:path extrusionOk="0" h="120000" w="120000">
-                <a:moveTo>
-                  <a:pt x="0" y="0"/>
-                </a:moveTo>
-                <a:lnTo>
-                  <a:pt x="120000" y="0"/>
-                </a:lnTo>
-                <a:lnTo>
-                  <a:pt x="120000" y="120000"/>
-                </a:lnTo>
-                <a:lnTo>
-                  <a:pt x="0" y="120000"/>
-                </a:lnTo>
-                <a:close/>
-              </a:path>
-            </a:pathLst>
-          </a:custGeom>
-        </p:spPr>
-      </p:sp>
-      <p:sp>
-        <p:nvSpPr>
-          <p:cNvPr id="279" name="Google Shape;279;g111b5217d00_0_351:notes"/>
+          <p:cNvPr id="228" name="Google Shape;228;g11193b24fb4_0_67:notes"/>
           <p:cNvSpPr txBox="1"/>
           <p:nvPr>
             <p:ph idx="1" type="body"/>
@@ -4047,105 +3146,6 @@
       <p:sp>
         <p:nvSpPr>
           <p:cNvPr id="70" name="Google Shape;70;g11193b24fb4_0_28:notes"/>
-          <p:cNvSpPr txBox="1"/>
-          <p:nvPr>
-            <p:ph idx="1" type="body"/>
-          </p:nvPr>
-        </p:nvSpPr>
-        <p:spPr>
-          <a:xfrm>
-            <a:off x="685800" y="4343400"/>
-            <a:ext cx="5486400" cy="4114800"/>
-          </a:xfrm>
-          <a:prstGeom prst="rect">
-            <a:avLst/>
-          </a:prstGeom>
-        </p:spPr>
-        <p:txBody>
-          <a:bodyPr anchorCtr="0" anchor="t" bIns="91425" lIns="91425" spcFirstLastPara="1" rIns="91425" wrap="square" tIns="91425">
-            <a:noAutofit/>
-          </a:bodyPr>
-          <a:lstStyle/>
-          <a:p>
-            <a:pPr indent="0" lvl="0" marL="0" rtl="0" algn="l">
-              <a:spcBef>
-                <a:spcPts val="0"/>
-              </a:spcBef>
-              <a:spcAft>
-                <a:spcPts val="0"/>
-              </a:spcAft>
-              <a:buNone/>
-            </a:pPr>
-            <a:r>
-              <a:t/>
-            </a:r>
-            <a:endParaRPr/>
-          </a:p>
-        </p:txBody>
-      </p:sp>
-    </p:spTree>
-  </p:cSld>
-  <p:clrMapOvr>
-    <a:masterClrMapping/>
-  </p:clrMapOvr>
-</p:notes>
-</file>
-
-<file path=ppt/notesSlides/notesSlide40.xml><?xml version="1.0" encoding="utf-8"?>
-<p:notes xmlns:a="http://schemas.openxmlformats.org/drawingml/2006/main" xmlns:r="http://schemas.openxmlformats.org/officeDocument/2006/relationships" xmlns:mc="http://schemas.openxmlformats.org/markup-compatibility/2006" xmlns:mv="urn:schemas-microsoft-com:mac:vml" xmlns:p="http://schemas.openxmlformats.org/presentationml/2006/main" xmlns:c="http://schemas.openxmlformats.org/drawingml/2006/chart" xmlns:dgm="http://schemas.openxmlformats.org/drawingml/2006/diagram" xmlns:o="urn:schemas-microsoft-com:office:office" xmlns:v="urn:schemas-microsoft-com:vml" xmlns:pvml="urn:schemas-microsoft-com:office:powerpoint" xmlns:com="http://schemas.openxmlformats.org/drawingml/2006/compatibility" xmlns:p14="http://schemas.microsoft.com/office/powerpoint/2010/main" xmlns:p15="http://schemas.microsoft.com/office/powerpoint/2012/main" xmlns:ahyp="http://schemas.microsoft.com/office/drawing/2018/hyperlinkcolor" showMasterPhAnim="0" showMasterSp="0">
-  <p:cSld>
-    <p:spTree>
-      <p:nvGrpSpPr>
-        <p:cNvPr id="282" name="Shape 282"/>
-        <p:cNvGrpSpPr/>
-        <p:nvPr/>
-      </p:nvGrpSpPr>
-      <p:grpSpPr>
-        <a:xfrm>
-          <a:off x="0" y="0"/>
-          <a:ext cx="0" cy="0"/>
-          <a:chOff x="0" y="0"/>
-          <a:chExt cx="0" cy="0"/>
-        </a:xfrm>
-      </p:grpSpPr>
-      <p:sp>
-        <p:nvSpPr>
-          <p:cNvPr id="283" name="Google Shape;283;g11193b24fb4_0_67:notes"/>
-          <p:cNvSpPr/>
-          <p:nvPr>
-            <p:ph idx="2" type="sldImg"/>
-          </p:nvPr>
-        </p:nvSpPr>
-        <p:spPr>
-          <a:xfrm>
-            <a:off x="381300" y="685800"/>
-            <a:ext cx="6096000" cy="3429000"/>
-          </a:xfrm>
-          <a:custGeom>
-            <a:rect b="b" l="l" r="r" t="t"/>
-            <a:pathLst>
-              <a:path extrusionOk="0" h="120000" w="120000">
-                <a:moveTo>
-                  <a:pt x="0" y="0"/>
-                </a:moveTo>
-                <a:lnTo>
-                  <a:pt x="120000" y="0"/>
-                </a:lnTo>
-                <a:lnTo>
-                  <a:pt x="120000" y="120000"/>
-                </a:lnTo>
-                <a:lnTo>
-                  <a:pt x="0" y="120000"/>
-                </a:lnTo>
-                <a:close/>
-              </a:path>
-            </a:pathLst>
-          </a:custGeom>
-        </p:spPr>
-      </p:sp>
-      <p:sp>
-        <p:nvSpPr>
-          <p:cNvPr id="284" name="Google Shape;284;g11193b24fb4_0_67:notes"/>
           <p:cNvSpPr txBox="1"/>
           <p:nvPr>
             <p:ph idx="1" type="body"/>
@@ -9505,7 +8505,7 @@
             </a:pPr>
             <a:r>
               <a:rPr lang="en"/>
-              <a:t>Sprint 4 Summary + retrospective overview</a:t>
+              <a:t>Sprint 5 Summary + retrospective overview</a:t>
             </a:r>
             <a:endParaRPr/>
           </a:p>
@@ -9611,7 +8611,7 @@
             </a:pPr>
             <a:r>
               <a:rPr lang="en"/>
-              <a:t>Build out the contact tracing, chat, notifications, dashboards, and appointments flows</a:t>
+              <a:t>Make the chat page reactive</a:t>
             </a:r>
             <a:endParaRPr/>
           </a:p>
@@ -9628,7 +8628,7 @@
             </a:pPr>
             <a:r>
               <a:rPr lang="en"/>
-              <a:t>Refine some of the previous flows and use cases to reduce friction and the number of clicks it takes to do an action</a:t>
+              <a:t>Do some minor UI improvements</a:t>
             </a:r>
             <a:endParaRPr/>
           </a:p>
@@ -9672,7 +8672,7 @@
                   <a:srgbClr val="00FF00"/>
                 </a:highlight>
               </a:rPr>
-              <a:t>67</a:t>
+              <a:t>0</a:t>
             </a:r>
             <a:r>
               <a:rPr lang="en">
@@ -9709,7 +8709,7 @@
                   <a:srgbClr val="00FF00"/>
                 </a:highlight>
               </a:rPr>
-              <a:t>83</a:t>
+              <a:t>9</a:t>
             </a:r>
             <a:r>
               <a:rPr lang="en">
@@ -9847,8 +8847,8 @@
         </p:blipFill>
         <p:spPr>
           <a:xfrm>
-            <a:off x="1645738" y="1152476"/>
-            <a:ext cx="5852525" cy="3734550"/>
+            <a:off x="1833563" y="1152475"/>
+            <a:ext cx="5476875" cy="3562350"/>
           </a:xfrm>
           <a:prstGeom prst="rect">
             <a:avLst/>
@@ -10035,6 +9035,23 @@
             </a:pPr>
             <a:r>
               <a:rPr lang="en"/>
+              <a:t>Sprint 5 -&gt; 9 USP</a:t>
+            </a:r>
+            <a:endParaRPr/>
+          </a:p>
+          <a:p>
+            <a:pPr indent="-342900" lvl="0" marL="457200" rtl="0" algn="l">
+              <a:spcBef>
+                <a:spcPts val="0"/>
+              </a:spcBef>
+              <a:spcAft>
+                <a:spcPts val="0"/>
+              </a:spcAft>
+              <a:buSzPts val="1800"/>
+              <a:buChar char="-"/>
+            </a:pPr>
+            <a:r>
+              <a:rPr lang="en"/>
               <a:t>Velocity = </a:t>
             </a:r>
             <a:r>
@@ -10043,15 +9060,7 @@
                   <a:srgbClr val="00FF00"/>
                 </a:highlight>
               </a:rPr>
-              <a:t>72</a:t>
-            </a:r>
-            <a:r>
-              <a:rPr lang="en">
-                <a:highlight>
-                  <a:srgbClr val="00FF00"/>
-                </a:highlight>
-              </a:rPr>
-              <a:t> USP</a:t>
+              <a:t>59.4 USP</a:t>
             </a:r>
             <a:endParaRPr>
               <a:highlight>
@@ -10215,8 +9224,8 @@
         </p:blipFill>
         <p:spPr>
           <a:xfrm>
-            <a:off x="1638375" y="1088025"/>
-            <a:ext cx="5867250" cy="3826875"/>
+            <a:off x="1600200" y="1152475"/>
+            <a:ext cx="5943600" cy="3590925"/>
           </a:xfrm>
           <a:prstGeom prst="rect">
             <a:avLst/>
@@ -10399,7 +9408,7 @@
                   <a:srgbClr val="00FF00"/>
                 </a:highlight>
               </a:rPr>
-              <a:t>14 different risks</a:t>
+              <a:t>15 different risks</a:t>
             </a:r>
             <a:r>
               <a:rPr lang="en"/>
@@ -10424,11 +9433,19 @@
                   <a:srgbClr val="00FF00"/>
                 </a:highlight>
               </a:rPr>
-              <a:t>2 new risks</a:t>
+              <a:t>1 </a:t>
+            </a:r>
+            <a:r>
+              <a:rPr lang="en">
+                <a:highlight>
+                  <a:srgbClr val="00FF00"/>
+                </a:highlight>
+              </a:rPr>
+              <a:t>new risk</a:t>
             </a:r>
             <a:r>
               <a:rPr lang="en"/>
-              <a:t> were identified in S</a:t>
+              <a:t> was identified in S</a:t>
             </a:r>
             <a:r>
               <a:rPr lang="en"/>
@@ -10436,7 +9453,7 @@
             </a:r>
             <a:r>
               <a:rPr lang="en"/>
-              <a:t> 4</a:t>
+              <a:t> 5</a:t>
             </a:r>
             <a:endParaRPr/>
           </a:p>
@@ -10501,7 +9518,7 @@
             </a:pPr>
             <a:r>
               <a:rPr lang="en"/>
-              <a:t>Risk(s) identified in sprint 4</a:t>
+              <a:t>Risk(s) identified in sprint 5</a:t>
             </a:r>
             <a:endParaRPr/>
           </a:p>
@@ -10562,8 +9579,8 @@
         </p:blipFill>
         <p:spPr>
           <a:xfrm>
-            <a:off x="1481125" y="1152463"/>
-            <a:ext cx="6181725" cy="3476625"/>
+            <a:off x="911702" y="1964513"/>
+            <a:ext cx="7320601" cy="1214475"/>
           </a:xfrm>
           <a:prstGeom prst="rect">
             <a:avLst/>
@@ -10694,8 +9711,8 @@
         </p:blipFill>
         <p:spPr>
           <a:xfrm>
-            <a:off x="1873200" y="1196625"/>
-            <a:ext cx="5397601" cy="3706575"/>
+            <a:off x="1760824" y="1152474"/>
+            <a:ext cx="5622350" cy="3858125"/>
           </a:xfrm>
           <a:prstGeom prst="rect">
             <a:avLst/>
@@ -10765,7 +9782,7 @@
             </a:pPr>
             <a:r>
               <a:rPr lang="en"/>
-              <a:t>UI Prototype showcase</a:t>
+              <a:t>Architecture review + tech stack</a:t>
             </a:r>
             <a:endParaRPr/>
           </a:p>
@@ -10974,12 +9991,281 @@
           <p:cNvPr id="169" name="Google Shape;169;p32"/>
           <p:cNvSpPr txBox="1"/>
           <p:nvPr>
+            <p:ph idx="1" type="body"/>
+          </p:nvPr>
+        </p:nvSpPr>
+        <p:spPr>
+          <a:xfrm>
+            <a:off x="311700" y="1152475"/>
+            <a:ext cx="8520600" cy="3416400"/>
+          </a:xfrm>
+          <a:prstGeom prst="rect">
+            <a:avLst/>
+          </a:prstGeom>
+        </p:spPr>
+        <p:txBody>
+          <a:bodyPr anchorCtr="0" anchor="t" bIns="91425" lIns="91425" spcFirstLastPara="1" rIns="91425" wrap="square" tIns="91425">
+            <a:normAutofit/>
+          </a:bodyPr>
+          <a:lstStyle/>
+          <a:p>
+            <a:pPr indent="0" lvl="0" marL="0" rtl="0" algn="just">
+              <a:spcBef>
+                <a:spcPts val="0"/>
+              </a:spcBef>
+              <a:spcAft>
+                <a:spcPts val="0"/>
+              </a:spcAft>
+              <a:buClr>
+                <a:schemeClr val="dk1"/>
+              </a:buClr>
+              <a:buSzPts val="1100"/>
+              <a:buFont typeface="Arial"/>
+              <a:buNone/>
+            </a:pPr>
+            <a:r>
+              <a:rPr lang="en">
+                <a:solidFill>
+                  <a:schemeClr val="dk1"/>
+                </a:solidFill>
+              </a:rPr>
+              <a:t>Updated our viewpoints to the 4+1 view model</a:t>
+            </a:r>
+            <a:endParaRPr>
+              <a:solidFill>
+                <a:schemeClr val="dk1"/>
+              </a:solidFill>
+            </a:endParaRPr>
+          </a:p>
+          <a:p>
+            <a:pPr indent="0" lvl="0" marL="0" rtl="0" algn="just">
+              <a:spcBef>
+                <a:spcPts val="0"/>
+              </a:spcBef>
+              <a:spcAft>
+                <a:spcPts val="0"/>
+              </a:spcAft>
+              <a:buClr>
+                <a:schemeClr val="dk1"/>
+              </a:buClr>
+              <a:buSzPts val="1100"/>
+              <a:buFont typeface="Arial"/>
+              <a:buNone/>
+            </a:pPr>
+            <a:r>
+              <a:rPr lang="en">
+                <a:solidFill>
+                  <a:schemeClr val="dk1"/>
+                </a:solidFill>
+              </a:rPr>
+              <a:t>The following 5 viewpoints have been identified to describe CovidTracker:</a:t>
+            </a:r>
+            <a:endParaRPr>
+              <a:solidFill>
+                <a:schemeClr val="dk1"/>
+              </a:solidFill>
+            </a:endParaRPr>
+          </a:p>
+          <a:p>
+            <a:pPr indent="-342900" lvl="0" marL="457200" rtl="0" algn="just">
+              <a:spcBef>
+                <a:spcPts val="0"/>
+              </a:spcBef>
+              <a:spcAft>
+                <a:spcPts val="0"/>
+              </a:spcAft>
+              <a:buClr>
+                <a:schemeClr val="dk1"/>
+              </a:buClr>
+              <a:buSzPts val="1800"/>
+              <a:buChar char="-"/>
+            </a:pPr>
+            <a:r>
+              <a:rPr lang="en">
+                <a:solidFill>
+                  <a:schemeClr val="dk1"/>
+                </a:solidFill>
+              </a:rPr>
+              <a:t>Scenarios</a:t>
+            </a:r>
+            <a:endParaRPr>
+              <a:solidFill>
+                <a:schemeClr val="dk1"/>
+              </a:solidFill>
+            </a:endParaRPr>
+          </a:p>
+          <a:p>
+            <a:pPr indent="-342900" lvl="0" marL="457200" rtl="0" algn="just">
+              <a:spcBef>
+                <a:spcPts val="0"/>
+              </a:spcBef>
+              <a:spcAft>
+                <a:spcPts val="0"/>
+              </a:spcAft>
+              <a:buClr>
+                <a:schemeClr val="dk1"/>
+              </a:buClr>
+              <a:buSzPts val="1800"/>
+              <a:buChar char="-"/>
+            </a:pPr>
+            <a:r>
+              <a:rPr lang="en">
+                <a:solidFill>
+                  <a:schemeClr val="dk1"/>
+                </a:solidFill>
+              </a:rPr>
+              <a:t>Development View</a:t>
+            </a:r>
+            <a:endParaRPr>
+              <a:solidFill>
+                <a:schemeClr val="dk1"/>
+              </a:solidFill>
+            </a:endParaRPr>
+          </a:p>
+          <a:p>
+            <a:pPr indent="-342900" lvl="0" marL="457200" rtl="0" algn="just">
+              <a:spcBef>
+                <a:spcPts val="0"/>
+              </a:spcBef>
+              <a:spcAft>
+                <a:spcPts val="0"/>
+              </a:spcAft>
+              <a:buClr>
+                <a:schemeClr val="dk1"/>
+              </a:buClr>
+              <a:buSzPts val="1800"/>
+              <a:buChar char="-"/>
+            </a:pPr>
+            <a:r>
+              <a:rPr lang="en">
+                <a:solidFill>
+                  <a:schemeClr val="dk1"/>
+                </a:solidFill>
+              </a:rPr>
+              <a:t>Logical View</a:t>
+            </a:r>
+            <a:endParaRPr>
+              <a:solidFill>
+                <a:schemeClr val="dk1"/>
+              </a:solidFill>
+            </a:endParaRPr>
+          </a:p>
+          <a:p>
+            <a:pPr indent="-342900" lvl="0" marL="457200" rtl="0" algn="just">
+              <a:spcBef>
+                <a:spcPts val="0"/>
+              </a:spcBef>
+              <a:spcAft>
+                <a:spcPts val="0"/>
+              </a:spcAft>
+              <a:buClr>
+                <a:schemeClr val="dk1"/>
+              </a:buClr>
+              <a:buSzPts val="1800"/>
+              <a:buChar char="-"/>
+            </a:pPr>
+            <a:r>
+              <a:rPr lang="en">
+                <a:solidFill>
+                  <a:schemeClr val="dk1"/>
+                </a:solidFill>
+              </a:rPr>
+              <a:t>Process View</a:t>
+            </a:r>
+            <a:endParaRPr>
+              <a:solidFill>
+                <a:schemeClr val="dk1"/>
+              </a:solidFill>
+            </a:endParaRPr>
+          </a:p>
+          <a:p>
+            <a:pPr indent="-342900" lvl="0" marL="457200" rtl="0" algn="just">
+              <a:spcBef>
+                <a:spcPts val="0"/>
+              </a:spcBef>
+              <a:spcAft>
+                <a:spcPts val="0"/>
+              </a:spcAft>
+              <a:buClr>
+                <a:schemeClr val="dk1"/>
+              </a:buClr>
+              <a:buSzPts val="1800"/>
+              <a:buChar char="-"/>
+            </a:pPr>
+            <a:r>
+              <a:rPr lang="en">
+                <a:solidFill>
+                  <a:schemeClr val="dk1"/>
+                </a:solidFill>
+              </a:rPr>
+              <a:t>Physical View</a:t>
+            </a:r>
+            <a:endParaRPr>
+              <a:solidFill>
+                <a:schemeClr val="dk1"/>
+              </a:solidFill>
+            </a:endParaRPr>
+          </a:p>
+          <a:p>
+            <a:pPr indent="0" lvl="0" marL="0" rtl="0" algn="just">
+              <a:spcBef>
+                <a:spcPts val="0"/>
+              </a:spcBef>
+              <a:spcAft>
+                <a:spcPts val="0"/>
+              </a:spcAft>
+              <a:buNone/>
+            </a:pPr>
+            <a:r>
+              <a:t/>
+            </a:r>
+            <a:endParaRPr>
+              <a:solidFill>
+                <a:schemeClr val="dk1"/>
+              </a:solidFill>
+            </a:endParaRPr>
+          </a:p>
+          <a:p>
+            <a:pPr indent="-342900" lvl="0" marL="457200" rtl="0" algn="just">
+              <a:spcBef>
+                <a:spcPts val="0"/>
+              </a:spcBef>
+              <a:spcAft>
+                <a:spcPts val="0"/>
+              </a:spcAft>
+              <a:buClr>
+                <a:schemeClr val="dk1"/>
+              </a:buClr>
+              <a:buSzPts val="1800"/>
+              <a:buChar char="-"/>
+            </a:pPr>
+            <a:r>
+              <a:rPr lang="en">
+                <a:solidFill>
+                  <a:schemeClr val="dk1"/>
+                </a:solidFill>
+              </a:rPr>
+              <a:t>All the diagrams can be seen in the document, let me know if you want to reference any of them</a:t>
+            </a:r>
+            <a:endParaRPr>
+              <a:solidFill>
+                <a:schemeClr val="dk1"/>
+              </a:solidFill>
+            </a:endParaRPr>
+          </a:p>
+        </p:txBody>
+      </p:sp>
+      <p:sp>
+        <p:nvSpPr>
+          <p:cNvPr id="170" name="Google Shape;170;p32"/>
+          <p:cNvSpPr txBox="1"/>
+          <p:nvPr>
             <p:ph type="title"/>
           </p:nvPr>
         </p:nvSpPr>
         <p:spPr>
           <a:xfrm>
-            <a:off x="311700" y="2285400"/>
+            <a:off x="311700" y="445025"/>
             <a:ext cx="8520600" cy="572700"/>
           </a:xfrm>
           <a:prstGeom prst="rect">
@@ -10992,7 +10278,7 @@
           </a:bodyPr>
           <a:lstStyle/>
           <a:p>
-            <a:pPr indent="0" lvl="0" marL="0" rtl="0" algn="ctr">
+            <a:pPr indent="0" lvl="0" marL="0" rtl="0" algn="l">
               <a:spcBef>
                 <a:spcPts val="0"/>
               </a:spcBef>
@@ -11003,11 +10289,7 @@
             </a:pPr>
             <a:r>
               <a:rPr lang="en"/>
-              <a:t>Let's</a:t>
-            </a:r>
-            <a:r>
-              <a:rPr lang="en"/>
-              <a:t> go into Figma and see the UI mockups and interactive prototypes</a:t>
+              <a:t>Our systems viewpoints</a:t>
             </a:r>
             <a:endParaRPr/>
           </a:p>
@@ -11026,7 +10308,7 @@
   <p:cSld>
     <p:spTree>
       <p:nvGrpSpPr>
-        <p:cNvPr id="173" name="Shape 173"/>
+        <p:cNvPr id="174" name="Shape 174"/>
         <p:cNvGrpSpPr/>
         <p:nvPr/>
       </p:nvGrpSpPr>
@@ -11040,7 +10322,7 @@
       </p:grpSpPr>
       <p:sp>
         <p:nvSpPr>
-          <p:cNvPr id="174" name="Google Shape;174;p33"/>
+          <p:cNvPr id="175" name="Google Shape;175;p33"/>
           <p:cNvSpPr txBox="1"/>
           <p:nvPr>
             <p:ph type="title"/>
@@ -11048,36 +10330,161 @@
         </p:nvSpPr>
         <p:spPr>
           <a:xfrm>
-            <a:off x="311700" y="2150850"/>
-            <a:ext cx="8520600" cy="841800"/>
+            <a:off x="311700" y="445025"/>
+            <a:ext cx="8520600" cy="572700"/>
           </a:xfrm>
           <a:prstGeom prst="rect">
             <a:avLst/>
           </a:prstGeom>
         </p:spPr>
         <p:txBody>
-          <a:bodyPr anchorCtr="0" anchor="ctr" bIns="91425" lIns="91425" spcFirstLastPara="1" rIns="91425" wrap="square" tIns="91425">
+          <a:bodyPr anchorCtr="0" anchor="t" bIns="91425" lIns="91425" spcFirstLastPara="1" rIns="91425" wrap="square" tIns="91425">
+            <a:normAutofit fontScale="90000"/>
+          </a:bodyPr>
+          <a:lstStyle/>
+          <a:p>
+            <a:pPr indent="0" lvl="0" marL="0" rtl="0" algn="l">
+              <a:spcBef>
+                <a:spcPts val="0"/>
+              </a:spcBef>
+              <a:spcAft>
+                <a:spcPts val="0"/>
+              </a:spcAft>
+              <a:buNone/>
+            </a:pPr>
+            <a:r>
+              <a:rPr lang="en"/>
+              <a:t>Deployment</a:t>
+            </a:r>
+            <a:endParaRPr/>
+          </a:p>
+        </p:txBody>
+      </p:sp>
+      <p:sp>
+        <p:nvSpPr>
+          <p:cNvPr id="176" name="Google Shape;176;p33"/>
+          <p:cNvSpPr txBox="1"/>
+          <p:nvPr>
+            <p:ph idx="1" type="body"/>
+          </p:nvPr>
+        </p:nvSpPr>
+        <p:spPr>
+          <a:xfrm>
+            <a:off x="311700" y="1152475"/>
+            <a:ext cx="8520600" cy="3416400"/>
+          </a:xfrm>
+          <a:prstGeom prst="rect">
+            <a:avLst/>
+          </a:prstGeom>
+        </p:spPr>
+        <p:txBody>
+          <a:bodyPr anchorCtr="0" anchor="t" bIns="91425" lIns="91425" spcFirstLastPara="1" rIns="91425" wrap="square" tIns="91425">
             <a:normAutofit/>
           </a:bodyPr>
           <a:lstStyle/>
           <a:p>
-            <a:pPr indent="0" lvl="0" marL="0" rtl="0" algn="ctr">
-              <a:spcBef>
-                <a:spcPts val="0"/>
-              </a:spcBef>
-              <a:spcAft>
-                <a:spcPts val="0"/>
-              </a:spcAft>
-              <a:buNone/>
+            <a:pPr indent="-342900" lvl="0" marL="457200" rtl="0" algn="l">
+              <a:spcBef>
+                <a:spcPts val="0"/>
+              </a:spcBef>
+              <a:spcAft>
+                <a:spcPts val="0"/>
+              </a:spcAft>
+              <a:buSzPts val="1800"/>
+              <a:buChar char="-"/>
             </a:pPr>
             <a:r>
               <a:rPr lang="en"/>
-              <a:t>Architecture review + tech stack</a:t>
+              <a:t>Deployed on S3 + ECS</a:t>
+            </a:r>
+            <a:endParaRPr/>
+          </a:p>
+          <a:p>
+            <a:pPr indent="-342900" lvl="0" marL="457200" rtl="0" algn="l">
+              <a:spcBef>
+                <a:spcPts val="0"/>
+              </a:spcBef>
+              <a:spcAft>
+                <a:spcPts val="0"/>
+              </a:spcAft>
+              <a:buSzPts val="1800"/>
+              <a:buChar char="-"/>
+            </a:pPr>
+            <a:r>
+              <a:rPr lang="en" u="sng">
+                <a:solidFill>
+                  <a:schemeClr val="hlink"/>
+                </a:solidFill>
+                <a:hlinkClick r:id="rId3"/>
+              </a:rPr>
+              <a:t>http://covid-tracker-client-bucket.s3-website.us-east-2.amazonaws.com/</a:t>
+            </a:r>
+            <a:r>
+              <a:rPr lang="en"/>
+              <a:t> </a:t>
+            </a:r>
+            <a:endParaRPr/>
+          </a:p>
+          <a:p>
+            <a:pPr indent="0" lvl="0" marL="457200" rtl="0" algn="l">
+              <a:spcBef>
+                <a:spcPts val="1200"/>
+              </a:spcBef>
+              <a:spcAft>
+                <a:spcPts val="0"/>
+              </a:spcAft>
+              <a:buNone/>
+            </a:pPr>
+            <a:r>
+              <a:t/>
+            </a:r>
+            <a:endParaRPr/>
+          </a:p>
+          <a:p>
+            <a:pPr indent="0" lvl="0" marL="457200" rtl="0" algn="l">
+              <a:spcBef>
+                <a:spcPts val="1200"/>
+              </a:spcBef>
+              <a:spcAft>
+                <a:spcPts val="1200"/>
+              </a:spcAft>
+              <a:buNone/>
+            </a:pPr>
+            <a:r>
+              <a:t/>
             </a:r>
             <a:endParaRPr/>
           </a:p>
         </p:txBody>
       </p:sp>
+      <p:pic>
+        <p:nvPicPr>
+          <p:cNvPr id="177" name="Google Shape;177;p33"/>
+          <p:cNvPicPr preferRelativeResize="0"/>
+          <p:nvPr/>
+        </p:nvPicPr>
+        <p:blipFill>
+          <a:blip r:embed="rId4">
+            <a:alphaModFix/>
+          </a:blip>
+          <a:stretch>
+            <a:fillRect/>
+          </a:stretch>
+        </p:blipFill>
+        <p:spPr>
+          <a:xfrm>
+            <a:off x="728578" y="2211303"/>
+            <a:ext cx="7686825" cy="2594775"/>
+          </a:xfrm>
+          <a:prstGeom prst="rect">
+            <a:avLst/>
+          </a:prstGeom>
+          <a:noFill/>
+          <a:ln>
+            <a:noFill/>
+          </a:ln>
+        </p:spPr>
+      </p:pic>
     </p:spTree>
   </p:cSld>
   <p:clrMapOvr>
@@ -11091,7 +10498,7 @@
   <p:cSld>
     <p:spTree>
       <p:nvGrpSpPr>
-        <p:cNvPr id="178" name="Shape 178"/>
+        <p:cNvPr id="181" name="Shape 181"/>
         <p:cNvGrpSpPr/>
         <p:nvPr/>
       </p:nvGrpSpPr>
@@ -11105,268 +10512,28 @@
       </p:grpSpPr>
       <p:sp>
         <p:nvSpPr>
-          <p:cNvPr id="179" name="Google Shape;179;p34"/>
+          <p:cNvPr id="182" name="Google Shape;182;p34"/>
           <p:cNvSpPr txBox="1"/>
           <p:nvPr>
-            <p:ph idx="1" type="body"/>
-          </p:nvPr>
-        </p:nvSpPr>
-        <p:spPr>
-          <a:xfrm>
-            <a:off x="311700" y="1152475"/>
-            <a:ext cx="8520600" cy="3416400"/>
+            <p:ph type="title"/>
+          </p:nvPr>
+        </p:nvSpPr>
+        <p:spPr>
+          <a:xfrm>
+            <a:off x="311700" y="2150850"/>
+            <a:ext cx="8520600" cy="841800"/>
           </a:xfrm>
           <a:prstGeom prst="rect">
             <a:avLst/>
           </a:prstGeom>
         </p:spPr>
         <p:txBody>
-          <a:bodyPr anchorCtr="0" anchor="t" bIns="91425" lIns="91425" spcFirstLastPara="1" rIns="91425" wrap="square" tIns="91425">
+          <a:bodyPr anchorCtr="0" anchor="ctr" bIns="91425" lIns="91425" spcFirstLastPara="1" rIns="91425" wrap="square" tIns="91425">
             <a:normAutofit/>
           </a:bodyPr>
           <a:lstStyle/>
           <a:p>
-            <a:pPr indent="0" lvl="0" marL="0" rtl="0" algn="just">
-              <a:spcBef>
-                <a:spcPts val="0"/>
-              </a:spcBef>
-              <a:spcAft>
-                <a:spcPts val="0"/>
-              </a:spcAft>
-              <a:buClr>
-                <a:schemeClr val="dk1"/>
-              </a:buClr>
-              <a:buSzPts val="1100"/>
-              <a:buFont typeface="Arial"/>
-              <a:buNone/>
-            </a:pPr>
-            <a:r>
-              <a:rPr lang="en">
-                <a:solidFill>
-                  <a:schemeClr val="dk1"/>
-                </a:solidFill>
-              </a:rPr>
-              <a:t>The following 5 viewpoints have been identified to describe CovidTracker:</a:t>
-            </a:r>
-            <a:endParaRPr>
-              <a:solidFill>
-                <a:schemeClr val="dk1"/>
-              </a:solidFill>
-            </a:endParaRPr>
-          </a:p>
-          <a:p>
-            <a:pPr indent="-342900" lvl="0" marL="457200" rtl="0" algn="just">
-              <a:spcBef>
-                <a:spcPts val="0"/>
-              </a:spcBef>
-              <a:spcAft>
-                <a:spcPts val="0"/>
-              </a:spcAft>
-              <a:buClr>
-                <a:schemeClr val="dk1"/>
-              </a:buClr>
-              <a:buSzPts val="1800"/>
-              <a:buChar char="-"/>
-            </a:pPr>
-            <a:r>
-              <a:rPr lang="en">
-                <a:solidFill>
-                  <a:schemeClr val="dk1"/>
-                </a:solidFill>
-              </a:rPr>
-              <a:t>Context</a:t>
-            </a:r>
-            <a:endParaRPr>
-              <a:solidFill>
-                <a:schemeClr val="dk1"/>
-              </a:solidFill>
-            </a:endParaRPr>
-          </a:p>
-          <a:p>
-            <a:pPr indent="-342900" lvl="0" marL="457200" rtl="0" algn="just">
-              <a:spcBef>
-                <a:spcPts val="0"/>
-              </a:spcBef>
-              <a:spcAft>
-                <a:spcPts val="0"/>
-              </a:spcAft>
-              <a:buClr>
-                <a:schemeClr val="dk1"/>
-              </a:buClr>
-              <a:buSzPts val="1800"/>
-              <a:buChar char="-"/>
-            </a:pPr>
-            <a:r>
-              <a:rPr lang="en">
-                <a:solidFill>
-                  <a:schemeClr val="dk1"/>
-                </a:solidFill>
-              </a:rPr>
-              <a:t>Functional</a:t>
-            </a:r>
-            <a:endParaRPr>
-              <a:solidFill>
-                <a:schemeClr val="dk1"/>
-              </a:solidFill>
-            </a:endParaRPr>
-          </a:p>
-          <a:p>
-            <a:pPr indent="-342900" lvl="0" marL="457200" rtl="0" algn="just">
-              <a:spcBef>
-                <a:spcPts val="0"/>
-              </a:spcBef>
-              <a:spcAft>
-                <a:spcPts val="0"/>
-              </a:spcAft>
-              <a:buClr>
-                <a:schemeClr val="dk1"/>
-              </a:buClr>
-              <a:buSzPts val="1800"/>
-              <a:buChar char="-"/>
-            </a:pPr>
-            <a:r>
-              <a:rPr lang="en">
-                <a:solidFill>
-                  <a:schemeClr val="dk1"/>
-                </a:solidFill>
-              </a:rPr>
-              <a:t>Information</a:t>
-            </a:r>
-            <a:endParaRPr>
-              <a:solidFill>
-                <a:schemeClr val="dk1"/>
-              </a:solidFill>
-            </a:endParaRPr>
-          </a:p>
-          <a:p>
-            <a:pPr indent="-342900" lvl="0" marL="457200" rtl="0" algn="just">
-              <a:spcBef>
-                <a:spcPts val="0"/>
-              </a:spcBef>
-              <a:spcAft>
-                <a:spcPts val="0"/>
-              </a:spcAft>
-              <a:buClr>
-                <a:schemeClr val="dk1"/>
-              </a:buClr>
-              <a:buSzPts val="1800"/>
-              <a:buChar char="-"/>
-            </a:pPr>
-            <a:r>
-              <a:rPr lang="en">
-                <a:solidFill>
-                  <a:schemeClr val="dk1"/>
-                </a:solidFill>
-              </a:rPr>
-              <a:t>Development</a:t>
-            </a:r>
-            <a:endParaRPr>
-              <a:solidFill>
-                <a:schemeClr val="dk1"/>
-              </a:solidFill>
-            </a:endParaRPr>
-          </a:p>
-          <a:p>
-            <a:pPr indent="-342900" lvl="0" marL="457200" rtl="0" algn="just">
-              <a:spcBef>
-                <a:spcPts val="0"/>
-              </a:spcBef>
-              <a:spcAft>
-                <a:spcPts val="0"/>
-              </a:spcAft>
-              <a:buClr>
-                <a:schemeClr val="dk1"/>
-              </a:buClr>
-              <a:buSzPts val="1800"/>
-              <a:buChar char="-"/>
-            </a:pPr>
-            <a:r>
-              <a:rPr lang="en">
-                <a:solidFill>
-                  <a:schemeClr val="dk1"/>
-                </a:solidFill>
-              </a:rPr>
-              <a:t>Deployment</a:t>
-            </a:r>
-            <a:endParaRPr>
-              <a:solidFill>
-                <a:schemeClr val="dk1"/>
-              </a:solidFill>
-            </a:endParaRPr>
-          </a:p>
-          <a:p>
-            <a:pPr indent="0" lvl="0" marL="0" rtl="0" algn="just">
-              <a:spcBef>
-                <a:spcPts val="0"/>
-              </a:spcBef>
-              <a:spcAft>
-                <a:spcPts val="0"/>
-              </a:spcAft>
-              <a:buNone/>
-            </a:pPr>
-            <a:r>
-              <a:t/>
-            </a:r>
-            <a:endParaRPr>
-              <a:solidFill>
-                <a:schemeClr val="dk1"/>
-              </a:solidFill>
-            </a:endParaRPr>
-          </a:p>
-          <a:p>
-            <a:pPr indent="-342900" lvl="0" marL="457200" rtl="0" algn="just">
-              <a:spcBef>
-                <a:spcPts val="0"/>
-              </a:spcBef>
-              <a:spcAft>
-                <a:spcPts val="0"/>
-              </a:spcAft>
-              <a:buClr>
-                <a:schemeClr val="dk1"/>
-              </a:buClr>
-              <a:buSzPts val="1800"/>
-              <a:buChar char="-"/>
-            </a:pPr>
-            <a:r>
-              <a:rPr lang="en">
-                <a:solidFill>
-                  <a:schemeClr val="dk1"/>
-                </a:solidFill>
-              </a:rPr>
-              <a:t>All the diagrams can be seen in the document, let me know if you want to reference any of them</a:t>
-            </a:r>
-            <a:endParaRPr>
-              <a:solidFill>
-                <a:schemeClr val="dk1"/>
-              </a:solidFill>
-            </a:endParaRPr>
-          </a:p>
-        </p:txBody>
-      </p:sp>
-      <p:sp>
-        <p:nvSpPr>
-          <p:cNvPr id="180" name="Google Shape;180;p34"/>
-          <p:cNvSpPr txBox="1"/>
-          <p:nvPr>
-            <p:ph type="title"/>
-          </p:nvPr>
-        </p:nvSpPr>
-        <p:spPr>
-          <a:xfrm>
-            <a:off x="311700" y="445025"/>
-            <a:ext cx="8520600" cy="572700"/>
-          </a:xfrm>
-          <a:prstGeom prst="rect">
-            <a:avLst/>
-          </a:prstGeom>
-        </p:spPr>
-        <p:txBody>
-          <a:bodyPr anchorCtr="0" anchor="t" bIns="91425" lIns="91425" spcFirstLastPara="1" rIns="91425" wrap="square" tIns="91425">
-            <a:normAutofit fontScale="90000"/>
-          </a:bodyPr>
-          <a:lstStyle/>
-          <a:p>
-            <a:pPr indent="0" lvl="0" marL="0" rtl="0" algn="l">
+            <a:pPr indent="0" lvl="0" marL="0" rtl="0" algn="ctr">
               <a:spcBef>
                 <a:spcPts val="0"/>
               </a:spcBef>
@@ -11377,7 +10544,7 @@
             </a:pPr>
             <a:r>
               <a:rPr lang="en"/>
-              <a:t>Our systems viewpoints</a:t>
+              <a:t>Testing plan</a:t>
             </a:r>
             <a:endParaRPr/>
           </a:p>
@@ -11396,7 +10563,7 @@
   <p:cSld>
     <p:spTree>
       <p:nvGrpSpPr>
-        <p:cNvPr id="184" name="Shape 184"/>
+        <p:cNvPr id="186" name="Shape 186"/>
         <p:cNvGrpSpPr/>
         <p:nvPr/>
       </p:nvGrpSpPr>
@@ -11410,7 +10577,7 @@
       </p:grpSpPr>
       <p:sp>
         <p:nvSpPr>
-          <p:cNvPr id="185" name="Google Shape;185;p35"/>
+          <p:cNvPr id="187" name="Google Shape;187;p35"/>
           <p:cNvSpPr txBox="1"/>
           <p:nvPr>
             <p:ph type="title"/>
@@ -11442,7 +10609,7 @@
             </a:pPr>
             <a:r>
               <a:rPr lang="en"/>
-              <a:t>Context Viewpoint</a:t>
+              <a:t>Our testing plan</a:t>
             </a:r>
             <a:endParaRPr/>
           </a:p>
@@ -11450,7 +10617,7 @@
       </p:sp>
       <p:sp>
         <p:nvSpPr>
-          <p:cNvPr id="186" name="Google Shape;186;p35"/>
+          <p:cNvPr id="188" name="Google Shape;188;p35"/>
           <p:cNvSpPr txBox="1"/>
           <p:nvPr>
             <p:ph idx="1" type="body"/>
@@ -11467,13 +10634,29 @@
         </p:spPr>
         <p:txBody>
           <a:bodyPr anchorCtr="0" anchor="t" bIns="91425" lIns="91425" spcFirstLastPara="1" rIns="91425" wrap="square" tIns="91425">
-            <a:normAutofit/>
+            <a:normAutofit lnSpcReduction="10000"/>
           </a:bodyPr>
           <a:lstStyle/>
           <a:p>
+            <a:pPr indent="0" lvl="0" marL="0" rtl="0" algn="l">
+              <a:spcBef>
+                <a:spcPts val="0"/>
+              </a:spcBef>
+              <a:spcAft>
+                <a:spcPts val="0"/>
+              </a:spcAft>
+              <a:buNone/>
+            </a:pPr>
+            <a:r>
+              <a:rPr lang="en"/>
+              <a:t>We have identified 4 types of tests for our system</a:t>
+            </a:r>
+            <a:endParaRPr/>
+          </a:p>
+          <a:p>
             <a:pPr indent="-342900" lvl="0" marL="457200" rtl="0" algn="l">
               <a:spcBef>
-                <a:spcPts val="0"/>
+                <a:spcPts val="1200"/>
               </a:spcBef>
               <a:spcAft>
                 <a:spcPts val="0"/>
@@ -11483,7 +10666,7 @@
             </a:pPr>
             <a:r>
               <a:rPr lang="en"/>
-              <a:t>System Context Diagram</a:t>
+              <a:t>Unit tests</a:t>
             </a:r>
             <a:endParaRPr/>
           </a:p>
@@ -11500,24 +10683,101 @@
             </a:pPr>
             <a:r>
               <a:rPr lang="en"/>
-              <a:t>Use Case Diagrams</a:t>
-            </a:r>
-            <a:endParaRPr/>
-          </a:p>
-          <a:p>
-            <a:pPr indent="-317500" lvl="1" marL="914400" rtl="0" algn="l">
-              <a:spcBef>
-                <a:spcPts val="0"/>
-              </a:spcBef>
-              <a:spcAft>
-                <a:spcPts val="0"/>
-              </a:spcAft>
-              <a:buSzPts val="1400"/>
+              <a:t>Integration tests</a:t>
+            </a:r>
+            <a:endParaRPr/>
+          </a:p>
+          <a:p>
+            <a:pPr indent="-342900" lvl="0" marL="457200" rtl="0" algn="l">
+              <a:spcBef>
+                <a:spcPts val="0"/>
+              </a:spcBef>
+              <a:spcAft>
+                <a:spcPts val="0"/>
+              </a:spcAft>
+              <a:buSzPts val="1800"/>
               <a:buChar char="-"/>
             </a:pPr>
             <a:r>
               <a:rPr lang="en"/>
-              <a:t>Split by user role</a:t>
+              <a:t>System tests</a:t>
+            </a:r>
+            <a:endParaRPr/>
+          </a:p>
+          <a:p>
+            <a:pPr indent="-342900" lvl="0" marL="457200" rtl="0" algn="l">
+              <a:spcBef>
+                <a:spcPts val="0"/>
+              </a:spcBef>
+              <a:spcAft>
+                <a:spcPts val="0"/>
+              </a:spcAft>
+              <a:buSzPts val="1800"/>
+              <a:buChar char="-"/>
+            </a:pPr>
+            <a:r>
+              <a:rPr lang="en"/>
+              <a:t>Acceptance</a:t>
+            </a:r>
+            <a:r>
+              <a:rPr lang="en"/>
+              <a:t> tests</a:t>
+            </a:r>
+            <a:endParaRPr/>
+          </a:p>
+          <a:p>
+            <a:pPr indent="0" lvl="0" marL="0" rtl="0" algn="l">
+              <a:spcBef>
+                <a:spcPts val="1200"/>
+              </a:spcBef>
+              <a:spcAft>
+                <a:spcPts val="0"/>
+              </a:spcAft>
+              <a:buNone/>
+            </a:pPr>
+            <a:r>
+              <a:rPr lang="en"/>
+              <a:t>Most are automated some are manual</a:t>
+            </a:r>
+            <a:endParaRPr/>
+          </a:p>
+          <a:p>
+            <a:pPr indent="0" lvl="0" marL="0" rtl="0" algn="l">
+              <a:spcBef>
+                <a:spcPts val="1200"/>
+              </a:spcBef>
+              <a:spcAft>
+                <a:spcPts val="0"/>
+              </a:spcAft>
+              <a:buNone/>
+            </a:pPr>
+            <a:r>
+              <a:rPr lang="en"/>
+              <a:t>Some have output reports</a:t>
+            </a:r>
+            <a:endParaRPr/>
+          </a:p>
+          <a:p>
+            <a:pPr indent="0" lvl="0" marL="0" rtl="0" algn="l">
+              <a:spcBef>
+                <a:spcPts val="1200"/>
+              </a:spcBef>
+              <a:spcAft>
+                <a:spcPts val="1200"/>
+              </a:spcAft>
+              <a:buNone/>
+            </a:pPr>
+            <a:r>
+              <a:rPr lang="en"/>
+              <a:t>**More about the specific packages we use for our testing framework </a:t>
+            </a:r>
+            <a:r>
+              <a:rPr lang="en"/>
+              <a:t>and a comparison between all of them</a:t>
+            </a:r>
+            <a:r>
+              <a:rPr lang="en"/>
+              <a:t> can be found in the document**</a:t>
             </a:r>
             <a:endParaRPr/>
           </a:p>
@@ -11536,7 +10796,7 @@
   <p:cSld>
     <p:spTree>
       <p:nvGrpSpPr>
-        <p:cNvPr id="190" name="Shape 190"/>
+        <p:cNvPr id="192" name="Shape 192"/>
         <p:cNvGrpSpPr/>
         <p:nvPr/>
       </p:nvGrpSpPr>
@@ -11550,7 +10810,7 @@
       </p:grpSpPr>
       <p:sp>
         <p:nvSpPr>
-          <p:cNvPr id="191" name="Google Shape;191;p36"/>
+          <p:cNvPr id="193" name="Google Shape;193;p36"/>
           <p:cNvSpPr txBox="1"/>
           <p:nvPr>
             <p:ph type="title"/>
@@ -11582,7 +10842,7 @@
             </a:pPr>
             <a:r>
               <a:rPr lang="en"/>
-              <a:t>Functional Viewpoint</a:t>
+              <a:t>Unit test report</a:t>
             </a:r>
             <a:endParaRPr/>
           </a:p>
@@ -11590,7 +10850,7 @@
       </p:sp>
       <p:sp>
         <p:nvSpPr>
-          <p:cNvPr id="192" name="Google Shape;192;p36"/>
+          <p:cNvPr id="194" name="Google Shape;194;p36"/>
           <p:cNvSpPr txBox="1"/>
           <p:nvPr>
             <p:ph idx="1" type="body"/>
@@ -11599,7 +10859,7 @@
         <p:spPr>
           <a:xfrm>
             <a:off x="311700" y="1152475"/>
-            <a:ext cx="8520600" cy="3416400"/>
+            <a:ext cx="4020900" cy="3416400"/>
           </a:xfrm>
           <a:prstGeom prst="rect">
             <a:avLst/>
@@ -11622,14 +10882,26 @@
               <a:buChar char="-"/>
             </a:pPr>
             <a:r>
-              <a:rPr lang="en"/>
-              <a:t>Component</a:t>
-            </a:r>
-            <a:r>
-              <a:rPr lang="en"/>
-              <a:t> Diagram</a:t>
-            </a:r>
-            <a:endParaRPr/>
+              <a:rPr lang="en">
+                <a:highlight>
+                  <a:srgbClr val="00FF00"/>
+                </a:highlight>
+              </a:rPr>
+              <a:t>91</a:t>
+            </a:r>
+            <a:r>
+              <a:rPr lang="en">
+                <a:highlight>
+                  <a:srgbClr val="00FF00"/>
+                </a:highlight>
+              </a:rPr>
+              <a:t> unit tests</a:t>
+            </a:r>
+            <a:endParaRPr>
+              <a:highlight>
+                <a:srgbClr val="00FF00"/>
+              </a:highlight>
+            </a:endParaRPr>
           </a:p>
           <a:p>
             <a:pPr indent="-342900" lvl="0" marL="457200" rtl="0" algn="l">
@@ -11643,13 +10915,87 @@
               <a:buChar char="-"/>
             </a:pPr>
             <a:r>
+              <a:rPr lang="en">
+                <a:highlight>
+                  <a:srgbClr val="00FF00"/>
+                </a:highlight>
+              </a:rPr>
+              <a:t>57 integration tests</a:t>
+            </a:r>
+            <a:endParaRPr>
+              <a:highlight>
+                <a:srgbClr val="00FF00"/>
+              </a:highlight>
+            </a:endParaRPr>
+          </a:p>
+          <a:p>
+            <a:pPr indent="-342900" lvl="0" marL="457200" rtl="0" algn="l">
+              <a:spcBef>
+                <a:spcPts val="0"/>
+              </a:spcBef>
+              <a:spcAft>
+                <a:spcPts val="0"/>
+              </a:spcAft>
+              <a:buSzPts val="1800"/>
+              <a:buChar char="-"/>
+            </a:pPr>
+            <a:r>
               <a:rPr lang="en"/>
-              <a:t>Architecture Level Component Diagram</a:t>
+              <a:t>41</a:t>
+            </a:r>
+            <a:r>
+              <a:rPr lang="en"/>
+              <a:t> test suites</a:t>
+            </a:r>
+            <a:endParaRPr/>
+          </a:p>
+          <a:p>
+            <a:pPr indent="-342900" lvl="0" marL="457200" rtl="0" algn="l">
+              <a:spcBef>
+                <a:spcPts val="0"/>
+              </a:spcBef>
+              <a:spcAft>
+                <a:spcPts val="0"/>
+              </a:spcAft>
+              <a:buSzPts val="1800"/>
+              <a:buChar char="-"/>
+            </a:pPr>
+            <a:r>
+              <a:rPr lang="en"/>
+              <a:t>0 failures</a:t>
             </a:r>
             <a:endParaRPr/>
           </a:p>
         </p:txBody>
       </p:sp>
+      <p:pic>
+        <p:nvPicPr>
+          <p:cNvPr id="195" name="Google Shape;195;p36"/>
+          <p:cNvPicPr preferRelativeResize="0"/>
+          <p:nvPr/>
+        </p:nvPicPr>
+        <p:blipFill>
+          <a:blip r:embed="rId3">
+            <a:alphaModFix/>
+          </a:blip>
+          <a:stretch>
+            <a:fillRect/>
+          </a:stretch>
+        </p:blipFill>
+        <p:spPr>
+          <a:xfrm>
+            <a:off x="4443425" y="0"/>
+            <a:ext cx="3990748" cy="5143500"/>
+          </a:xfrm>
+          <a:prstGeom prst="rect">
+            <a:avLst/>
+          </a:prstGeom>
+          <a:noFill/>
+          <a:ln>
+            <a:noFill/>
+          </a:ln>
+        </p:spPr>
+      </p:pic>
     </p:spTree>
   </p:cSld>
   <p:clrMapOvr>
@@ -11663,7 +11009,7 @@
   <p:cSld>
     <p:spTree>
       <p:nvGrpSpPr>
-        <p:cNvPr id="196" name="Shape 196"/>
+        <p:cNvPr id="199" name="Shape 199"/>
         <p:cNvGrpSpPr/>
         <p:nvPr/>
       </p:nvGrpSpPr>
@@ -11677,7 +11023,7 @@
       </p:grpSpPr>
       <p:sp>
         <p:nvSpPr>
-          <p:cNvPr id="197" name="Google Shape;197;p37"/>
+          <p:cNvPr id="200" name="Google Shape;200;p37"/>
           <p:cNvSpPr txBox="1"/>
           <p:nvPr>
             <p:ph type="title"/>
@@ -11709,7 +11055,7 @@
             </a:pPr>
             <a:r>
               <a:rPr lang="en"/>
-              <a:t>Information Viewpoint</a:t>
+              <a:t>Code coverage report</a:t>
             </a:r>
             <a:endParaRPr/>
           </a:p>
@@ -11717,7 +11063,7 @@
       </p:sp>
       <p:sp>
         <p:nvSpPr>
-          <p:cNvPr id="198" name="Google Shape;198;p37"/>
+          <p:cNvPr id="201" name="Google Shape;201;p37"/>
           <p:cNvSpPr txBox="1"/>
           <p:nvPr>
             <p:ph idx="1" type="body"/>
@@ -11738,24 +11084,50 @@
           </a:bodyPr>
           <a:lstStyle/>
           <a:p>
-            <a:pPr indent="-342900" lvl="0" marL="457200" rtl="0" algn="l">
-              <a:spcBef>
-                <a:spcPts val="0"/>
-              </a:spcBef>
-              <a:spcAft>
-                <a:spcPts val="0"/>
-              </a:spcAft>
-              <a:buSzPts val="1800"/>
-              <a:buChar char="-"/>
-            </a:pPr>
-            <a:r>
-              <a:rPr lang="en"/>
-              <a:t>Domain Model Diagram</a:t>
+            <a:pPr indent="0" lvl="0" marL="0" rtl="0" algn="l">
+              <a:spcBef>
+                <a:spcPts val="0"/>
+              </a:spcBef>
+              <a:spcAft>
+                <a:spcPts val="1200"/>
+              </a:spcAft>
+              <a:buNone/>
+            </a:pPr>
+            <a:r>
+              <a:t/>
             </a:r>
             <a:endParaRPr/>
           </a:p>
         </p:txBody>
       </p:sp>
+      <p:pic>
+        <p:nvPicPr>
+          <p:cNvPr id="202" name="Google Shape;202;p37"/>
+          <p:cNvPicPr preferRelativeResize="0"/>
+          <p:nvPr/>
+        </p:nvPicPr>
+        <p:blipFill>
+          <a:blip r:embed="rId3">
+            <a:alphaModFix/>
+          </a:blip>
+          <a:stretch>
+            <a:fillRect/>
+          </a:stretch>
+        </p:blipFill>
+        <p:spPr>
+          <a:xfrm>
+            <a:off x="1498346" y="1152475"/>
+            <a:ext cx="6147301" cy="3512726"/>
+          </a:xfrm>
+          <a:prstGeom prst="rect">
+            <a:avLst/>
+          </a:prstGeom>
+          <a:noFill/>
+          <a:ln>
+            <a:noFill/>
+          </a:ln>
+        </p:spPr>
+      </p:pic>
     </p:spTree>
   </p:cSld>
   <p:clrMapOvr>
@@ -11769,7 +11141,7 @@
   <p:cSld>
     <p:spTree>
       <p:nvGrpSpPr>
-        <p:cNvPr id="202" name="Shape 202"/>
+        <p:cNvPr id="206" name="Shape 206"/>
         <p:cNvGrpSpPr/>
         <p:nvPr/>
       </p:nvGrpSpPr>
@@ -11783,7 +11155,7 @@
       </p:grpSpPr>
       <p:sp>
         <p:nvSpPr>
-          <p:cNvPr id="203" name="Google Shape;203;p38"/>
+          <p:cNvPr id="207" name="Google Shape;207;p38"/>
           <p:cNvSpPr txBox="1"/>
           <p:nvPr>
             <p:ph type="title"/>
@@ -11815,7 +11187,7 @@
             </a:pPr>
             <a:r>
               <a:rPr lang="en"/>
-              <a:t>Development Viewpoint</a:t>
+              <a:t>Integration tests</a:t>
             </a:r>
             <a:endParaRPr/>
           </a:p>
@@ -11823,7 +11195,7 @@
       </p:sp>
       <p:sp>
         <p:nvSpPr>
-          <p:cNvPr id="204" name="Google Shape;204;p38"/>
+          <p:cNvPr id="208" name="Google Shape;208;p38"/>
           <p:cNvSpPr txBox="1"/>
           <p:nvPr>
             <p:ph idx="1" type="body"/>
@@ -11856,7 +11228,7 @@
             </a:pPr>
             <a:r>
               <a:rPr lang="en"/>
-              <a:t>Sequence Diagrams</a:t>
+              <a:t>Our integration tests are automated tests</a:t>
             </a:r>
             <a:endParaRPr/>
           </a:p>
@@ -11873,47 +11245,24 @@
             </a:pPr>
             <a:r>
               <a:rPr lang="en"/>
-              <a:t>Activity Diagrams</a:t>
-            </a:r>
-            <a:endParaRPr/>
-          </a:p>
-          <a:p>
-            <a:pPr indent="0" lvl="0" marL="0" rtl="0" algn="l">
-              <a:spcBef>
-                <a:spcPts val="1200"/>
-              </a:spcBef>
-              <a:spcAft>
-                <a:spcPts val="0"/>
-              </a:spcAft>
-              <a:buNone/>
-            </a:pPr>
-            <a:r>
-              <a:t/>
-            </a:r>
-            <a:endParaRPr/>
-          </a:p>
-          <a:p>
-            <a:pPr indent="-342900" lvl="0" marL="457200" rtl="0" algn="l">
-              <a:spcBef>
-                <a:spcPts val="1200"/>
-              </a:spcBef>
-              <a:spcAft>
-                <a:spcPts val="0"/>
-              </a:spcAft>
-              <a:buSzPts val="1800"/>
+              <a:t>The tests use a full PostgreSQL DB instance running in docker</a:t>
+            </a:r>
+            <a:endParaRPr/>
+          </a:p>
+          <a:p>
+            <a:pPr indent="-317500" lvl="1" marL="914400" rtl="0" algn="l">
+              <a:spcBef>
+                <a:spcPts val="0"/>
+              </a:spcBef>
+              <a:spcAft>
+                <a:spcPts val="0"/>
+              </a:spcAft>
+              <a:buSzPts val="1400"/>
               <a:buChar char="-"/>
             </a:pPr>
             <a:r>
               <a:rPr lang="en"/>
-              <a:t>This viewpoint is split by main development focuses (matches very </a:t>
-            </a:r>
-            <a:r>
-              <a:rPr lang="en"/>
-              <a:t>closely</a:t>
-            </a:r>
-            <a:r>
-              <a:rPr lang="en"/>
-              <a:t> with the structure of our projects epics)</a:t>
+              <a:t>We have written db initialization and seeding scripts to help scaffold the tests</a:t>
             </a:r>
             <a:endParaRPr/>
           </a:p>
@@ -11932,7 +11281,7 @@
   <p:cSld>
     <p:spTree>
       <p:nvGrpSpPr>
-        <p:cNvPr id="208" name="Shape 208"/>
+        <p:cNvPr id="212" name="Shape 212"/>
         <p:cNvGrpSpPr/>
         <p:nvPr/>
       </p:nvGrpSpPr>
@@ -11946,7 +11295,7 @@
       </p:grpSpPr>
       <p:sp>
         <p:nvSpPr>
-          <p:cNvPr id="209" name="Google Shape;209;p39"/>
+          <p:cNvPr id="213" name="Google Shape;213;p39"/>
           <p:cNvSpPr txBox="1"/>
           <p:nvPr>
             <p:ph type="title"/>
@@ -11978,7 +11327,7 @@
             </a:pPr>
             <a:r>
               <a:rPr lang="en"/>
-              <a:t>Deployment Viewpoint</a:t>
+              <a:t>System Tests</a:t>
             </a:r>
             <a:endParaRPr/>
           </a:p>
@@ -11986,7 +11335,7 @@
       </p:sp>
       <p:sp>
         <p:nvSpPr>
-          <p:cNvPr id="210" name="Google Shape;210;p39"/>
+          <p:cNvPr id="214" name="Google Shape;214;p39"/>
           <p:cNvSpPr txBox="1"/>
           <p:nvPr>
             <p:ph idx="1" type="body"/>
@@ -12019,7 +11368,82 @@
             </a:pPr>
             <a:r>
               <a:rPr lang="en"/>
-              <a:t>Deployment Diagram</a:t>
+              <a:t>Run </a:t>
+            </a:r>
+            <a:r>
+              <a:rPr lang="en"/>
+              <a:t>manually</a:t>
+            </a:r>
+            <a:endParaRPr/>
+          </a:p>
+          <a:p>
+            <a:pPr indent="-317500" lvl="1" marL="914400" rtl="0" algn="l">
+              <a:spcBef>
+                <a:spcPts val="0"/>
+              </a:spcBef>
+              <a:spcAft>
+                <a:spcPts val="0"/>
+              </a:spcAft>
+              <a:buSzPts val="1400"/>
+              <a:buChar char="-"/>
+            </a:pPr>
+            <a:r>
+              <a:rPr lang="en"/>
+              <a:t>Can be automated but not on our roadmap</a:t>
+            </a:r>
+            <a:endParaRPr/>
+          </a:p>
+          <a:p>
+            <a:pPr indent="-342900" lvl="0" marL="457200" rtl="0" algn="l">
+              <a:spcBef>
+                <a:spcPts val="0"/>
+              </a:spcBef>
+              <a:spcAft>
+                <a:spcPts val="0"/>
+              </a:spcAft>
+              <a:buSzPts val="1800"/>
+              <a:buChar char="-"/>
+            </a:pPr>
+            <a:r>
+              <a:rPr lang="en"/>
+              <a:t>Tests the systems functionalities end-to-end</a:t>
+            </a:r>
+            <a:endParaRPr/>
+          </a:p>
+          <a:p>
+            <a:pPr indent="-342900" lvl="0" marL="457200" rtl="0" algn="l">
+              <a:spcBef>
+                <a:spcPts val="0"/>
+              </a:spcBef>
+              <a:spcAft>
+                <a:spcPts val="0"/>
+              </a:spcAft>
+              <a:buSzPts val="1800"/>
+              <a:buChar char="-"/>
+            </a:pPr>
+            <a:r>
+              <a:rPr lang="en"/>
+              <a:t>Format is steps / action for the tester to perform and the associated outcome for each</a:t>
+            </a:r>
+            <a:endParaRPr/>
+          </a:p>
+          <a:p>
+            <a:pPr indent="0" lvl="0" marL="0" rtl="0" algn="l">
+              <a:spcBef>
+                <a:spcPts val="1200"/>
+              </a:spcBef>
+              <a:spcAft>
+                <a:spcPts val="1200"/>
+              </a:spcAft>
+              <a:buNone/>
+            </a:pPr>
+            <a:r>
+              <a:rPr lang="en"/>
+              <a:t>System</a:t>
+            </a:r>
+            <a:r>
+              <a:rPr lang="en"/>
+              <a:t> tests for each user story can be found in the submission document</a:t>
             </a:r>
             <a:endParaRPr/>
           </a:p>
@@ -12038,7 +11462,7 @@
   <p:cSld>
     <p:spTree>
       <p:nvGrpSpPr>
-        <p:cNvPr id="214" name="Shape 214"/>
+        <p:cNvPr id="218" name="Shape 218"/>
         <p:cNvGrpSpPr/>
         <p:nvPr/>
       </p:nvGrpSpPr>
@@ -12052,7 +11476,7 @@
       </p:grpSpPr>
       <p:sp>
         <p:nvSpPr>
-          <p:cNvPr id="215" name="Google Shape;215;p40"/>
+          <p:cNvPr id="219" name="Google Shape;219;p40"/>
           <p:cNvSpPr txBox="1"/>
           <p:nvPr>
             <p:ph type="title"/>
@@ -12084,7 +11508,11 @@
             </a:pPr>
             <a:r>
               <a:rPr lang="en"/>
-              <a:t>Deployment</a:t>
+              <a:t>Acceptance</a:t>
+            </a:r>
+            <a:r>
+              <a:rPr lang="en"/>
+              <a:t> Tests</a:t>
             </a:r>
             <a:endParaRPr/>
           </a:p>
@@ -12092,7 +11520,7 @@
       </p:sp>
       <p:sp>
         <p:nvSpPr>
-          <p:cNvPr id="216" name="Google Shape;216;p40"/>
+          <p:cNvPr id="220" name="Google Shape;220;p40"/>
           <p:cNvSpPr txBox="1"/>
           <p:nvPr>
             <p:ph idx="1" type="body"/>
@@ -12125,7 +11553,24 @@
             </a:pPr>
             <a:r>
               <a:rPr lang="en"/>
-              <a:t>Deployed on S3 + ECS</a:t>
+              <a:t>Run manually</a:t>
+            </a:r>
+            <a:endParaRPr/>
+          </a:p>
+          <a:p>
+            <a:pPr indent="-317500" lvl="1" marL="914400" rtl="0" algn="l">
+              <a:spcBef>
+                <a:spcPts val="0"/>
+              </a:spcBef>
+              <a:spcAft>
+                <a:spcPts val="0"/>
+              </a:spcAft>
+              <a:buSzPts val="1400"/>
+              <a:buChar char="-"/>
+            </a:pPr>
+            <a:r>
+              <a:rPr lang="en"/>
+              <a:t>Can be automated but not on our roadmap</a:t>
             </a:r>
             <a:endParaRPr/>
           </a:p>
@@ -12141,80 +11586,63 @@
               <a:buChar char="-"/>
             </a:pPr>
             <a:r>
-              <a:rPr lang="en" u="sng">
-                <a:solidFill>
-                  <a:schemeClr val="hlink"/>
-                </a:solidFill>
-                <a:hlinkClick r:id="rId3"/>
-              </a:rPr>
-              <a:t>http://covid-tracker-client-bucket.s3-website.us-east-2.amazonaws.com/</a:t>
-            </a:r>
-            <a:r>
               <a:rPr lang="en"/>
-              <a:t> </a:t>
-            </a:r>
-            <a:endParaRPr/>
-          </a:p>
-          <a:p>
-            <a:pPr indent="0" lvl="0" marL="457200" rtl="0" algn="l">
+              <a:t>Tests the system according to the requirements</a:t>
+            </a:r>
+            <a:endParaRPr/>
+          </a:p>
+          <a:p>
+            <a:pPr indent="-317500" lvl="1" marL="914400" rtl="0" algn="l">
+              <a:spcBef>
+                <a:spcPts val="0"/>
+              </a:spcBef>
+              <a:spcAft>
+                <a:spcPts val="0"/>
+              </a:spcAft>
+              <a:buSzPts val="1400"/>
+              <a:buChar char="-"/>
+            </a:pPr>
+            <a:r>
+              <a:rPr lang="en"/>
+              <a:t>For use this means they are derived directly from our user stories</a:t>
+            </a:r>
+            <a:endParaRPr/>
+          </a:p>
+          <a:p>
+            <a:pPr indent="-342900" lvl="0" marL="457200" rtl="0" algn="l">
+              <a:spcBef>
+                <a:spcPts val="0"/>
+              </a:spcBef>
+              <a:spcAft>
+                <a:spcPts val="0"/>
+              </a:spcAft>
+              <a:buSzPts val="1800"/>
+              <a:buChar char="-"/>
+            </a:pPr>
+            <a:r>
+              <a:rPr lang="en"/>
+              <a:t>Format is Gherkin Syntax which is a behavioral driven development (BDD) syntax that allows us to define our tests in terms of user state and behavior</a:t>
+            </a:r>
+            <a:endParaRPr/>
+          </a:p>
+          <a:p>
+            <a:pPr indent="0" lvl="0" marL="0" rtl="0" algn="l">
               <a:spcBef>
                 <a:spcPts val="1200"/>
               </a:spcBef>
               <a:spcAft>
-                <a:spcPts val="0"/>
-              </a:spcAft>
-              <a:buNone/>
-            </a:pPr>
-            <a:r>
-              <a:t/>
-            </a:r>
-            <a:endParaRPr/>
-          </a:p>
-          <a:p>
-            <a:pPr indent="0" lvl="0" marL="457200" rtl="0" algn="l">
-              <a:spcBef>
                 <a:spcPts val="1200"/>
-              </a:spcBef>
-              <a:spcAft>
-                <a:spcPts val="1200"/>
-              </a:spcAft>
-              <a:buNone/>
-            </a:pPr>
-            <a:r>
-              <a:t/>
+              </a:spcAft>
+              <a:buNone/>
+            </a:pPr>
+            <a:r>
+              <a:rPr lang="en"/>
+              <a:t>Acceptance tests for each user story can be found in the submission document</a:t>
             </a:r>
             <a:endParaRPr/>
           </a:p>
         </p:txBody>
       </p:sp>
-      <p:pic>
-        <p:nvPicPr>
-          <p:cNvPr id="217" name="Google Shape;217;p40"/>
-          <p:cNvPicPr preferRelativeResize="0"/>
-          <p:nvPr/>
-        </p:nvPicPr>
-        <p:blipFill>
-          <a:blip r:embed="rId4">
-            <a:alphaModFix/>
-          </a:blip>
-          <a:stretch>
-            <a:fillRect/>
-          </a:stretch>
-        </p:blipFill>
-        <p:spPr>
-          <a:xfrm>
-            <a:off x="728578" y="2211303"/>
-            <a:ext cx="7686825" cy="2594775"/>
-          </a:xfrm>
-          <a:prstGeom prst="rect">
-            <a:avLst/>
-          </a:prstGeom>
-          <a:noFill/>
-          <a:ln>
-            <a:noFill/>
-          </a:ln>
-        </p:spPr>
-      </p:pic>
     </p:spTree>
   </p:cSld>
   <p:clrMapOvr>
@@ -12228,7 +11656,7 @@
   <p:cSld>
     <p:spTree>
       <p:nvGrpSpPr>
-        <p:cNvPr id="221" name="Shape 221"/>
+        <p:cNvPr id="224" name="Shape 224"/>
         <p:cNvGrpSpPr/>
         <p:nvPr/>
       </p:nvGrpSpPr>
@@ -12242,7 +11670,7 @@
       </p:grpSpPr>
       <p:sp>
         <p:nvSpPr>
-          <p:cNvPr id="222" name="Google Shape;222;p41"/>
+          <p:cNvPr id="225" name="Google Shape;225;p41"/>
           <p:cNvSpPr txBox="1"/>
           <p:nvPr>
             <p:ph type="title"/>
@@ -12274,7 +11702,7 @@
             </a:pPr>
             <a:r>
               <a:rPr lang="en"/>
-              <a:t>Testing plan</a:t>
+              <a:t>Live demo</a:t>
             </a:r>
             <a:endParaRPr/>
           </a:p>
@@ -12397,7 +11825,7 @@
             </a:pPr>
             <a:r>
               <a:rPr lang="en"/>
-              <a:t>Sprint 4 Summary + retrospective overview</a:t>
+              <a:t>Sprint 5 Summary + retrospective overview</a:t>
             </a:r>
             <a:endParaRPr/>
           </a:p>
@@ -12431,7 +11859,7 @@
             </a:pPr>
             <a:r>
               <a:rPr lang="en"/>
-              <a:t>UI Prototype showcase</a:t>
+              <a:t>Architecture review + tech stack</a:t>
             </a:r>
             <a:endParaRPr/>
           </a:p>
@@ -12448,7 +11876,7 @@
             </a:pPr>
             <a:r>
               <a:rPr lang="en"/>
-              <a:t>Architecture review + tech stack</a:t>
+              <a:t>Testing plan</a:t>
             </a:r>
             <a:endParaRPr/>
           </a:p>
@@ -12465,41 +11893,7 @@
             </a:pPr>
             <a:r>
               <a:rPr lang="en"/>
-              <a:t>Testing plan</a:t>
-            </a:r>
-            <a:endParaRPr/>
-          </a:p>
-          <a:p>
-            <a:pPr indent="-342900" lvl="0" marL="457200" rtl="0" algn="l">
-              <a:spcBef>
-                <a:spcPts val="0"/>
-              </a:spcBef>
-              <a:spcAft>
-                <a:spcPts val="0"/>
-              </a:spcAft>
-              <a:buSzPts val="1800"/>
-              <a:buAutoNum type="arabicPeriod"/>
-            </a:pPr>
-            <a:r>
-              <a:rPr lang="en"/>
               <a:t>Live demo</a:t>
-            </a:r>
-            <a:endParaRPr/>
-          </a:p>
-          <a:p>
-            <a:pPr indent="-342900" lvl="0" marL="457200" rtl="0" algn="l">
-              <a:spcBef>
-                <a:spcPts val="0"/>
-              </a:spcBef>
-              <a:spcAft>
-                <a:spcPts val="0"/>
-              </a:spcAft>
-              <a:buSzPts val="1800"/>
-              <a:buAutoNum type="arabicPeriod"/>
-            </a:pPr>
-            <a:r>
-              <a:rPr lang="en"/>
-              <a:t>Sprint 5 planning</a:t>
             </a:r>
             <a:endParaRPr/>
           </a:p>
@@ -12535,7 +11929,7 @@
   <p:cSld>
     <p:spTree>
       <p:nvGrpSpPr>
-        <p:cNvPr id="226" name="Shape 226"/>
+        <p:cNvPr id="229" name="Shape 229"/>
         <p:cNvGrpSpPr/>
         <p:nvPr/>
       </p:nvGrpSpPr>
@@ -12549,1100 +11943,7 @@
       </p:grpSpPr>
       <p:sp>
         <p:nvSpPr>
-          <p:cNvPr id="227" name="Google Shape;227;p42"/>
-          <p:cNvSpPr txBox="1"/>
-          <p:nvPr>
-            <p:ph type="title"/>
-          </p:nvPr>
-        </p:nvSpPr>
-        <p:spPr>
-          <a:xfrm>
-            <a:off x="311700" y="445025"/>
-            <a:ext cx="8520600" cy="572700"/>
-          </a:xfrm>
-          <a:prstGeom prst="rect">
-            <a:avLst/>
-          </a:prstGeom>
-        </p:spPr>
-        <p:txBody>
-          <a:bodyPr anchorCtr="0" anchor="t" bIns="91425" lIns="91425" spcFirstLastPara="1" rIns="91425" wrap="square" tIns="91425">
-            <a:normAutofit fontScale="90000"/>
-          </a:bodyPr>
-          <a:lstStyle/>
-          <a:p>
-            <a:pPr indent="0" lvl="0" marL="0" rtl="0" algn="l">
-              <a:spcBef>
-                <a:spcPts val="0"/>
-              </a:spcBef>
-              <a:spcAft>
-                <a:spcPts val="0"/>
-              </a:spcAft>
-              <a:buNone/>
-            </a:pPr>
-            <a:r>
-              <a:rPr lang="en"/>
-              <a:t>Our testing plan</a:t>
-            </a:r>
-            <a:endParaRPr/>
-          </a:p>
-        </p:txBody>
-      </p:sp>
-      <p:sp>
-        <p:nvSpPr>
-          <p:cNvPr id="228" name="Google Shape;228;p42"/>
-          <p:cNvSpPr txBox="1"/>
-          <p:nvPr>
-            <p:ph idx="1" type="body"/>
-          </p:nvPr>
-        </p:nvSpPr>
-        <p:spPr>
-          <a:xfrm>
-            <a:off x="311700" y="1152475"/>
-            <a:ext cx="8520600" cy="3416400"/>
-          </a:xfrm>
-          <a:prstGeom prst="rect">
-            <a:avLst/>
-          </a:prstGeom>
-        </p:spPr>
-        <p:txBody>
-          <a:bodyPr anchorCtr="0" anchor="t" bIns="91425" lIns="91425" spcFirstLastPara="1" rIns="91425" wrap="square" tIns="91425">
-            <a:normAutofit lnSpcReduction="10000"/>
-          </a:bodyPr>
-          <a:lstStyle/>
-          <a:p>
-            <a:pPr indent="0" lvl="0" marL="0" rtl="0" algn="l">
-              <a:spcBef>
-                <a:spcPts val="0"/>
-              </a:spcBef>
-              <a:spcAft>
-                <a:spcPts val="0"/>
-              </a:spcAft>
-              <a:buNone/>
-            </a:pPr>
-            <a:r>
-              <a:rPr lang="en"/>
-              <a:t>We have identified 4 types of tests for our system</a:t>
-            </a:r>
-            <a:endParaRPr/>
-          </a:p>
-          <a:p>
-            <a:pPr indent="-342900" lvl="0" marL="457200" rtl="0" algn="l">
-              <a:spcBef>
-                <a:spcPts val="1200"/>
-              </a:spcBef>
-              <a:spcAft>
-                <a:spcPts val="0"/>
-              </a:spcAft>
-              <a:buSzPts val="1800"/>
-              <a:buChar char="-"/>
-            </a:pPr>
-            <a:r>
-              <a:rPr lang="en"/>
-              <a:t>Unit tests</a:t>
-            </a:r>
-            <a:endParaRPr/>
-          </a:p>
-          <a:p>
-            <a:pPr indent="-342900" lvl="0" marL="457200" rtl="0" algn="l">
-              <a:spcBef>
-                <a:spcPts val="0"/>
-              </a:spcBef>
-              <a:spcAft>
-                <a:spcPts val="0"/>
-              </a:spcAft>
-              <a:buSzPts val="1800"/>
-              <a:buChar char="-"/>
-            </a:pPr>
-            <a:r>
-              <a:rPr lang="en"/>
-              <a:t>Integration tests</a:t>
-            </a:r>
-            <a:endParaRPr/>
-          </a:p>
-          <a:p>
-            <a:pPr indent="-342900" lvl="0" marL="457200" rtl="0" algn="l">
-              <a:spcBef>
-                <a:spcPts val="0"/>
-              </a:spcBef>
-              <a:spcAft>
-                <a:spcPts val="0"/>
-              </a:spcAft>
-              <a:buSzPts val="1800"/>
-              <a:buChar char="-"/>
-            </a:pPr>
-            <a:r>
-              <a:rPr lang="en"/>
-              <a:t>System tests</a:t>
-            </a:r>
-            <a:endParaRPr/>
-          </a:p>
-          <a:p>
-            <a:pPr indent="-342900" lvl="0" marL="457200" rtl="0" algn="l">
-              <a:spcBef>
-                <a:spcPts val="0"/>
-              </a:spcBef>
-              <a:spcAft>
-                <a:spcPts val="0"/>
-              </a:spcAft>
-              <a:buSzPts val="1800"/>
-              <a:buChar char="-"/>
-            </a:pPr>
-            <a:r>
-              <a:rPr lang="en"/>
-              <a:t>Acceptance</a:t>
-            </a:r>
-            <a:r>
-              <a:rPr lang="en"/>
-              <a:t> tests</a:t>
-            </a:r>
-            <a:endParaRPr/>
-          </a:p>
-          <a:p>
-            <a:pPr indent="0" lvl="0" marL="0" rtl="0" algn="l">
-              <a:spcBef>
-                <a:spcPts val="1200"/>
-              </a:spcBef>
-              <a:spcAft>
-                <a:spcPts val="0"/>
-              </a:spcAft>
-              <a:buNone/>
-            </a:pPr>
-            <a:r>
-              <a:rPr lang="en"/>
-              <a:t>Most are automated some are manual</a:t>
-            </a:r>
-            <a:endParaRPr/>
-          </a:p>
-          <a:p>
-            <a:pPr indent="0" lvl="0" marL="0" rtl="0" algn="l">
-              <a:spcBef>
-                <a:spcPts val="1200"/>
-              </a:spcBef>
-              <a:spcAft>
-                <a:spcPts val="0"/>
-              </a:spcAft>
-              <a:buNone/>
-            </a:pPr>
-            <a:r>
-              <a:rPr lang="en"/>
-              <a:t>Some have output reports</a:t>
-            </a:r>
-            <a:endParaRPr/>
-          </a:p>
-          <a:p>
-            <a:pPr indent="0" lvl="0" marL="0" rtl="0" algn="l">
-              <a:spcBef>
-                <a:spcPts val="1200"/>
-              </a:spcBef>
-              <a:spcAft>
-                <a:spcPts val="1200"/>
-              </a:spcAft>
-              <a:buNone/>
-            </a:pPr>
-            <a:r>
-              <a:rPr lang="en"/>
-              <a:t>**More about the specific packages we use for our testing framework </a:t>
-            </a:r>
-            <a:r>
-              <a:rPr lang="en"/>
-              <a:t>and a comparison between all of them</a:t>
-            </a:r>
-            <a:r>
-              <a:rPr lang="en"/>
-              <a:t> can be found in the document**</a:t>
-            </a:r>
-            <a:endParaRPr/>
-          </a:p>
-        </p:txBody>
-      </p:sp>
-    </p:spTree>
-  </p:cSld>
-  <p:clrMapOvr>
-    <a:masterClrMapping/>
-  </p:clrMapOvr>
-</p:sld>
-</file>
-
-<file path=ppt/slides/slide31.xml><?xml version="1.0" encoding="utf-8"?>
-<p:sld xmlns:a="http://schemas.openxmlformats.org/drawingml/2006/main" xmlns:r="http://schemas.openxmlformats.org/officeDocument/2006/relationships" xmlns:mc="http://schemas.openxmlformats.org/markup-compatibility/2006" xmlns:mv="urn:schemas-microsoft-com:mac:vml" xmlns:p="http://schemas.openxmlformats.org/presentationml/2006/main" xmlns:c="http://schemas.openxmlformats.org/drawingml/2006/chart" xmlns:dgm="http://schemas.openxmlformats.org/drawingml/2006/diagram" xmlns:o="urn:schemas-microsoft-com:office:office" xmlns:v="urn:schemas-microsoft-com:vml" xmlns:pvml="urn:schemas-microsoft-com:office:powerpoint" xmlns:com="http://schemas.openxmlformats.org/drawingml/2006/compatibility" xmlns:p14="http://schemas.microsoft.com/office/powerpoint/2010/main" xmlns:p15="http://schemas.microsoft.com/office/powerpoint/2012/main" xmlns:ahyp="http://schemas.microsoft.com/office/drawing/2018/hyperlinkcolor">
-  <p:cSld>
-    <p:spTree>
-      <p:nvGrpSpPr>
-        <p:cNvPr id="232" name="Shape 232"/>
-        <p:cNvGrpSpPr/>
-        <p:nvPr/>
-      </p:nvGrpSpPr>
-      <p:grpSpPr>
-        <a:xfrm>
-          <a:off x="0" y="0"/>
-          <a:ext cx="0" cy="0"/>
-          <a:chOff x="0" y="0"/>
-          <a:chExt cx="0" cy="0"/>
-        </a:xfrm>
-      </p:grpSpPr>
-      <p:sp>
-        <p:nvSpPr>
-          <p:cNvPr id="233" name="Google Shape;233;p43"/>
-          <p:cNvSpPr txBox="1"/>
-          <p:nvPr>
-            <p:ph type="title"/>
-          </p:nvPr>
-        </p:nvSpPr>
-        <p:spPr>
-          <a:xfrm>
-            <a:off x="311700" y="445025"/>
-            <a:ext cx="8520600" cy="572700"/>
-          </a:xfrm>
-          <a:prstGeom prst="rect">
-            <a:avLst/>
-          </a:prstGeom>
-        </p:spPr>
-        <p:txBody>
-          <a:bodyPr anchorCtr="0" anchor="t" bIns="91425" lIns="91425" spcFirstLastPara="1" rIns="91425" wrap="square" tIns="91425">
-            <a:normAutofit fontScale="90000"/>
-          </a:bodyPr>
-          <a:lstStyle/>
-          <a:p>
-            <a:pPr indent="0" lvl="0" marL="0" rtl="0" algn="l">
-              <a:spcBef>
-                <a:spcPts val="0"/>
-              </a:spcBef>
-              <a:spcAft>
-                <a:spcPts val="0"/>
-              </a:spcAft>
-              <a:buNone/>
-            </a:pPr>
-            <a:r>
-              <a:rPr lang="en"/>
-              <a:t>Unit test report</a:t>
-            </a:r>
-            <a:endParaRPr/>
-          </a:p>
-        </p:txBody>
-      </p:sp>
-      <p:sp>
-        <p:nvSpPr>
-          <p:cNvPr id="234" name="Google Shape;234;p43"/>
-          <p:cNvSpPr txBox="1"/>
-          <p:nvPr>
-            <p:ph idx="1" type="body"/>
-          </p:nvPr>
-        </p:nvSpPr>
-        <p:spPr>
-          <a:xfrm>
-            <a:off x="311700" y="1152475"/>
-            <a:ext cx="4020900" cy="3416400"/>
-          </a:xfrm>
-          <a:prstGeom prst="rect">
-            <a:avLst/>
-          </a:prstGeom>
-        </p:spPr>
-        <p:txBody>
-          <a:bodyPr anchorCtr="0" anchor="t" bIns="91425" lIns="91425" spcFirstLastPara="1" rIns="91425" wrap="square" tIns="91425">
-            <a:normAutofit/>
-          </a:bodyPr>
-          <a:lstStyle/>
-          <a:p>
-            <a:pPr indent="-342900" lvl="0" marL="457200" rtl="0" algn="l">
-              <a:spcBef>
-                <a:spcPts val="0"/>
-              </a:spcBef>
-              <a:spcAft>
-                <a:spcPts val="0"/>
-              </a:spcAft>
-              <a:buSzPts val="1800"/>
-              <a:buChar char="-"/>
-            </a:pPr>
-            <a:r>
-              <a:rPr lang="en">
-                <a:highlight>
-                  <a:srgbClr val="00FF00"/>
-                </a:highlight>
-              </a:rPr>
-              <a:t>91</a:t>
-            </a:r>
-            <a:r>
-              <a:rPr lang="en">
-                <a:highlight>
-                  <a:srgbClr val="00FF00"/>
-                </a:highlight>
-              </a:rPr>
-              <a:t> unit tests</a:t>
-            </a:r>
-            <a:endParaRPr>
-              <a:highlight>
-                <a:srgbClr val="00FF00"/>
-              </a:highlight>
-            </a:endParaRPr>
-          </a:p>
-          <a:p>
-            <a:pPr indent="-342900" lvl="0" marL="457200" rtl="0" algn="l">
-              <a:spcBef>
-                <a:spcPts val="0"/>
-              </a:spcBef>
-              <a:spcAft>
-                <a:spcPts val="0"/>
-              </a:spcAft>
-              <a:buSzPts val="1800"/>
-              <a:buChar char="-"/>
-            </a:pPr>
-            <a:r>
-              <a:rPr lang="en">
-                <a:highlight>
-                  <a:srgbClr val="00FF00"/>
-                </a:highlight>
-              </a:rPr>
-              <a:t>57 integration tests</a:t>
-            </a:r>
-            <a:endParaRPr>
-              <a:highlight>
-                <a:srgbClr val="00FF00"/>
-              </a:highlight>
-            </a:endParaRPr>
-          </a:p>
-          <a:p>
-            <a:pPr indent="-342900" lvl="0" marL="457200" rtl="0" algn="l">
-              <a:spcBef>
-                <a:spcPts val="0"/>
-              </a:spcBef>
-              <a:spcAft>
-                <a:spcPts val="0"/>
-              </a:spcAft>
-              <a:buSzPts val="1800"/>
-              <a:buChar char="-"/>
-            </a:pPr>
-            <a:r>
-              <a:rPr lang="en"/>
-              <a:t>41</a:t>
-            </a:r>
-            <a:r>
-              <a:rPr lang="en"/>
-              <a:t> test suites</a:t>
-            </a:r>
-            <a:endParaRPr/>
-          </a:p>
-          <a:p>
-            <a:pPr indent="-342900" lvl="0" marL="457200" rtl="0" algn="l">
-              <a:spcBef>
-                <a:spcPts val="0"/>
-              </a:spcBef>
-              <a:spcAft>
-                <a:spcPts val="0"/>
-              </a:spcAft>
-              <a:buSzPts val="1800"/>
-              <a:buChar char="-"/>
-            </a:pPr>
-            <a:r>
-              <a:rPr lang="en"/>
-              <a:t>0 failures</a:t>
-            </a:r>
-            <a:endParaRPr/>
-          </a:p>
-        </p:txBody>
-      </p:sp>
-      <p:pic>
-        <p:nvPicPr>
-          <p:cNvPr id="235" name="Google Shape;235;p43"/>
-          <p:cNvPicPr preferRelativeResize="0"/>
-          <p:nvPr/>
-        </p:nvPicPr>
-        <p:blipFill>
-          <a:blip r:embed="rId3">
-            <a:alphaModFix/>
-          </a:blip>
-          <a:stretch>
-            <a:fillRect/>
-          </a:stretch>
-        </p:blipFill>
-        <p:spPr>
-          <a:xfrm>
-            <a:off x="4443425" y="0"/>
-            <a:ext cx="3990748" cy="5143500"/>
-          </a:xfrm>
-          <a:prstGeom prst="rect">
-            <a:avLst/>
-          </a:prstGeom>
-          <a:noFill/>
-          <a:ln>
-            <a:noFill/>
-          </a:ln>
-        </p:spPr>
-      </p:pic>
-    </p:spTree>
-  </p:cSld>
-  <p:clrMapOvr>
-    <a:masterClrMapping/>
-  </p:clrMapOvr>
-</p:sld>
-</file>
-
-<file path=ppt/slides/slide32.xml><?xml version="1.0" encoding="utf-8"?>
-<p:sld xmlns:a="http://schemas.openxmlformats.org/drawingml/2006/main" xmlns:r="http://schemas.openxmlformats.org/officeDocument/2006/relationships" xmlns:mc="http://schemas.openxmlformats.org/markup-compatibility/2006" xmlns:mv="urn:schemas-microsoft-com:mac:vml" xmlns:p="http://schemas.openxmlformats.org/presentationml/2006/main" xmlns:c="http://schemas.openxmlformats.org/drawingml/2006/chart" xmlns:dgm="http://schemas.openxmlformats.org/drawingml/2006/diagram" xmlns:o="urn:schemas-microsoft-com:office:office" xmlns:v="urn:schemas-microsoft-com:vml" xmlns:pvml="urn:schemas-microsoft-com:office:powerpoint" xmlns:com="http://schemas.openxmlformats.org/drawingml/2006/compatibility" xmlns:p14="http://schemas.microsoft.com/office/powerpoint/2010/main" xmlns:p15="http://schemas.microsoft.com/office/powerpoint/2012/main" xmlns:ahyp="http://schemas.microsoft.com/office/drawing/2018/hyperlinkcolor">
-  <p:cSld>
-    <p:spTree>
-      <p:nvGrpSpPr>
-        <p:cNvPr id="239" name="Shape 239"/>
-        <p:cNvGrpSpPr/>
-        <p:nvPr/>
-      </p:nvGrpSpPr>
-      <p:grpSpPr>
-        <a:xfrm>
-          <a:off x="0" y="0"/>
-          <a:ext cx="0" cy="0"/>
-          <a:chOff x="0" y="0"/>
-          <a:chExt cx="0" cy="0"/>
-        </a:xfrm>
-      </p:grpSpPr>
-      <p:sp>
-        <p:nvSpPr>
-          <p:cNvPr id="240" name="Google Shape;240;p44"/>
-          <p:cNvSpPr txBox="1"/>
-          <p:nvPr>
-            <p:ph type="title"/>
-          </p:nvPr>
-        </p:nvSpPr>
-        <p:spPr>
-          <a:xfrm>
-            <a:off x="311700" y="445025"/>
-            <a:ext cx="8520600" cy="572700"/>
-          </a:xfrm>
-          <a:prstGeom prst="rect">
-            <a:avLst/>
-          </a:prstGeom>
-        </p:spPr>
-        <p:txBody>
-          <a:bodyPr anchorCtr="0" anchor="t" bIns="91425" lIns="91425" spcFirstLastPara="1" rIns="91425" wrap="square" tIns="91425">
-            <a:normAutofit fontScale="90000"/>
-          </a:bodyPr>
-          <a:lstStyle/>
-          <a:p>
-            <a:pPr indent="0" lvl="0" marL="0" rtl="0" algn="l">
-              <a:spcBef>
-                <a:spcPts val="0"/>
-              </a:spcBef>
-              <a:spcAft>
-                <a:spcPts val="0"/>
-              </a:spcAft>
-              <a:buNone/>
-            </a:pPr>
-            <a:r>
-              <a:rPr lang="en"/>
-              <a:t>Code coverage report</a:t>
-            </a:r>
-            <a:endParaRPr/>
-          </a:p>
-        </p:txBody>
-      </p:sp>
-      <p:sp>
-        <p:nvSpPr>
-          <p:cNvPr id="241" name="Google Shape;241;p44"/>
-          <p:cNvSpPr txBox="1"/>
-          <p:nvPr>
-            <p:ph idx="1" type="body"/>
-          </p:nvPr>
-        </p:nvSpPr>
-        <p:spPr>
-          <a:xfrm>
-            <a:off x="311700" y="1152475"/>
-            <a:ext cx="8520600" cy="3416400"/>
-          </a:xfrm>
-          <a:prstGeom prst="rect">
-            <a:avLst/>
-          </a:prstGeom>
-        </p:spPr>
-        <p:txBody>
-          <a:bodyPr anchorCtr="0" anchor="t" bIns="91425" lIns="91425" spcFirstLastPara="1" rIns="91425" wrap="square" tIns="91425">
-            <a:normAutofit/>
-          </a:bodyPr>
-          <a:lstStyle/>
-          <a:p>
-            <a:pPr indent="0" lvl="0" marL="0" rtl="0" algn="l">
-              <a:spcBef>
-                <a:spcPts val="0"/>
-              </a:spcBef>
-              <a:spcAft>
-                <a:spcPts val="1200"/>
-              </a:spcAft>
-              <a:buNone/>
-            </a:pPr>
-            <a:r>
-              <a:t/>
-            </a:r>
-            <a:endParaRPr/>
-          </a:p>
-        </p:txBody>
-      </p:sp>
-      <p:pic>
-        <p:nvPicPr>
-          <p:cNvPr id="242" name="Google Shape;242;p44"/>
-          <p:cNvPicPr preferRelativeResize="0"/>
-          <p:nvPr/>
-        </p:nvPicPr>
-        <p:blipFill>
-          <a:blip r:embed="rId3">
-            <a:alphaModFix/>
-          </a:blip>
-          <a:stretch>
-            <a:fillRect/>
-          </a:stretch>
-        </p:blipFill>
-        <p:spPr>
-          <a:xfrm>
-            <a:off x="1498346" y="1152475"/>
-            <a:ext cx="6147301" cy="3512726"/>
-          </a:xfrm>
-          <a:prstGeom prst="rect">
-            <a:avLst/>
-          </a:prstGeom>
-          <a:noFill/>
-          <a:ln>
-            <a:noFill/>
-          </a:ln>
-        </p:spPr>
-      </p:pic>
-    </p:spTree>
-  </p:cSld>
-  <p:clrMapOvr>
-    <a:masterClrMapping/>
-  </p:clrMapOvr>
-</p:sld>
-</file>
-
-<file path=ppt/slides/slide33.xml><?xml version="1.0" encoding="utf-8"?>
-<p:sld xmlns:a="http://schemas.openxmlformats.org/drawingml/2006/main" xmlns:r="http://schemas.openxmlformats.org/officeDocument/2006/relationships" xmlns:mc="http://schemas.openxmlformats.org/markup-compatibility/2006" xmlns:mv="urn:schemas-microsoft-com:mac:vml" xmlns:p="http://schemas.openxmlformats.org/presentationml/2006/main" xmlns:c="http://schemas.openxmlformats.org/drawingml/2006/chart" xmlns:dgm="http://schemas.openxmlformats.org/drawingml/2006/diagram" xmlns:o="urn:schemas-microsoft-com:office:office" xmlns:v="urn:schemas-microsoft-com:vml" xmlns:pvml="urn:schemas-microsoft-com:office:powerpoint" xmlns:com="http://schemas.openxmlformats.org/drawingml/2006/compatibility" xmlns:p14="http://schemas.microsoft.com/office/powerpoint/2010/main" xmlns:p15="http://schemas.microsoft.com/office/powerpoint/2012/main" xmlns:ahyp="http://schemas.microsoft.com/office/drawing/2018/hyperlinkcolor">
-  <p:cSld>
-    <p:spTree>
-      <p:nvGrpSpPr>
-        <p:cNvPr id="246" name="Shape 246"/>
-        <p:cNvGrpSpPr/>
-        <p:nvPr/>
-      </p:nvGrpSpPr>
-      <p:grpSpPr>
-        <a:xfrm>
-          <a:off x="0" y="0"/>
-          <a:ext cx="0" cy="0"/>
-          <a:chOff x="0" y="0"/>
-          <a:chExt cx="0" cy="0"/>
-        </a:xfrm>
-      </p:grpSpPr>
-      <p:sp>
-        <p:nvSpPr>
-          <p:cNvPr id="247" name="Google Shape;247;p45"/>
-          <p:cNvSpPr txBox="1"/>
-          <p:nvPr>
-            <p:ph type="title"/>
-          </p:nvPr>
-        </p:nvSpPr>
-        <p:spPr>
-          <a:xfrm>
-            <a:off x="311700" y="445025"/>
-            <a:ext cx="8520600" cy="572700"/>
-          </a:xfrm>
-          <a:prstGeom prst="rect">
-            <a:avLst/>
-          </a:prstGeom>
-        </p:spPr>
-        <p:txBody>
-          <a:bodyPr anchorCtr="0" anchor="t" bIns="91425" lIns="91425" spcFirstLastPara="1" rIns="91425" wrap="square" tIns="91425">
-            <a:normAutofit fontScale="90000"/>
-          </a:bodyPr>
-          <a:lstStyle/>
-          <a:p>
-            <a:pPr indent="0" lvl="0" marL="0" rtl="0" algn="l">
-              <a:spcBef>
-                <a:spcPts val="0"/>
-              </a:spcBef>
-              <a:spcAft>
-                <a:spcPts val="0"/>
-              </a:spcAft>
-              <a:buNone/>
-            </a:pPr>
-            <a:r>
-              <a:rPr lang="en"/>
-              <a:t>Integration tests</a:t>
-            </a:r>
-            <a:endParaRPr/>
-          </a:p>
-        </p:txBody>
-      </p:sp>
-      <p:sp>
-        <p:nvSpPr>
-          <p:cNvPr id="248" name="Google Shape;248;p45"/>
-          <p:cNvSpPr txBox="1"/>
-          <p:nvPr>
-            <p:ph idx="1" type="body"/>
-          </p:nvPr>
-        </p:nvSpPr>
-        <p:spPr>
-          <a:xfrm>
-            <a:off x="311700" y="1152475"/>
-            <a:ext cx="8520600" cy="3416400"/>
-          </a:xfrm>
-          <a:prstGeom prst="rect">
-            <a:avLst/>
-          </a:prstGeom>
-        </p:spPr>
-        <p:txBody>
-          <a:bodyPr anchorCtr="0" anchor="t" bIns="91425" lIns="91425" spcFirstLastPara="1" rIns="91425" wrap="square" tIns="91425">
-            <a:normAutofit/>
-          </a:bodyPr>
-          <a:lstStyle/>
-          <a:p>
-            <a:pPr indent="-342900" lvl="0" marL="457200" rtl="0" algn="l">
-              <a:spcBef>
-                <a:spcPts val="0"/>
-              </a:spcBef>
-              <a:spcAft>
-                <a:spcPts val="0"/>
-              </a:spcAft>
-              <a:buSzPts val="1800"/>
-              <a:buChar char="-"/>
-            </a:pPr>
-            <a:r>
-              <a:rPr lang="en"/>
-              <a:t>Our integration tests are automated tests</a:t>
-            </a:r>
-            <a:endParaRPr/>
-          </a:p>
-          <a:p>
-            <a:pPr indent="-342900" lvl="0" marL="457200" rtl="0" algn="l">
-              <a:spcBef>
-                <a:spcPts val="0"/>
-              </a:spcBef>
-              <a:spcAft>
-                <a:spcPts val="0"/>
-              </a:spcAft>
-              <a:buSzPts val="1800"/>
-              <a:buChar char="-"/>
-            </a:pPr>
-            <a:r>
-              <a:rPr lang="en"/>
-              <a:t>The tests use a full PostgreSQL DB instance running in docker</a:t>
-            </a:r>
-            <a:endParaRPr/>
-          </a:p>
-          <a:p>
-            <a:pPr indent="-317500" lvl="1" marL="914400" rtl="0" algn="l">
-              <a:spcBef>
-                <a:spcPts val="0"/>
-              </a:spcBef>
-              <a:spcAft>
-                <a:spcPts val="0"/>
-              </a:spcAft>
-              <a:buSzPts val="1400"/>
-              <a:buChar char="-"/>
-            </a:pPr>
-            <a:r>
-              <a:rPr lang="en"/>
-              <a:t>We have written db initialization and seeding scripts to help scaffold the tests</a:t>
-            </a:r>
-            <a:endParaRPr/>
-          </a:p>
-        </p:txBody>
-      </p:sp>
-    </p:spTree>
-  </p:cSld>
-  <p:clrMapOvr>
-    <a:masterClrMapping/>
-  </p:clrMapOvr>
-</p:sld>
-</file>
-
-<file path=ppt/slides/slide34.xml><?xml version="1.0" encoding="utf-8"?>
-<p:sld xmlns:a="http://schemas.openxmlformats.org/drawingml/2006/main" xmlns:r="http://schemas.openxmlformats.org/officeDocument/2006/relationships" xmlns:mc="http://schemas.openxmlformats.org/markup-compatibility/2006" xmlns:mv="urn:schemas-microsoft-com:mac:vml" xmlns:p="http://schemas.openxmlformats.org/presentationml/2006/main" xmlns:c="http://schemas.openxmlformats.org/drawingml/2006/chart" xmlns:dgm="http://schemas.openxmlformats.org/drawingml/2006/diagram" xmlns:o="urn:schemas-microsoft-com:office:office" xmlns:v="urn:schemas-microsoft-com:vml" xmlns:pvml="urn:schemas-microsoft-com:office:powerpoint" xmlns:com="http://schemas.openxmlformats.org/drawingml/2006/compatibility" xmlns:p14="http://schemas.microsoft.com/office/powerpoint/2010/main" xmlns:p15="http://schemas.microsoft.com/office/powerpoint/2012/main" xmlns:ahyp="http://schemas.microsoft.com/office/drawing/2018/hyperlinkcolor">
-  <p:cSld>
-    <p:spTree>
-      <p:nvGrpSpPr>
-        <p:cNvPr id="252" name="Shape 252"/>
-        <p:cNvGrpSpPr/>
-        <p:nvPr/>
-      </p:nvGrpSpPr>
-      <p:grpSpPr>
-        <a:xfrm>
-          <a:off x="0" y="0"/>
-          <a:ext cx="0" cy="0"/>
-          <a:chOff x="0" y="0"/>
-          <a:chExt cx="0" cy="0"/>
-        </a:xfrm>
-      </p:grpSpPr>
-      <p:sp>
-        <p:nvSpPr>
-          <p:cNvPr id="253" name="Google Shape;253;p46"/>
-          <p:cNvSpPr txBox="1"/>
-          <p:nvPr>
-            <p:ph type="title"/>
-          </p:nvPr>
-        </p:nvSpPr>
-        <p:spPr>
-          <a:xfrm>
-            <a:off x="311700" y="445025"/>
-            <a:ext cx="8520600" cy="572700"/>
-          </a:xfrm>
-          <a:prstGeom prst="rect">
-            <a:avLst/>
-          </a:prstGeom>
-        </p:spPr>
-        <p:txBody>
-          <a:bodyPr anchorCtr="0" anchor="t" bIns="91425" lIns="91425" spcFirstLastPara="1" rIns="91425" wrap="square" tIns="91425">
-            <a:normAutofit fontScale="90000"/>
-          </a:bodyPr>
-          <a:lstStyle/>
-          <a:p>
-            <a:pPr indent="0" lvl="0" marL="0" rtl="0" algn="l">
-              <a:spcBef>
-                <a:spcPts val="0"/>
-              </a:spcBef>
-              <a:spcAft>
-                <a:spcPts val="0"/>
-              </a:spcAft>
-              <a:buNone/>
-            </a:pPr>
-            <a:r>
-              <a:rPr lang="en"/>
-              <a:t>System Tests</a:t>
-            </a:r>
-            <a:endParaRPr/>
-          </a:p>
-        </p:txBody>
-      </p:sp>
-      <p:sp>
-        <p:nvSpPr>
-          <p:cNvPr id="254" name="Google Shape;254;p46"/>
-          <p:cNvSpPr txBox="1"/>
-          <p:nvPr>
-            <p:ph idx="1" type="body"/>
-          </p:nvPr>
-        </p:nvSpPr>
-        <p:spPr>
-          <a:xfrm>
-            <a:off x="311700" y="1152475"/>
-            <a:ext cx="8520600" cy="3416400"/>
-          </a:xfrm>
-          <a:prstGeom prst="rect">
-            <a:avLst/>
-          </a:prstGeom>
-        </p:spPr>
-        <p:txBody>
-          <a:bodyPr anchorCtr="0" anchor="t" bIns="91425" lIns="91425" spcFirstLastPara="1" rIns="91425" wrap="square" tIns="91425">
-            <a:normAutofit/>
-          </a:bodyPr>
-          <a:lstStyle/>
-          <a:p>
-            <a:pPr indent="-342900" lvl="0" marL="457200" rtl="0" algn="l">
-              <a:spcBef>
-                <a:spcPts val="0"/>
-              </a:spcBef>
-              <a:spcAft>
-                <a:spcPts val="0"/>
-              </a:spcAft>
-              <a:buSzPts val="1800"/>
-              <a:buChar char="-"/>
-            </a:pPr>
-            <a:r>
-              <a:rPr lang="en"/>
-              <a:t>Run </a:t>
-            </a:r>
-            <a:r>
-              <a:rPr lang="en"/>
-              <a:t>manually</a:t>
-            </a:r>
-            <a:endParaRPr/>
-          </a:p>
-          <a:p>
-            <a:pPr indent="-317500" lvl="1" marL="914400" rtl="0" algn="l">
-              <a:spcBef>
-                <a:spcPts val="0"/>
-              </a:spcBef>
-              <a:spcAft>
-                <a:spcPts val="0"/>
-              </a:spcAft>
-              <a:buSzPts val="1400"/>
-              <a:buChar char="-"/>
-            </a:pPr>
-            <a:r>
-              <a:rPr lang="en"/>
-              <a:t>Can be automated but not on our roadmap</a:t>
-            </a:r>
-            <a:endParaRPr/>
-          </a:p>
-          <a:p>
-            <a:pPr indent="-342900" lvl="0" marL="457200" rtl="0" algn="l">
-              <a:spcBef>
-                <a:spcPts val="0"/>
-              </a:spcBef>
-              <a:spcAft>
-                <a:spcPts val="0"/>
-              </a:spcAft>
-              <a:buSzPts val="1800"/>
-              <a:buChar char="-"/>
-            </a:pPr>
-            <a:r>
-              <a:rPr lang="en"/>
-              <a:t>Tests the systems functionalities end-to-end</a:t>
-            </a:r>
-            <a:endParaRPr/>
-          </a:p>
-          <a:p>
-            <a:pPr indent="-342900" lvl="0" marL="457200" rtl="0" algn="l">
-              <a:spcBef>
-                <a:spcPts val="0"/>
-              </a:spcBef>
-              <a:spcAft>
-                <a:spcPts val="0"/>
-              </a:spcAft>
-              <a:buSzPts val="1800"/>
-              <a:buChar char="-"/>
-            </a:pPr>
-            <a:r>
-              <a:rPr lang="en"/>
-              <a:t>Format is steps / action for the tester to perform and the associated outcome for each</a:t>
-            </a:r>
-            <a:endParaRPr/>
-          </a:p>
-          <a:p>
-            <a:pPr indent="0" lvl="0" marL="0" rtl="0" algn="l">
-              <a:spcBef>
-                <a:spcPts val="1200"/>
-              </a:spcBef>
-              <a:spcAft>
-                <a:spcPts val="1200"/>
-              </a:spcAft>
-              <a:buNone/>
-            </a:pPr>
-            <a:r>
-              <a:rPr lang="en"/>
-              <a:t>System</a:t>
-            </a:r>
-            <a:r>
-              <a:rPr lang="en"/>
-              <a:t> tests for each user story can be found in the submission document</a:t>
-            </a:r>
-            <a:endParaRPr/>
-          </a:p>
-        </p:txBody>
-      </p:sp>
-    </p:spTree>
-  </p:cSld>
-  <p:clrMapOvr>
-    <a:masterClrMapping/>
-  </p:clrMapOvr>
-</p:sld>
-</file>
-
-<file path=ppt/slides/slide35.xml><?xml version="1.0" encoding="utf-8"?>
-<p:sld xmlns:a="http://schemas.openxmlformats.org/drawingml/2006/main" xmlns:r="http://schemas.openxmlformats.org/officeDocument/2006/relationships" xmlns:mc="http://schemas.openxmlformats.org/markup-compatibility/2006" xmlns:mv="urn:schemas-microsoft-com:mac:vml" xmlns:p="http://schemas.openxmlformats.org/presentationml/2006/main" xmlns:c="http://schemas.openxmlformats.org/drawingml/2006/chart" xmlns:dgm="http://schemas.openxmlformats.org/drawingml/2006/diagram" xmlns:o="urn:schemas-microsoft-com:office:office" xmlns:v="urn:schemas-microsoft-com:vml" xmlns:pvml="urn:schemas-microsoft-com:office:powerpoint" xmlns:com="http://schemas.openxmlformats.org/drawingml/2006/compatibility" xmlns:p14="http://schemas.microsoft.com/office/powerpoint/2010/main" xmlns:p15="http://schemas.microsoft.com/office/powerpoint/2012/main" xmlns:ahyp="http://schemas.microsoft.com/office/drawing/2018/hyperlinkcolor">
-  <p:cSld>
-    <p:spTree>
-      <p:nvGrpSpPr>
-        <p:cNvPr id="258" name="Shape 258"/>
-        <p:cNvGrpSpPr/>
-        <p:nvPr/>
-      </p:nvGrpSpPr>
-      <p:grpSpPr>
-        <a:xfrm>
-          <a:off x="0" y="0"/>
-          <a:ext cx="0" cy="0"/>
-          <a:chOff x="0" y="0"/>
-          <a:chExt cx="0" cy="0"/>
-        </a:xfrm>
-      </p:grpSpPr>
-      <p:sp>
-        <p:nvSpPr>
-          <p:cNvPr id="259" name="Google Shape;259;p47"/>
-          <p:cNvSpPr txBox="1"/>
-          <p:nvPr>
-            <p:ph type="title"/>
-          </p:nvPr>
-        </p:nvSpPr>
-        <p:spPr>
-          <a:xfrm>
-            <a:off x="311700" y="445025"/>
-            <a:ext cx="8520600" cy="572700"/>
-          </a:xfrm>
-          <a:prstGeom prst="rect">
-            <a:avLst/>
-          </a:prstGeom>
-        </p:spPr>
-        <p:txBody>
-          <a:bodyPr anchorCtr="0" anchor="t" bIns="91425" lIns="91425" spcFirstLastPara="1" rIns="91425" wrap="square" tIns="91425">
-            <a:normAutofit fontScale="90000"/>
-          </a:bodyPr>
-          <a:lstStyle/>
-          <a:p>
-            <a:pPr indent="0" lvl="0" marL="0" rtl="0" algn="l">
-              <a:spcBef>
-                <a:spcPts val="0"/>
-              </a:spcBef>
-              <a:spcAft>
-                <a:spcPts val="0"/>
-              </a:spcAft>
-              <a:buNone/>
-            </a:pPr>
-            <a:r>
-              <a:rPr lang="en"/>
-              <a:t>Acceptance</a:t>
-            </a:r>
-            <a:r>
-              <a:rPr lang="en"/>
-              <a:t> Tests</a:t>
-            </a:r>
-            <a:endParaRPr/>
-          </a:p>
-        </p:txBody>
-      </p:sp>
-      <p:sp>
-        <p:nvSpPr>
-          <p:cNvPr id="260" name="Google Shape;260;p47"/>
-          <p:cNvSpPr txBox="1"/>
-          <p:nvPr>
-            <p:ph idx="1" type="body"/>
-          </p:nvPr>
-        </p:nvSpPr>
-        <p:spPr>
-          <a:xfrm>
-            <a:off x="311700" y="1152475"/>
-            <a:ext cx="8520600" cy="3416400"/>
-          </a:xfrm>
-          <a:prstGeom prst="rect">
-            <a:avLst/>
-          </a:prstGeom>
-        </p:spPr>
-        <p:txBody>
-          <a:bodyPr anchorCtr="0" anchor="t" bIns="91425" lIns="91425" spcFirstLastPara="1" rIns="91425" wrap="square" tIns="91425">
-            <a:normAutofit/>
-          </a:bodyPr>
-          <a:lstStyle/>
-          <a:p>
-            <a:pPr indent="-342900" lvl="0" marL="457200" rtl="0" algn="l">
-              <a:spcBef>
-                <a:spcPts val="0"/>
-              </a:spcBef>
-              <a:spcAft>
-                <a:spcPts val="0"/>
-              </a:spcAft>
-              <a:buSzPts val="1800"/>
-              <a:buChar char="-"/>
-            </a:pPr>
-            <a:r>
-              <a:rPr lang="en"/>
-              <a:t>Run manually</a:t>
-            </a:r>
-            <a:endParaRPr/>
-          </a:p>
-          <a:p>
-            <a:pPr indent="-317500" lvl="1" marL="914400" rtl="0" algn="l">
-              <a:spcBef>
-                <a:spcPts val="0"/>
-              </a:spcBef>
-              <a:spcAft>
-                <a:spcPts val="0"/>
-              </a:spcAft>
-              <a:buSzPts val="1400"/>
-              <a:buChar char="-"/>
-            </a:pPr>
-            <a:r>
-              <a:rPr lang="en"/>
-              <a:t>Can be automated but not on our roadmap</a:t>
-            </a:r>
-            <a:endParaRPr/>
-          </a:p>
-          <a:p>
-            <a:pPr indent="-342900" lvl="0" marL="457200" rtl="0" algn="l">
-              <a:spcBef>
-                <a:spcPts val="0"/>
-              </a:spcBef>
-              <a:spcAft>
-                <a:spcPts val="0"/>
-              </a:spcAft>
-              <a:buSzPts val="1800"/>
-              <a:buChar char="-"/>
-            </a:pPr>
-            <a:r>
-              <a:rPr lang="en"/>
-              <a:t>Tests the system according to the requirements</a:t>
-            </a:r>
-            <a:endParaRPr/>
-          </a:p>
-          <a:p>
-            <a:pPr indent="-317500" lvl="1" marL="914400" rtl="0" algn="l">
-              <a:spcBef>
-                <a:spcPts val="0"/>
-              </a:spcBef>
-              <a:spcAft>
-                <a:spcPts val="0"/>
-              </a:spcAft>
-              <a:buSzPts val="1400"/>
-              <a:buChar char="-"/>
-            </a:pPr>
-            <a:r>
-              <a:rPr lang="en"/>
-              <a:t>For use this means they are derived directly from our user stories</a:t>
-            </a:r>
-            <a:endParaRPr/>
-          </a:p>
-          <a:p>
-            <a:pPr indent="-342900" lvl="0" marL="457200" rtl="0" algn="l">
-              <a:spcBef>
-                <a:spcPts val="0"/>
-              </a:spcBef>
-              <a:spcAft>
-                <a:spcPts val="0"/>
-              </a:spcAft>
-              <a:buSzPts val="1800"/>
-              <a:buChar char="-"/>
-            </a:pPr>
-            <a:r>
-              <a:rPr lang="en"/>
-              <a:t>Format is Gherkin Syntax which is a behavioral driven development (BDD) syntax that allows us to define our tests in terms of user state and behavior</a:t>
-            </a:r>
-            <a:endParaRPr/>
-          </a:p>
-          <a:p>
-            <a:pPr indent="0" lvl="0" marL="0" rtl="0" algn="l">
-              <a:spcBef>
-                <a:spcPts val="1200"/>
-              </a:spcBef>
-              <a:spcAft>
-                <a:spcPts val="1200"/>
-              </a:spcAft>
-              <a:buNone/>
-            </a:pPr>
-            <a:r>
-              <a:rPr lang="en"/>
-              <a:t>Acceptance tests for each user story can be found in the submission document</a:t>
-            </a:r>
-            <a:endParaRPr/>
-          </a:p>
-        </p:txBody>
-      </p:sp>
-    </p:spTree>
-  </p:cSld>
-  <p:clrMapOvr>
-    <a:masterClrMapping/>
-  </p:clrMapOvr>
-</p:sld>
-</file>
-
-<file path=ppt/slides/slide36.xml><?xml version="1.0" encoding="utf-8"?>
-<p:sld xmlns:a="http://schemas.openxmlformats.org/drawingml/2006/main" xmlns:r="http://schemas.openxmlformats.org/officeDocument/2006/relationships" xmlns:mc="http://schemas.openxmlformats.org/markup-compatibility/2006" xmlns:mv="urn:schemas-microsoft-com:mac:vml" xmlns:p="http://schemas.openxmlformats.org/presentationml/2006/main" xmlns:c="http://schemas.openxmlformats.org/drawingml/2006/chart" xmlns:dgm="http://schemas.openxmlformats.org/drawingml/2006/diagram" xmlns:o="urn:schemas-microsoft-com:office:office" xmlns:v="urn:schemas-microsoft-com:vml" xmlns:pvml="urn:schemas-microsoft-com:office:powerpoint" xmlns:com="http://schemas.openxmlformats.org/drawingml/2006/compatibility" xmlns:p14="http://schemas.microsoft.com/office/powerpoint/2010/main" xmlns:p15="http://schemas.microsoft.com/office/powerpoint/2012/main" xmlns:ahyp="http://schemas.microsoft.com/office/drawing/2018/hyperlinkcolor">
-  <p:cSld>
-    <p:spTree>
-      <p:nvGrpSpPr>
-        <p:cNvPr id="264" name="Shape 264"/>
-        <p:cNvGrpSpPr/>
-        <p:nvPr/>
-      </p:nvGrpSpPr>
-      <p:grpSpPr>
-        <a:xfrm>
-          <a:off x="0" y="0"/>
-          <a:ext cx="0" cy="0"/>
-          <a:chOff x="0" y="0"/>
-          <a:chExt cx="0" cy="0"/>
-        </a:xfrm>
-      </p:grpSpPr>
-      <p:sp>
-        <p:nvSpPr>
-          <p:cNvPr id="265" name="Google Shape;265;p48"/>
+          <p:cNvPr id="230" name="Google Shape;230;p42"/>
           <p:cNvSpPr txBox="1"/>
           <p:nvPr>
             <p:ph type="title"/>
@@ -13674,327 +11975,12 @@
             </a:pPr>
             <a:r>
               <a:rPr lang="en"/>
-              <a:t>Live demo</a:t>
+              <a:t>Questions?</a:t>
             </a:r>
             <a:endParaRPr/>
           </a:p>
         </p:txBody>
       </p:sp>
-    </p:spTree>
-  </p:cSld>
-  <p:clrMapOvr>
-    <a:masterClrMapping/>
-  </p:clrMapOvr>
-</p:sld>
-</file>
-
-<file path=ppt/slides/slide37.xml><?xml version="1.0" encoding="utf-8"?>
-<p:sld xmlns:a="http://schemas.openxmlformats.org/drawingml/2006/main" xmlns:r="http://schemas.openxmlformats.org/officeDocument/2006/relationships" xmlns:mc="http://schemas.openxmlformats.org/markup-compatibility/2006" xmlns:mv="urn:schemas-microsoft-com:mac:vml" xmlns:p="http://schemas.openxmlformats.org/presentationml/2006/main" xmlns:c="http://schemas.openxmlformats.org/drawingml/2006/chart" xmlns:dgm="http://schemas.openxmlformats.org/drawingml/2006/diagram" xmlns:o="urn:schemas-microsoft-com:office:office" xmlns:v="urn:schemas-microsoft-com:vml" xmlns:pvml="urn:schemas-microsoft-com:office:powerpoint" xmlns:com="http://schemas.openxmlformats.org/drawingml/2006/compatibility" xmlns:p14="http://schemas.microsoft.com/office/powerpoint/2010/main" xmlns:p15="http://schemas.microsoft.com/office/powerpoint/2012/main" xmlns:ahyp="http://schemas.microsoft.com/office/drawing/2018/hyperlinkcolor">
-  <p:cSld>
-    <p:spTree>
-      <p:nvGrpSpPr>
-        <p:cNvPr id="269" name="Shape 269"/>
-        <p:cNvGrpSpPr/>
-        <p:nvPr/>
-      </p:nvGrpSpPr>
-      <p:grpSpPr>
-        <a:xfrm>
-          <a:off x="0" y="0"/>
-          <a:ext cx="0" cy="0"/>
-          <a:chOff x="0" y="0"/>
-          <a:chExt cx="0" cy="0"/>
-        </a:xfrm>
-      </p:grpSpPr>
-      <p:sp>
-        <p:nvSpPr>
-          <p:cNvPr id="270" name="Google Shape;270;p49"/>
-          <p:cNvSpPr txBox="1"/>
-          <p:nvPr>
-            <p:ph type="title"/>
-          </p:nvPr>
-        </p:nvSpPr>
-        <p:spPr>
-          <a:xfrm>
-            <a:off x="311700" y="2150850"/>
-            <a:ext cx="8520600" cy="841800"/>
-          </a:xfrm>
-          <a:prstGeom prst="rect">
-            <a:avLst/>
-          </a:prstGeom>
-        </p:spPr>
-        <p:txBody>
-          <a:bodyPr anchorCtr="0" anchor="ctr" bIns="91425" lIns="91425" spcFirstLastPara="1" rIns="91425" wrap="square" tIns="91425">
-            <a:normAutofit/>
-          </a:bodyPr>
-          <a:lstStyle/>
-          <a:p>
-            <a:pPr indent="0" lvl="0" marL="0" rtl="0" algn="ctr">
-              <a:spcBef>
-                <a:spcPts val="0"/>
-              </a:spcBef>
-              <a:spcAft>
-                <a:spcPts val="0"/>
-              </a:spcAft>
-              <a:buNone/>
-            </a:pPr>
-            <a:r>
-              <a:rPr lang="en"/>
-              <a:t>Sprint 5 planning</a:t>
-            </a:r>
-            <a:endParaRPr/>
-          </a:p>
-        </p:txBody>
-      </p:sp>
-    </p:spTree>
-  </p:cSld>
-  <p:clrMapOvr>
-    <a:masterClrMapping/>
-  </p:clrMapOvr>
-</p:sld>
-</file>
-
-<file path=ppt/slides/slide38.xml><?xml version="1.0" encoding="utf-8"?>
-<p:sld xmlns:a="http://schemas.openxmlformats.org/drawingml/2006/main" xmlns:r="http://schemas.openxmlformats.org/officeDocument/2006/relationships" xmlns:mc="http://schemas.openxmlformats.org/markup-compatibility/2006" xmlns:mv="urn:schemas-microsoft-com:mac:vml" xmlns:p="http://schemas.openxmlformats.org/presentationml/2006/main" xmlns:c="http://schemas.openxmlformats.org/drawingml/2006/chart" xmlns:dgm="http://schemas.openxmlformats.org/drawingml/2006/diagram" xmlns:o="urn:schemas-microsoft-com:office:office" xmlns:v="urn:schemas-microsoft-com:vml" xmlns:pvml="urn:schemas-microsoft-com:office:powerpoint" xmlns:com="http://schemas.openxmlformats.org/drawingml/2006/compatibility" xmlns:p14="http://schemas.microsoft.com/office/powerpoint/2010/main" xmlns:p15="http://schemas.microsoft.com/office/powerpoint/2012/main" xmlns:ahyp="http://schemas.microsoft.com/office/drawing/2018/hyperlinkcolor">
-  <p:cSld>
-    <p:spTree>
-      <p:nvGrpSpPr>
-        <p:cNvPr id="274" name="Shape 274"/>
-        <p:cNvGrpSpPr/>
-        <p:nvPr/>
-      </p:nvGrpSpPr>
-      <p:grpSpPr>
-        <a:xfrm>
-          <a:off x="0" y="0"/>
-          <a:ext cx="0" cy="0"/>
-          <a:chOff x="0" y="0"/>
-          <a:chExt cx="0" cy="0"/>
-        </a:xfrm>
-      </p:grpSpPr>
-      <p:sp>
-        <p:nvSpPr>
-          <p:cNvPr id="275" name="Google Shape;275;p50"/>
-          <p:cNvSpPr txBox="1"/>
-          <p:nvPr>
-            <p:ph type="title"/>
-          </p:nvPr>
-        </p:nvSpPr>
-        <p:spPr>
-          <a:xfrm>
-            <a:off x="311700" y="445025"/>
-            <a:ext cx="8520600" cy="572700"/>
-          </a:xfrm>
-          <a:prstGeom prst="rect">
-            <a:avLst/>
-          </a:prstGeom>
-        </p:spPr>
-        <p:txBody>
-          <a:bodyPr anchorCtr="0" anchor="t" bIns="91425" lIns="91425" spcFirstLastPara="1" rIns="91425" wrap="square" tIns="91425">
-            <a:normAutofit fontScale="90000"/>
-          </a:bodyPr>
-          <a:lstStyle/>
-          <a:p>
-            <a:pPr indent="0" lvl="0" marL="0" rtl="0" algn="l">
-              <a:spcBef>
-                <a:spcPts val="0"/>
-              </a:spcBef>
-              <a:spcAft>
-                <a:spcPts val="0"/>
-              </a:spcAft>
-              <a:buNone/>
-            </a:pPr>
-            <a:r>
-              <a:rPr lang="en"/>
-              <a:t>What’s next in Sprint 5?</a:t>
-            </a:r>
-            <a:endParaRPr/>
-          </a:p>
-        </p:txBody>
-      </p:sp>
-      <p:sp>
-        <p:nvSpPr>
-          <p:cNvPr id="276" name="Google Shape;276;p50"/>
-          <p:cNvSpPr txBox="1"/>
-          <p:nvPr>
-            <p:ph idx="1" type="body"/>
-          </p:nvPr>
-        </p:nvSpPr>
-        <p:spPr>
-          <a:xfrm>
-            <a:off x="311700" y="1152475"/>
-            <a:ext cx="8520600" cy="3416400"/>
-          </a:xfrm>
-          <a:prstGeom prst="rect">
-            <a:avLst/>
-          </a:prstGeom>
-        </p:spPr>
-        <p:txBody>
-          <a:bodyPr anchorCtr="0" anchor="t" bIns="91425" lIns="91425" spcFirstLastPara="1" rIns="91425" wrap="square" tIns="91425">
-            <a:normAutofit/>
-          </a:bodyPr>
-          <a:lstStyle/>
-          <a:p>
-            <a:pPr indent="-342900" lvl="0" marL="457200" rtl="0" algn="l">
-              <a:spcBef>
-                <a:spcPts val="0"/>
-              </a:spcBef>
-              <a:spcAft>
-                <a:spcPts val="0"/>
-              </a:spcAft>
-              <a:buSzPts val="1800"/>
-              <a:buChar char="-"/>
-            </a:pPr>
-            <a:r>
-              <a:rPr lang="en"/>
-              <a:t>We have finished all the user stories we committed to for the project and have </a:t>
-            </a:r>
-            <a:r>
-              <a:rPr lang="en"/>
-              <a:t>nothing</a:t>
-            </a:r>
-            <a:r>
-              <a:rPr lang="en"/>
-              <a:t> left unfinished in our backlog</a:t>
-            </a:r>
-            <a:endParaRPr/>
-          </a:p>
-          <a:p>
-            <a:pPr indent="-342900" lvl="0" marL="457200" rtl="0" algn="l">
-              <a:spcBef>
-                <a:spcPts val="0"/>
-              </a:spcBef>
-              <a:spcAft>
-                <a:spcPts val="0"/>
-              </a:spcAft>
-              <a:buSzPts val="1800"/>
-              <a:buChar char="-"/>
-            </a:pPr>
-            <a:r>
-              <a:rPr lang="en"/>
-              <a:t>Our focus will be on</a:t>
-            </a:r>
-            <a:endParaRPr/>
-          </a:p>
-          <a:p>
-            <a:pPr indent="-317500" lvl="1" marL="914400" rtl="0" algn="l">
-              <a:spcBef>
-                <a:spcPts val="0"/>
-              </a:spcBef>
-              <a:spcAft>
-                <a:spcPts val="0"/>
-              </a:spcAft>
-              <a:buSzPts val="1400"/>
-              <a:buChar char="-"/>
-            </a:pPr>
-            <a:r>
-              <a:rPr lang="en"/>
-              <a:t>Fixing any bugs we find</a:t>
-            </a:r>
-            <a:endParaRPr/>
-          </a:p>
-          <a:p>
-            <a:pPr indent="-317500" lvl="1" marL="914400" rtl="0" algn="l">
-              <a:spcBef>
-                <a:spcPts val="0"/>
-              </a:spcBef>
-              <a:spcAft>
-                <a:spcPts val="0"/>
-              </a:spcAft>
-              <a:buSzPts val="1400"/>
-              <a:buChar char="-"/>
-            </a:pPr>
-            <a:r>
-              <a:rPr lang="en"/>
-              <a:t>Refining any issues in the flows</a:t>
-            </a:r>
-            <a:endParaRPr/>
-          </a:p>
-          <a:p>
-            <a:pPr indent="0" lvl="0" marL="0" rtl="0" algn="l">
-              <a:spcBef>
-                <a:spcPts val="1200"/>
-              </a:spcBef>
-              <a:spcAft>
-                <a:spcPts val="0"/>
-              </a:spcAft>
-              <a:buNone/>
-            </a:pPr>
-            <a:r>
-              <a:t/>
-            </a:r>
-            <a:endParaRPr/>
-          </a:p>
-          <a:p>
-            <a:pPr indent="-342900" lvl="0" marL="457200" rtl="0" algn="l">
-              <a:spcBef>
-                <a:spcPts val="1200"/>
-              </a:spcBef>
-              <a:spcAft>
-                <a:spcPts val="0"/>
-              </a:spcAft>
-              <a:buSzPts val="1800"/>
-              <a:buChar char="-"/>
-            </a:pPr>
-            <a:r>
-              <a:rPr lang="en"/>
-              <a:t>Sprint 5 contains 0 story points</a:t>
-            </a:r>
-            <a:endParaRPr/>
-          </a:p>
-        </p:txBody>
-      </p:sp>
-    </p:spTree>
-  </p:cSld>
-  <p:clrMapOvr>
-    <a:masterClrMapping/>
-  </p:clrMapOvr>
-</p:sld>
-</file>
-
-<file path=ppt/slides/slide39.xml><?xml version="1.0" encoding="utf-8"?>
-<p:sld xmlns:a="http://schemas.openxmlformats.org/drawingml/2006/main" xmlns:r="http://schemas.openxmlformats.org/officeDocument/2006/relationships" xmlns:mc="http://schemas.openxmlformats.org/markup-compatibility/2006" xmlns:mv="urn:schemas-microsoft-com:mac:vml" xmlns:p="http://schemas.openxmlformats.org/presentationml/2006/main" xmlns:c="http://schemas.openxmlformats.org/drawingml/2006/chart" xmlns:dgm="http://schemas.openxmlformats.org/drawingml/2006/diagram" xmlns:o="urn:schemas-microsoft-com:office:office" xmlns:v="urn:schemas-microsoft-com:vml" xmlns:pvml="urn:schemas-microsoft-com:office:powerpoint" xmlns:com="http://schemas.openxmlformats.org/drawingml/2006/compatibility" xmlns:p14="http://schemas.microsoft.com/office/powerpoint/2010/main" xmlns:p15="http://schemas.microsoft.com/office/powerpoint/2012/main" xmlns:ahyp="http://schemas.microsoft.com/office/drawing/2018/hyperlinkcolor">
-  <p:cSld>
-    <p:spTree>
-      <p:nvGrpSpPr>
-        <p:cNvPr id="280" name="Shape 280"/>
-        <p:cNvGrpSpPr/>
-        <p:nvPr/>
-      </p:nvGrpSpPr>
-      <p:grpSpPr>
-        <a:xfrm>
-          <a:off x="0" y="0"/>
-          <a:ext cx="0" cy="0"/>
-          <a:chOff x="0" y="0"/>
-          <a:chExt cx="0" cy="0"/>
-        </a:xfrm>
-      </p:grpSpPr>
-      <p:pic>
-        <p:nvPicPr>
-          <p:cNvPr id="281" name="Google Shape;281;p51"/>
-          <p:cNvPicPr preferRelativeResize="0"/>
-          <p:nvPr/>
-        </p:nvPicPr>
-        <p:blipFill>
-          <a:blip r:embed="rId3">
-            <a:alphaModFix/>
-          </a:blip>
-          <a:stretch>
-            <a:fillRect/>
-          </a:stretch>
-        </p:blipFill>
-        <p:spPr>
-          <a:xfrm>
-            <a:off x="152400" y="1081275"/>
-            <a:ext cx="8839201" cy="836063"/>
-          </a:xfrm>
-          <a:prstGeom prst="rect">
-            <a:avLst/>
-          </a:prstGeom>
-          <a:noFill/>
-          <a:ln>
-            <a:noFill/>
-          </a:ln>
-        </p:spPr>
-      </p:pic>
     </p:spTree>
   </p:cSld>
   <p:clrMapOvr>
@@ -14055,71 +12041,6 @@
             <a:r>
               <a:rPr lang="en"/>
               <a:t>Project Outline</a:t>
-            </a:r>
-            <a:endParaRPr/>
-          </a:p>
-        </p:txBody>
-      </p:sp>
-    </p:spTree>
-  </p:cSld>
-  <p:clrMapOvr>
-    <a:masterClrMapping/>
-  </p:clrMapOvr>
-</p:sld>
-</file>
-
-<file path=ppt/slides/slide40.xml><?xml version="1.0" encoding="utf-8"?>
-<p:sld xmlns:a="http://schemas.openxmlformats.org/drawingml/2006/main" xmlns:r="http://schemas.openxmlformats.org/officeDocument/2006/relationships" xmlns:mc="http://schemas.openxmlformats.org/markup-compatibility/2006" xmlns:mv="urn:schemas-microsoft-com:mac:vml" xmlns:p="http://schemas.openxmlformats.org/presentationml/2006/main" xmlns:c="http://schemas.openxmlformats.org/drawingml/2006/chart" xmlns:dgm="http://schemas.openxmlformats.org/drawingml/2006/diagram" xmlns:o="urn:schemas-microsoft-com:office:office" xmlns:v="urn:schemas-microsoft-com:vml" xmlns:pvml="urn:schemas-microsoft-com:office:powerpoint" xmlns:com="http://schemas.openxmlformats.org/drawingml/2006/compatibility" xmlns:p14="http://schemas.microsoft.com/office/powerpoint/2010/main" xmlns:p15="http://schemas.microsoft.com/office/powerpoint/2012/main" xmlns:ahyp="http://schemas.microsoft.com/office/drawing/2018/hyperlinkcolor">
-  <p:cSld>
-    <p:spTree>
-      <p:nvGrpSpPr>
-        <p:cNvPr id="285" name="Shape 285"/>
-        <p:cNvGrpSpPr/>
-        <p:nvPr/>
-      </p:nvGrpSpPr>
-      <p:grpSpPr>
-        <a:xfrm>
-          <a:off x="0" y="0"/>
-          <a:ext cx="0" cy="0"/>
-          <a:chOff x="0" y="0"/>
-          <a:chExt cx="0" cy="0"/>
-        </a:xfrm>
-      </p:grpSpPr>
-      <p:sp>
-        <p:nvSpPr>
-          <p:cNvPr id="286" name="Google Shape;286;p52"/>
-          <p:cNvSpPr txBox="1"/>
-          <p:nvPr>
-            <p:ph type="title"/>
-          </p:nvPr>
-        </p:nvSpPr>
-        <p:spPr>
-          <a:xfrm>
-            <a:off x="311700" y="2150850"/>
-            <a:ext cx="8520600" cy="841800"/>
-          </a:xfrm>
-          <a:prstGeom prst="rect">
-            <a:avLst/>
-          </a:prstGeom>
-        </p:spPr>
-        <p:txBody>
-          <a:bodyPr anchorCtr="0" anchor="ctr" bIns="91425" lIns="91425" spcFirstLastPara="1" rIns="91425" wrap="square" tIns="91425">
-            <a:normAutofit/>
-          </a:bodyPr>
-          <a:lstStyle/>
-          <a:p>
-            <a:pPr indent="0" lvl="0" marL="0" rtl="0" algn="ctr">
-              <a:spcBef>
-                <a:spcPts val="0"/>
-              </a:spcBef>
-              <a:spcAft>
-                <a:spcPts val="0"/>
-              </a:spcAft>
-              <a:buNone/>
-            </a:pPr>
-            <a:r>
-              <a:rPr lang="en"/>
-              <a:t>Questions?</a:t>
             </a:r>
             <a:endParaRPr/>
           </a:p>
@@ -14699,8 +12620,8 @@
         </p:blipFill>
         <p:spPr>
           <a:xfrm>
-            <a:off x="831938" y="1152478"/>
-            <a:ext cx="7480117" cy="3416400"/>
+            <a:off x="599150" y="1152475"/>
+            <a:ext cx="7945699" cy="3603575"/>
           </a:xfrm>
           <a:prstGeom prst="rect">
             <a:avLst/>
@@ -14845,7 +12766,7 @@
             </a:pPr>
             <a:r>
               <a:rPr lang="en"/>
-              <a:t>No new bugs found in Sprint 4</a:t>
+              <a:t>No new bugs found in Sprint 5</a:t>
             </a:r>
             <a:endParaRPr/>
           </a:p>

</xml_diff>

<commit_message>
COV-000: update sprint 5 ppt (#112)
</commit_message>
<xml_diff>
--- a/docs/Sprint 5 report/Sprint 5 presentation.pptx
+++ b/docs/Sprint 5 report/Sprint 5 presentation.pptx
@@ -38,16 +38,6 @@
     <p:sldId id="283" r:id="rId33"/>
     <p:sldId id="284" r:id="rId34"/>
     <p:sldId id="285" r:id="rId35"/>
-    <p:sldId id="286" r:id="rId36"/>
-    <p:sldId id="287" r:id="rId37"/>
-    <p:sldId id="288" r:id="rId38"/>
-    <p:sldId id="289" r:id="rId39"/>
-    <p:sldId id="290" r:id="rId40"/>
-    <p:sldId id="291" r:id="rId41"/>
-    <p:sldId id="292" r:id="rId42"/>
-    <p:sldId id="293" r:id="rId43"/>
-    <p:sldId id="294" r:id="rId44"/>
-    <p:sldId id="295" r:id="rId45"/>
   </p:sldIdLst>
   <p:sldSz cy="5143500" cx="9144000"/>
   <p:notesSz cx="6858000" cy="9144000"/>
@@ -1734,7 +1724,7 @@
       </p:grpSpPr>
       <p:sp>
         <p:nvSpPr>
-          <p:cNvPr id="161" name="Google Shape;161;g11193b24fb4_0_42:notes"/>
+          <p:cNvPr id="161" name="Google Shape;161;g11193b24fb4_0_47:notes"/>
           <p:cNvSpPr/>
           <p:nvPr>
             <p:ph idx="2" type="sldImg"/>
@@ -1769,7 +1759,7 @@
       </p:sp>
       <p:sp>
         <p:nvSpPr>
-          <p:cNvPr id="162" name="Google Shape;162;g11193b24fb4_0_42:notes"/>
+          <p:cNvPr id="162" name="Google Shape;162;g11193b24fb4_0_47:notes"/>
           <p:cNvSpPr txBox="1"/>
           <p:nvPr>
             <p:ph idx="1" type="body"/>
@@ -1932,7 +1922,7 @@
       </p:grpSpPr>
       <p:sp>
         <p:nvSpPr>
-          <p:cNvPr id="166" name="Google Shape;166;g111b5217d00_0_110:notes"/>
+          <p:cNvPr id="166" name="Google Shape;166;g11dfe98ce93_0_68:notes"/>
           <p:cNvSpPr/>
           <p:nvPr>
             <p:ph idx="2" type="sldImg"/>
@@ -1967,7 +1957,7 @@
       </p:sp>
       <p:sp>
         <p:nvSpPr>
-          <p:cNvPr id="167" name="Google Shape;167;g111b5217d00_0_110:notes"/>
+          <p:cNvPr id="167" name="Google Shape;167;g11dfe98ce93_0_68:notes"/>
           <p:cNvSpPr txBox="1"/>
           <p:nvPr>
             <p:ph idx="1" type="body"/>
@@ -2017,7 +2007,7 @@
   <p:cSld>
     <p:spTree>
       <p:nvGrpSpPr>
-        <p:cNvPr id="170" name="Shape 170"/>
+        <p:cNvPr id="171" name="Shape 171"/>
         <p:cNvGrpSpPr/>
         <p:nvPr/>
       </p:nvGrpSpPr>
@@ -2031,7 +2021,7 @@
       </p:grpSpPr>
       <p:sp>
         <p:nvSpPr>
-          <p:cNvPr id="171" name="Google Shape;171;g11193b24fb4_0_47:notes"/>
+          <p:cNvPr id="172" name="Google Shape;172;g111b5217d00_0_187:notes"/>
           <p:cNvSpPr/>
           <p:nvPr>
             <p:ph idx="2" type="sldImg"/>
@@ -2066,7 +2056,7 @@
       </p:sp>
       <p:sp>
         <p:nvSpPr>
-          <p:cNvPr id="172" name="Google Shape;172;g11193b24fb4_0_47:notes"/>
+          <p:cNvPr id="173" name="Google Shape;173;g111b5217d00_0_187:notes"/>
           <p:cNvSpPr txBox="1"/>
           <p:nvPr>
             <p:ph idx="1" type="body"/>
@@ -2116,7 +2106,7 @@
   <p:cSld>
     <p:spTree>
       <p:nvGrpSpPr>
-        <p:cNvPr id="175" name="Shape 175"/>
+        <p:cNvPr id="178" name="Shape 178"/>
         <p:cNvGrpSpPr/>
         <p:nvPr/>
       </p:nvGrpSpPr>
@@ -2130,7 +2120,7 @@
       </p:grpSpPr>
       <p:sp>
         <p:nvSpPr>
-          <p:cNvPr id="176" name="Google Shape;176;g11dfe98ce93_0_68:notes"/>
+          <p:cNvPr id="179" name="Google Shape;179;g11193b24fb4_0_52:notes"/>
           <p:cNvSpPr/>
           <p:nvPr>
             <p:ph idx="2" type="sldImg"/>
@@ -2165,7 +2155,7 @@
       </p:sp>
       <p:sp>
         <p:nvSpPr>
-          <p:cNvPr id="177" name="Google Shape;177;g11dfe98ce93_0_68:notes"/>
+          <p:cNvPr id="180" name="Google Shape;180;g11193b24fb4_0_52:notes"/>
           <p:cNvSpPr txBox="1"/>
           <p:nvPr>
             <p:ph idx="1" type="body"/>
@@ -2215,7 +2205,7 @@
   <p:cSld>
     <p:spTree>
       <p:nvGrpSpPr>
-        <p:cNvPr id="181" name="Shape 181"/>
+        <p:cNvPr id="183" name="Shape 183"/>
         <p:cNvGrpSpPr/>
         <p:nvPr/>
       </p:nvGrpSpPr>
@@ -2229,7 +2219,7 @@
       </p:grpSpPr>
       <p:sp>
         <p:nvSpPr>
-          <p:cNvPr id="182" name="Google Shape;182;g1236e4dbf69_0_12:notes"/>
+          <p:cNvPr id="184" name="Google Shape;184;g111b5217d00_0_172:notes"/>
           <p:cNvSpPr/>
           <p:nvPr>
             <p:ph idx="2" type="sldImg"/>
@@ -2264,7 +2254,7 @@
       </p:sp>
       <p:sp>
         <p:nvSpPr>
-          <p:cNvPr id="183" name="Google Shape;183;g1236e4dbf69_0_12:notes"/>
+          <p:cNvPr id="185" name="Google Shape;185;g111b5217d00_0_172:notes"/>
           <p:cNvSpPr txBox="1"/>
           <p:nvPr>
             <p:ph idx="1" type="body"/>
@@ -2314,7 +2304,7 @@
   <p:cSld>
     <p:spTree>
       <p:nvGrpSpPr>
-        <p:cNvPr id="187" name="Shape 187"/>
+        <p:cNvPr id="189" name="Shape 189"/>
         <p:cNvGrpSpPr/>
         <p:nvPr/>
       </p:nvGrpSpPr>
@@ -2328,7 +2318,7 @@
       </p:grpSpPr>
       <p:sp>
         <p:nvSpPr>
-          <p:cNvPr id="188" name="Google Shape;188;g1236e4dbf69_0_17:notes"/>
+          <p:cNvPr id="190" name="Google Shape;190;g111b5217d00_0_207:notes"/>
           <p:cNvSpPr/>
           <p:nvPr>
             <p:ph idx="2" type="sldImg"/>
@@ -2363,7 +2353,7 @@
       </p:sp>
       <p:sp>
         <p:nvSpPr>
-          <p:cNvPr id="189" name="Google Shape;189;g1236e4dbf69_0_17:notes"/>
+          <p:cNvPr id="191" name="Google Shape;191;g111b5217d00_0_207:notes"/>
           <p:cNvSpPr txBox="1"/>
           <p:nvPr>
             <p:ph idx="1" type="body"/>
@@ -2413,7 +2403,7 @@
   <p:cSld>
     <p:spTree>
       <p:nvGrpSpPr>
-        <p:cNvPr id="193" name="Shape 193"/>
+        <p:cNvPr id="196" name="Shape 196"/>
         <p:cNvGrpSpPr/>
         <p:nvPr/>
       </p:nvGrpSpPr>
@@ -2427,7 +2417,7 @@
       </p:grpSpPr>
       <p:sp>
         <p:nvSpPr>
-          <p:cNvPr id="194" name="Google Shape;194;g1236e4dbf69_0_22:notes"/>
+          <p:cNvPr id="197" name="Google Shape;197;g111b5217d00_0_202:notes"/>
           <p:cNvSpPr/>
           <p:nvPr>
             <p:ph idx="2" type="sldImg"/>
@@ -2462,7 +2452,7 @@
       </p:sp>
       <p:sp>
         <p:nvSpPr>
-          <p:cNvPr id="195" name="Google Shape;195;g1236e4dbf69_0_22:notes"/>
+          <p:cNvPr id="198" name="Google Shape;198;g111b5217d00_0_202:notes"/>
           <p:cNvSpPr txBox="1"/>
           <p:nvPr>
             <p:ph idx="1" type="body"/>
@@ -2512,7 +2502,7 @@
   <p:cSld>
     <p:spTree>
       <p:nvGrpSpPr>
-        <p:cNvPr id="199" name="Shape 199"/>
+        <p:cNvPr id="203" name="Shape 203"/>
         <p:cNvGrpSpPr/>
         <p:nvPr/>
       </p:nvGrpSpPr>
@@ -2526,7 +2516,7 @@
       </p:grpSpPr>
       <p:sp>
         <p:nvSpPr>
-          <p:cNvPr id="200" name="Google Shape;200;g1236e4dbf69_0_27:notes"/>
+          <p:cNvPr id="204" name="Google Shape;204;g111b5217d00_0_197:notes"/>
           <p:cNvSpPr/>
           <p:nvPr>
             <p:ph idx="2" type="sldImg"/>
@@ -2561,7 +2551,7 @@
       </p:sp>
       <p:sp>
         <p:nvSpPr>
-          <p:cNvPr id="201" name="Google Shape;201;g1236e4dbf69_0_27:notes"/>
+          <p:cNvPr id="205" name="Google Shape;205;g111b5217d00_0_197:notes"/>
           <p:cNvSpPr txBox="1"/>
           <p:nvPr>
             <p:ph idx="1" type="body"/>
@@ -2611,7 +2601,7 @@
   <p:cSld>
     <p:spTree>
       <p:nvGrpSpPr>
-        <p:cNvPr id="205" name="Shape 205"/>
+        <p:cNvPr id="209" name="Shape 209"/>
         <p:cNvGrpSpPr/>
         <p:nvPr/>
       </p:nvGrpSpPr>
@@ -2625,7 +2615,7 @@
       </p:grpSpPr>
       <p:sp>
         <p:nvSpPr>
-          <p:cNvPr id="206" name="Google Shape;206;g1236e4dbf69_0_32:notes"/>
+          <p:cNvPr id="210" name="Google Shape;210;g111b5217d00_0_219:notes"/>
           <p:cNvSpPr/>
           <p:nvPr>
             <p:ph idx="2" type="sldImg"/>
@@ -2660,7 +2650,7 @@
       </p:sp>
       <p:sp>
         <p:nvSpPr>
-          <p:cNvPr id="207" name="Google Shape;207;g1236e4dbf69_0_32:notes"/>
+          <p:cNvPr id="211" name="Google Shape;211;g111b5217d00_0_219:notes"/>
           <p:cNvSpPr txBox="1"/>
           <p:nvPr>
             <p:ph idx="1" type="body"/>
@@ -2710,7 +2700,7 @@
   <p:cSld>
     <p:spTree>
       <p:nvGrpSpPr>
-        <p:cNvPr id="211" name="Shape 211"/>
+        <p:cNvPr id="215" name="Shape 215"/>
         <p:cNvGrpSpPr/>
         <p:nvPr/>
       </p:nvGrpSpPr>
@@ -2724,7 +2714,7 @@
       </p:grpSpPr>
       <p:sp>
         <p:nvSpPr>
-          <p:cNvPr id="212" name="Google Shape;212;g111b5217d00_0_187:notes"/>
+          <p:cNvPr id="216" name="Google Shape;216;g111b5217d00_0_224:notes"/>
           <p:cNvSpPr/>
           <p:nvPr>
             <p:ph idx="2" type="sldImg"/>
@@ -2759,7 +2749,7 @@
       </p:sp>
       <p:sp>
         <p:nvSpPr>
-          <p:cNvPr id="213" name="Google Shape;213;g111b5217d00_0_187:notes"/>
+          <p:cNvPr id="217" name="Google Shape;217;g111b5217d00_0_224:notes"/>
           <p:cNvSpPr txBox="1"/>
           <p:nvPr>
             <p:ph idx="1" type="body"/>
@@ -2809,7 +2799,7 @@
   <p:cSld>
     <p:spTree>
       <p:nvGrpSpPr>
-        <p:cNvPr id="218" name="Shape 218"/>
+        <p:cNvPr id="221" name="Shape 221"/>
         <p:cNvGrpSpPr/>
         <p:nvPr/>
       </p:nvGrpSpPr>
@@ -2823,7 +2813,7 @@
       </p:grpSpPr>
       <p:sp>
         <p:nvSpPr>
-          <p:cNvPr id="219" name="Google Shape;219;g11193b24fb4_0_52:notes"/>
+          <p:cNvPr id="222" name="Google Shape;222;g11193b24fb4_0_57:notes"/>
           <p:cNvSpPr/>
           <p:nvPr>
             <p:ph idx="2" type="sldImg"/>
@@ -2858,7 +2848,7 @@
       </p:sp>
       <p:sp>
         <p:nvSpPr>
-          <p:cNvPr id="220" name="Google Shape;220;g11193b24fb4_0_52:notes"/>
+          <p:cNvPr id="223" name="Google Shape;223;g11193b24fb4_0_57:notes"/>
           <p:cNvSpPr txBox="1"/>
           <p:nvPr>
             <p:ph idx="1" type="body"/>
@@ -3007,7 +2997,7 @@
   <p:cSld>
     <p:spTree>
       <p:nvGrpSpPr>
-        <p:cNvPr id="223" name="Shape 223"/>
+        <p:cNvPr id="226" name="Shape 226"/>
         <p:cNvGrpSpPr/>
         <p:nvPr/>
       </p:nvGrpSpPr>
@@ -3021,7 +3011,7 @@
       </p:grpSpPr>
       <p:sp>
         <p:nvSpPr>
-          <p:cNvPr id="224" name="Google Shape;224;g111b5217d00_0_172:notes"/>
+          <p:cNvPr id="227" name="Google Shape;227;g11193b24fb4_0_67:notes"/>
           <p:cNvSpPr/>
           <p:nvPr>
             <p:ph idx="2" type="sldImg"/>
@@ -3056,898 +3046,7 @@
       </p:sp>
       <p:sp>
         <p:nvSpPr>
-          <p:cNvPr id="225" name="Google Shape;225;g111b5217d00_0_172:notes"/>
-          <p:cNvSpPr txBox="1"/>
-          <p:nvPr>
-            <p:ph idx="1" type="body"/>
-          </p:nvPr>
-        </p:nvSpPr>
-        <p:spPr>
-          <a:xfrm>
-            <a:off x="685800" y="4343400"/>
-            <a:ext cx="5486400" cy="4114800"/>
-          </a:xfrm>
-          <a:prstGeom prst="rect">
-            <a:avLst/>
-          </a:prstGeom>
-        </p:spPr>
-        <p:txBody>
-          <a:bodyPr anchorCtr="0" anchor="t" bIns="91425" lIns="91425" spcFirstLastPara="1" rIns="91425" wrap="square" tIns="91425">
-            <a:noAutofit/>
-          </a:bodyPr>
-          <a:lstStyle/>
-          <a:p>
-            <a:pPr indent="0" lvl="0" marL="0" rtl="0" algn="l">
-              <a:spcBef>
-                <a:spcPts val="0"/>
-              </a:spcBef>
-              <a:spcAft>
-                <a:spcPts val="0"/>
-              </a:spcAft>
-              <a:buNone/>
-            </a:pPr>
-            <a:r>
-              <a:t/>
-            </a:r>
-            <a:endParaRPr/>
-          </a:p>
-        </p:txBody>
-      </p:sp>
-    </p:spTree>
-  </p:cSld>
-  <p:clrMapOvr>
-    <a:masterClrMapping/>
-  </p:clrMapOvr>
-</p:notes>
-</file>
-
-<file path=ppt/notesSlides/notesSlide31.xml><?xml version="1.0" encoding="utf-8"?>
-<p:notes xmlns:a="http://schemas.openxmlformats.org/drawingml/2006/main" xmlns:r="http://schemas.openxmlformats.org/officeDocument/2006/relationships" xmlns:mc="http://schemas.openxmlformats.org/markup-compatibility/2006" xmlns:mv="urn:schemas-microsoft-com:mac:vml" xmlns:p="http://schemas.openxmlformats.org/presentationml/2006/main" xmlns:c="http://schemas.openxmlformats.org/drawingml/2006/chart" xmlns:dgm="http://schemas.openxmlformats.org/drawingml/2006/diagram" xmlns:o="urn:schemas-microsoft-com:office:office" xmlns:v="urn:schemas-microsoft-com:vml" xmlns:pvml="urn:schemas-microsoft-com:office:powerpoint" xmlns:com="http://schemas.openxmlformats.org/drawingml/2006/compatibility" xmlns:p14="http://schemas.microsoft.com/office/powerpoint/2010/main" xmlns:p15="http://schemas.microsoft.com/office/powerpoint/2012/main" xmlns:ahyp="http://schemas.microsoft.com/office/drawing/2018/hyperlinkcolor" showMasterPhAnim="0" showMasterSp="0">
-  <p:cSld>
-    <p:spTree>
-      <p:nvGrpSpPr>
-        <p:cNvPr id="229" name="Shape 229"/>
-        <p:cNvGrpSpPr/>
-        <p:nvPr/>
-      </p:nvGrpSpPr>
-      <p:grpSpPr>
-        <a:xfrm>
-          <a:off x="0" y="0"/>
-          <a:ext cx="0" cy="0"/>
-          <a:chOff x="0" y="0"/>
-          <a:chExt cx="0" cy="0"/>
-        </a:xfrm>
-      </p:grpSpPr>
-      <p:sp>
-        <p:nvSpPr>
-          <p:cNvPr id="230" name="Google Shape;230;g111b5217d00_0_207:notes"/>
-          <p:cNvSpPr/>
-          <p:nvPr>
-            <p:ph idx="2" type="sldImg"/>
-          </p:nvPr>
-        </p:nvSpPr>
-        <p:spPr>
-          <a:xfrm>
-            <a:off x="381300" y="685800"/>
-            <a:ext cx="6096000" cy="3429000"/>
-          </a:xfrm>
-          <a:custGeom>
-            <a:rect b="b" l="l" r="r" t="t"/>
-            <a:pathLst>
-              <a:path extrusionOk="0" h="120000" w="120000">
-                <a:moveTo>
-                  <a:pt x="0" y="0"/>
-                </a:moveTo>
-                <a:lnTo>
-                  <a:pt x="120000" y="0"/>
-                </a:lnTo>
-                <a:lnTo>
-                  <a:pt x="120000" y="120000"/>
-                </a:lnTo>
-                <a:lnTo>
-                  <a:pt x="0" y="120000"/>
-                </a:lnTo>
-                <a:close/>
-              </a:path>
-            </a:pathLst>
-          </a:custGeom>
-        </p:spPr>
-      </p:sp>
-      <p:sp>
-        <p:nvSpPr>
-          <p:cNvPr id="231" name="Google Shape;231;g111b5217d00_0_207:notes"/>
-          <p:cNvSpPr txBox="1"/>
-          <p:nvPr>
-            <p:ph idx="1" type="body"/>
-          </p:nvPr>
-        </p:nvSpPr>
-        <p:spPr>
-          <a:xfrm>
-            <a:off x="685800" y="4343400"/>
-            <a:ext cx="5486400" cy="4114800"/>
-          </a:xfrm>
-          <a:prstGeom prst="rect">
-            <a:avLst/>
-          </a:prstGeom>
-        </p:spPr>
-        <p:txBody>
-          <a:bodyPr anchorCtr="0" anchor="t" bIns="91425" lIns="91425" spcFirstLastPara="1" rIns="91425" wrap="square" tIns="91425">
-            <a:noAutofit/>
-          </a:bodyPr>
-          <a:lstStyle/>
-          <a:p>
-            <a:pPr indent="0" lvl="0" marL="0" rtl="0" algn="l">
-              <a:spcBef>
-                <a:spcPts val="0"/>
-              </a:spcBef>
-              <a:spcAft>
-                <a:spcPts val="0"/>
-              </a:spcAft>
-              <a:buNone/>
-            </a:pPr>
-            <a:r>
-              <a:t/>
-            </a:r>
-            <a:endParaRPr/>
-          </a:p>
-        </p:txBody>
-      </p:sp>
-    </p:spTree>
-  </p:cSld>
-  <p:clrMapOvr>
-    <a:masterClrMapping/>
-  </p:clrMapOvr>
-</p:notes>
-</file>
-
-<file path=ppt/notesSlides/notesSlide32.xml><?xml version="1.0" encoding="utf-8"?>
-<p:notes xmlns:a="http://schemas.openxmlformats.org/drawingml/2006/main" xmlns:r="http://schemas.openxmlformats.org/officeDocument/2006/relationships" xmlns:mc="http://schemas.openxmlformats.org/markup-compatibility/2006" xmlns:mv="urn:schemas-microsoft-com:mac:vml" xmlns:p="http://schemas.openxmlformats.org/presentationml/2006/main" xmlns:c="http://schemas.openxmlformats.org/drawingml/2006/chart" xmlns:dgm="http://schemas.openxmlformats.org/drawingml/2006/diagram" xmlns:o="urn:schemas-microsoft-com:office:office" xmlns:v="urn:schemas-microsoft-com:vml" xmlns:pvml="urn:schemas-microsoft-com:office:powerpoint" xmlns:com="http://schemas.openxmlformats.org/drawingml/2006/compatibility" xmlns:p14="http://schemas.microsoft.com/office/powerpoint/2010/main" xmlns:p15="http://schemas.microsoft.com/office/powerpoint/2012/main" xmlns:ahyp="http://schemas.microsoft.com/office/drawing/2018/hyperlinkcolor" showMasterPhAnim="0" showMasterSp="0">
-  <p:cSld>
-    <p:spTree>
-      <p:nvGrpSpPr>
-        <p:cNvPr id="236" name="Shape 236"/>
-        <p:cNvGrpSpPr/>
-        <p:nvPr/>
-      </p:nvGrpSpPr>
-      <p:grpSpPr>
-        <a:xfrm>
-          <a:off x="0" y="0"/>
-          <a:ext cx="0" cy="0"/>
-          <a:chOff x="0" y="0"/>
-          <a:chExt cx="0" cy="0"/>
-        </a:xfrm>
-      </p:grpSpPr>
-      <p:sp>
-        <p:nvSpPr>
-          <p:cNvPr id="237" name="Google Shape;237;g111b5217d00_0_202:notes"/>
-          <p:cNvSpPr/>
-          <p:nvPr>
-            <p:ph idx="2" type="sldImg"/>
-          </p:nvPr>
-        </p:nvSpPr>
-        <p:spPr>
-          <a:xfrm>
-            <a:off x="381300" y="685800"/>
-            <a:ext cx="6096000" cy="3429000"/>
-          </a:xfrm>
-          <a:custGeom>
-            <a:rect b="b" l="l" r="r" t="t"/>
-            <a:pathLst>
-              <a:path extrusionOk="0" h="120000" w="120000">
-                <a:moveTo>
-                  <a:pt x="0" y="0"/>
-                </a:moveTo>
-                <a:lnTo>
-                  <a:pt x="120000" y="0"/>
-                </a:lnTo>
-                <a:lnTo>
-                  <a:pt x="120000" y="120000"/>
-                </a:lnTo>
-                <a:lnTo>
-                  <a:pt x="0" y="120000"/>
-                </a:lnTo>
-                <a:close/>
-              </a:path>
-            </a:pathLst>
-          </a:custGeom>
-        </p:spPr>
-      </p:sp>
-      <p:sp>
-        <p:nvSpPr>
-          <p:cNvPr id="238" name="Google Shape;238;g111b5217d00_0_202:notes"/>
-          <p:cNvSpPr txBox="1"/>
-          <p:nvPr>
-            <p:ph idx="1" type="body"/>
-          </p:nvPr>
-        </p:nvSpPr>
-        <p:spPr>
-          <a:xfrm>
-            <a:off x="685800" y="4343400"/>
-            <a:ext cx="5486400" cy="4114800"/>
-          </a:xfrm>
-          <a:prstGeom prst="rect">
-            <a:avLst/>
-          </a:prstGeom>
-        </p:spPr>
-        <p:txBody>
-          <a:bodyPr anchorCtr="0" anchor="t" bIns="91425" lIns="91425" spcFirstLastPara="1" rIns="91425" wrap="square" tIns="91425">
-            <a:noAutofit/>
-          </a:bodyPr>
-          <a:lstStyle/>
-          <a:p>
-            <a:pPr indent="0" lvl="0" marL="0" rtl="0" algn="l">
-              <a:spcBef>
-                <a:spcPts val="0"/>
-              </a:spcBef>
-              <a:spcAft>
-                <a:spcPts val="0"/>
-              </a:spcAft>
-              <a:buNone/>
-            </a:pPr>
-            <a:r>
-              <a:t/>
-            </a:r>
-            <a:endParaRPr/>
-          </a:p>
-        </p:txBody>
-      </p:sp>
-    </p:spTree>
-  </p:cSld>
-  <p:clrMapOvr>
-    <a:masterClrMapping/>
-  </p:clrMapOvr>
-</p:notes>
-</file>
-
-<file path=ppt/notesSlides/notesSlide33.xml><?xml version="1.0" encoding="utf-8"?>
-<p:notes xmlns:a="http://schemas.openxmlformats.org/drawingml/2006/main" xmlns:r="http://schemas.openxmlformats.org/officeDocument/2006/relationships" xmlns:mc="http://schemas.openxmlformats.org/markup-compatibility/2006" xmlns:mv="urn:schemas-microsoft-com:mac:vml" xmlns:p="http://schemas.openxmlformats.org/presentationml/2006/main" xmlns:c="http://schemas.openxmlformats.org/drawingml/2006/chart" xmlns:dgm="http://schemas.openxmlformats.org/drawingml/2006/diagram" xmlns:o="urn:schemas-microsoft-com:office:office" xmlns:v="urn:schemas-microsoft-com:vml" xmlns:pvml="urn:schemas-microsoft-com:office:powerpoint" xmlns:com="http://schemas.openxmlformats.org/drawingml/2006/compatibility" xmlns:p14="http://schemas.microsoft.com/office/powerpoint/2010/main" xmlns:p15="http://schemas.microsoft.com/office/powerpoint/2012/main" xmlns:ahyp="http://schemas.microsoft.com/office/drawing/2018/hyperlinkcolor" showMasterPhAnim="0" showMasterSp="0">
-  <p:cSld>
-    <p:spTree>
-      <p:nvGrpSpPr>
-        <p:cNvPr id="243" name="Shape 243"/>
-        <p:cNvGrpSpPr/>
-        <p:nvPr/>
-      </p:nvGrpSpPr>
-      <p:grpSpPr>
-        <a:xfrm>
-          <a:off x="0" y="0"/>
-          <a:ext cx="0" cy="0"/>
-          <a:chOff x="0" y="0"/>
-          <a:chExt cx="0" cy="0"/>
-        </a:xfrm>
-      </p:grpSpPr>
-      <p:sp>
-        <p:nvSpPr>
-          <p:cNvPr id="244" name="Google Shape;244;g111b5217d00_0_197:notes"/>
-          <p:cNvSpPr/>
-          <p:nvPr>
-            <p:ph idx="2" type="sldImg"/>
-          </p:nvPr>
-        </p:nvSpPr>
-        <p:spPr>
-          <a:xfrm>
-            <a:off x="381300" y="685800"/>
-            <a:ext cx="6096000" cy="3429000"/>
-          </a:xfrm>
-          <a:custGeom>
-            <a:rect b="b" l="l" r="r" t="t"/>
-            <a:pathLst>
-              <a:path extrusionOk="0" h="120000" w="120000">
-                <a:moveTo>
-                  <a:pt x="0" y="0"/>
-                </a:moveTo>
-                <a:lnTo>
-                  <a:pt x="120000" y="0"/>
-                </a:lnTo>
-                <a:lnTo>
-                  <a:pt x="120000" y="120000"/>
-                </a:lnTo>
-                <a:lnTo>
-                  <a:pt x="0" y="120000"/>
-                </a:lnTo>
-                <a:close/>
-              </a:path>
-            </a:pathLst>
-          </a:custGeom>
-        </p:spPr>
-      </p:sp>
-      <p:sp>
-        <p:nvSpPr>
-          <p:cNvPr id="245" name="Google Shape;245;g111b5217d00_0_197:notes"/>
-          <p:cNvSpPr txBox="1"/>
-          <p:nvPr>
-            <p:ph idx="1" type="body"/>
-          </p:nvPr>
-        </p:nvSpPr>
-        <p:spPr>
-          <a:xfrm>
-            <a:off x="685800" y="4343400"/>
-            <a:ext cx="5486400" cy="4114800"/>
-          </a:xfrm>
-          <a:prstGeom prst="rect">
-            <a:avLst/>
-          </a:prstGeom>
-        </p:spPr>
-        <p:txBody>
-          <a:bodyPr anchorCtr="0" anchor="t" bIns="91425" lIns="91425" spcFirstLastPara="1" rIns="91425" wrap="square" tIns="91425">
-            <a:noAutofit/>
-          </a:bodyPr>
-          <a:lstStyle/>
-          <a:p>
-            <a:pPr indent="0" lvl="0" marL="0" rtl="0" algn="l">
-              <a:spcBef>
-                <a:spcPts val="0"/>
-              </a:spcBef>
-              <a:spcAft>
-                <a:spcPts val="0"/>
-              </a:spcAft>
-              <a:buNone/>
-            </a:pPr>
-            <a:r>
-              <a:t/>
-            </a:r>
-            <a:endParaRPr/>
-          </a:p>
-        </p:txBody>
-      </p:sp>
-    </p:spTree>
-  </p:cSld>
-  <p:clrMapOvr>
-    <a:masterClrMapping/>
-  </p:clrMapOvr>
-</p:notes>
-</file>
-
-<file path=ppt/notesSlides/notesSlide34.xml><?xml version="1.0" encoding="utf-8"?>
-<p:notes xmlns:a="http://schemas.openxmlformats.org/drawingml/2006/main" xmlns:r="http://schemas.openxmlformats.org/officeDocument/2006/relationships" xmlns:mc="http://schemas.openxmlformats.org/markup-compatibility/2006" xmlns:mv="urn:schemas-microsoft-com:mac:vml" xmlns:p="http://schemas.openxmlformats.org/presentationml/2006/main" xmlns:c="http://schemas.openxmlformats.org/drawingml/2006/chart" xmlns:dgm="http://schemas.openxmlformats.org/drawingml/2006/diagram" xmlns:o="urn:schemas-microsoft-com:office:office" xmlns:v="urn:schemas-microsoft-com:vml" xmlns:pvml="urn:schemas-microsoft-com:office:powerpoint" xmlns:com="http://schemas.openxmlformats.org/drawingml/2006/compatibility" xmlns:p14="http://schemas.microsoft.com/office/powerpoint/2010/main" xmlns:p15="http://schemas.microsoft.com/office/powerpoint/2012/main" xmlns:ahyp="http://schemas.microsoft.com/office/drawing/2018/hyperlinkcolor" showMasterPhAnim="0" showMasterSp="0">
-  <p:cSld>
-    <p:spTree>
-      <p:nvGrpSpPr>
-        <p:cNvPr id="249" name="Shape 249"/>
-        <p:cNvGrpSpPr/>
-        <p:nvPr/>
-      </p:nvGrpSpPr>
-      <p:grpSpPr>
-        <a:xfrm>
-          <a:off x="0" y="0"/>
-          <a:ext cx="0" cy="0"/>
-          <a:chOff x="0" y="0"/>
-          <a:chExt cx="0" cy="0"/>
-        </a:xfrm>
-      </p:grpSpPr>
-      <p:sp>
-        <p:nvSpPr>
-          <p:cNvPr id="250" name="Google Shape;250;g111b5217d00_0_219:notes"/>
-          <p:cNvSpPr/>
-          <p:nvPr>
-            <p:ph idx="2" type="sldImg"/>
-          </p:nvPr>
-        </p:nvSpPr>
-        <p:spPr>
-          <a:xfrm>
-            <a:off x="381300" y="685800"/>
-            <a:ext cx="6096000" cy="3429000"/>
-          </a:xfrm>
-          <a:custGeom>
-            <a:rect b="b" l="l" r="r" t="t"/>
-            <a:pathLst>
-              <a:path extrusionOk="0" h="120000" w="120000">
-                <a:moveTo>
-                  <a:pt x="0" y="0"/>
-                </a:moveTo>
-                <a:lnTo>
-                  <a:pt x="120000" y="0"/>
-                </a:lnTo>
-                <a:lnTo>
-                  <a:pt x="120000" y="120000"/>
-                </a:lnTo>
-                <a:lnTo>
-                  <a:pt x="0" y="120000"/>
-                </a:lnTo>
-                <a:close/>
-              </a:path>
-            </a:pathLst>
-          </a:custGeom>
-        </p:spPr>
-      </p:sp>
-      <p:sp>
-        <p:nvSpPr>
-          <p:cNvPr id="251" name="Google Shape;251;g111b5217d00_0_219:notes"/>
-          <p:cNvSpPr txBox="1"/>
-          <p:nvPr>
-            <p:ph idx="1" type="body"/>
-          </p:nvPr>
-        </p:nvSpPr>
-        <p:spPr>
-          <a:xfrm>
-            <a:off x="685800" y="4343400"/>
-            <a:ext cx="5486400" cy="4114800"/>
-          </a:xfrm>
-          <a:prstGeom prst="rect">
-            <a:avLst/>
-          </a:prstGeom>
-        </p:spPr>
-        <p:txBody>
-          <a:bodyPr anchorCtr="0" anchor="t" bIns="91425" lIns="91425" spcFirstLastPara="1" rIns="91425" wrap="square" tIns="91425">
-            <a:noAutofit/>
-          </a:bodyPr>
-          <a:lstStyle/>
-          <a:p>
-            <a:pPr indent="0" lvl="0" marL="0" rtl="0" algn="l">
-              <a:spcBef>
-                <a:spcPts val="0"/>
-              </a:spcBef>
-              <a:spcAft>
-                <a:spcPts val="0"/>
-              </a:spcAft>
-              <a:buNone/>
-            </a:pPr>
-            <a:r>
-              <a:t/>
-            </a:r>
-            <a:endParaRPr/>
-          </a:p>
-        </p:txBody>
-      </p:sp>
-    </p:spTree>
-  </p:cSld>
-  <p:clrMapOvr>
-    <a:masterClrMapping/>
-  </p:clrMapOvr>
-</p:notes>
-</file>
-
-<file path=ppt/notesSlides/notesSlide35.xml><?xml version="1.0" encoding="utf-8"?>
-<p:notes xmlns:a="http://schemas.openxmlformats.org/drawingml/2006/main" xmlns:r="http://schemas.openxmlformats.org/officeDocument/2006/relationships" xmlns:mc="http://schemas.openxmlformats.org/markup-compatibility/2006" xmlns:mv="urn:schemas-microsoft-com:mac:vml" xmlns:p="http://schemas.openxmlformats.org/presentationml/2006/main" xmlns:c="http://schemas.openxmlformats.org/drawingml/2006/chart" xmlns:dgm="http://schemas.openxmlformats.org/drawingml/2006/diagram" xmlns:o="urn:schemas-microsoft-com:office:office" xmlns:v="urn:schemas-microsoft-com:vml" xmlns:pvml="urn:schemas-microsoft-com:office:powerpoint" xmlns:com="http://schemas.openxmlformats.org/drawingml/2006/compatibility" xmlns:p14="http://schemas.microsoft.com/office/powerpoint/2010/main" xmlns:p15="http://schemas.microsoft.com/office/powerpoint/2012/main" xmlns:ahyp="http://schemas.microsoft.com/office/drawing/2018/hyperlinkcolor" showMasterPhAnim="0" showMasterSp="0">
-  <p:cSld>
-    <p:spTree>
-      <p:nvGrpSpPr>
-        <p:cNvPr id="255" name="Shape 255"/>
-        <p:cNvGrpSpPr/>
-        <p:nvPr/>
-      </p:nvGrpSpPr>
-      <p:grpSpPr>
-        <a:xfrm>
-          <a:off x="0" y="0"/>
-          <a:ext cx="0" cy="0"/>
-          <a:chOff x="0" y="0"/>
-          <a:chExt cx="0" cy="0"/>
-        </a:xfrm>
-      </p:grpSpPr>
-      <p:sp>
-        <p:nvSpPr>
-          <p:cNvPr id="256" name="Google Shape;256;g111b5217d00_0_224:notes"/>
-          <p:cNvSpPr/>
-          <p:nvPr>
-            <p:ph idx="2" type="sldImg"/>
-          </p:nvPr>
-        </p:nvSpPr>
-        <p:spPr>
-          <a:xfrm>
-            <a:off x="381300" y="685800"/>
-            <a:ext cx="6096000" cy="3429000"/>
-          </a:xfrm>
-          <a:custGeom>
-            <a:rect b="b" l="l" r="r" t="t"/>
-            <a:pathLst>
-              <a:path extrusionOk="0" h="120000" w="120000">
-                <a:moveTo>
-                  <a:pt x="0" y="0"/>
-                </a:moveTo>
-                <a:lnTo>
-                  <a:pt x="120000" y="0"/>
-                </a:lnTo>
-                <a:lnTo>
-                  <a:pt x="120000" y="120000"/>
-                </a:lnTo>
-                <a:lnTo>
-                  <a:pt x="0" y="120000"/>
-                </a:lnTo>
-                <a:close/>
-              </a:path>
-            </a:pathLst>
-          </a:custGeom>
-        </p:spPr>
-      </p:sp>
-      <p:sp>
-        <p:nvSpPr>
-          <p:cNvPr id="257" name="Google Shape;257;g111b5217d00_0_224:notes"/>
-          <p:cNvSpPr txBox="1"/>
-          <p:nvPr>
-            <p:ph idx="1" type="body"/>
-          </p:nvPr>
-        </p:nvSpPr>
-        <p:spPr>
-          <a:xfrm>
-            <a:off x="685800" y="4343400"/>
-            <a:ext cx="5486400" cy="4114800"/>
-          </a:xfrm>
-          <a:prstGeom prst="rect">
-            <a:avLst/>
-          </a:prstGeom>
-        </p:spPr>
-        <p:txBody>
-          <a:bodyPr anchorCtr="0" anchor="t" bIns="91425" lIns="91425" spcFirstLastPara="1" rIns="91425" wrap="square" tIns="91425">
-            <a:noAutofit/>
-          </a:bodyPr>
-          <a:lstStyle/>
-          <a:p>
-            <a:pPr indent="0" lvl="0" marL="0" rtl="0" algn="l">
-              <a:spcBef>
-                <a:spcPts val="0"/>
-              </a:spcBef>
-              <a:spcAft>
-                <a:spcPts val="0"/>
-              </a:spcAft>
-              <a:buNone/>
-            </a:pPr>
-            <a:r>
-              <a:t/>
-            </a:r>
-            <a:endParaRPr/>
-          </a:p>
-        </p:txBody>
-      </p:sp>
-    </p:spTree>
-  </p:cSld>
-  <p:clrMapOvr>
-    <a:masterClrMapping/>
-  </p:clrMapOvr>
-</p:notes>
-</file>
-
-<file path=ppt/notesSlides/notesSlide36.xml><?xml version="1.0" encoding="utf-8"?>
-<p:notes xmlns:a="http://schemas.openxmlformats.org/drawingml/2006/main" xmlns:r="http://schemas.openxmlformats.org/officeDocument/2006/relationships" xmlns:mc="http://schemas.openxmlformats.org/markup-compatibility/2006" xmlns:mv="urn:schemas-microsoft-com:mac:vml" xmlns:p="http://schemas.openxmlformats.org/presentationml/2006/main" xmlns:c="http://schemas.openxmlformats.org/drawingml/2006/chart" xmlns:dgm="http://schemas.openxmlformats.org/drawingml/2006/diagram" xmlns:o="urn:schemas-microsoft-com:office:office" xmlns:v="urn:schemas-microsoft-com:vml" xmlns:pvml="urn:schemas-microsoft-com:office:powerpoint" xmlns:com="http://schemas.openxmlformats.org/drawingml/2006/compatibility" xmlns:p14="http://schemas.microsoft.com/office/powerpoint/2010/main" xmlns:p15="http://schemas.microsoft.com/office/powerpoint/2012/main" xmlns:ahyp="http://schemas.microsoft.com/office/drawing/2018/hyperlinkcolor" showMasterPhAnim="0" showMasterSp="0">
-  <p:cSld>
-    <p:spTree>
-      <p:nvGrpSpPr>
-        <p:cNvPr id="261" name="Shape 261"/>
-        <p:cNvGrpSpPr/>
-        <p:nvPr/>
-      </p:nvGrpSpPr>
-      <p:grpSpPr>
-        <a:xfrm>
-          <a:off x="0" y="0"/>
-          <a:ext cx="0" cy="0"/>
-          <a:chOff x="0" y="0"/>
-          <a:chExt cx="0" cy="0"/>
-        </a:xfrm>
-      </p:grpSpPr>
-      <p:sp>
-        <p:nvSpPr>
-          <p:cNvPr id="262" name="Google Shape;262;g11193b24fb4_0_57:notes"/>
-          <p:cNvSpPr/>
-          <p:nvPr>
-            <p:ph idx="2" type="sldImg"/>
-          </p:nvPr>
-        </p:nvSpPr>
-        <p:spPr>
-          <a:xfrm>
-            <a:off x="381300" y="685800"/>
-            <a:ext cx="6096000" cy="3429000"/>
-          </a:xfrm>
-          <a:custGeom>
-            <a:rect b="b" l="l" r="r" t="t"/>
-            <a:pathLst>
-              <a:path extrusionOk="0" h="120000" w="120000">
-                <a:moveTo>
-                  <a:pt x="0" y="0"/>
-                </a:moveTo>
-                <a:lnTo>
-                  <a:pt x="120000" y="0"/>
-                </a:lnTo>
-                <a:lnTo>
-                  <a:pt x="120000" y="120000"/>
-                </a:lnTo>
-                <a:lnTo>
-                  <a:pt x="0" y="120000"/>
-                </a:lnTo>
-                <a:close/>
-              </a:path>
-            </a:pathLst>
-          </a:custGeom>
-        </p:spPr>
-      </p:sp>
-      <p:sp>
-        <p:nvSpPr>
-          <p:cNvPr id="263" name="Google Shape;263;g11193b24fb4_0_57:notes"/>
-          <p:cNvSpPr txBox="1"/>
-          <p:nvPr>
-            <p:ph idx="1" type="body"/>
-          </p:nvPr>
-        </p:nvSpPr>
-        <p:spPr>
-          <a:xfrm>
-            <a:off x="685800" y="4343400"/>
-            <a:ext cx="5486400" cy="4114800"/>
-          </a:xfrm>
-          <a:prstGeom prst="rect">
-            <a:avLst/>
-          </a:prstGeom>
-        </p:spPr>
-        <p:txBody>
-          <a:bodyPr anchorCtr="0" anchor="t" bIns="91425" lIns="91425" spcFirstLastPara="1" rIns="91425" wrap="square" tIns="91425">
-            <a:noAutofit/>
-          </a:bodyPr>
-          <a:lstStyle/>
-          <a:p>
-            <a:pPr indent="0" lvl="0" marL="0" rtl="0" algn="l">
-              <a:spcBef>
-                <a:spcPts val="0"/>
-              </a:spcBef>
-              <a:spcAft>
-                <a:spcPts val="0"/>
-              </a:spcAft>
-              <a:buNone/>
-            </a:pPr>
-            <a:r>
-              <a:t/>
-            </a:r>
-            <a:endParaRPr/>
-          </a:p>
-        </p:txBody>
-      </p:sp>
-    </p:spTree>
-  </p:cSld>
-  <p:clrMapOvr>
-    <a:masterClrMapping/>
-  </p:clrMapOvr>
-</p:notes>
-</file>
-
-<file path=ppt/notesSlides/notesSlide37.xml><?xml version="1.0" encoding="utf-8"?>
-<p:notes xmlns:a="http://schemas.openxmlformats.org/drawingml/2006/main" xmlns:r="http://schemas.openxmlformats.org/officeDocument/2006/relationships" xmlns:mc="http://schemas.openxmlformats.org/markup-compatibility/2006" xmlns:mv="urn:schemas-microsoft-com:mac:vml" xmlns:p="http://schemas.openxmlformats.org/presentationml/2006/main" xmlns:c="http://schemas.openxmlformats.org/drawingml/2006/chart" xmlns:dgm="http://schemas.openxmlformats.org/drawingml/2006/diagram" xmlns:o="urn:schemas-microsoft-com:office:office" xmlns:v="urn:schemas-microsoft-com:vml" xmlns:pvml="urn:schemas-microsoft-com:office:powerpoint" xmlns:com="http://schemas.openxmlformats.org/drawingml/2006/compatibility" xmlns:p14="http://schemas.microsoft.com/office/powerpoint/2010/main" xmlns:p15="http://schemas.microsoft.com/office/powerpoint/2012/main" xmlns:ahyp="http://schemas.microsoft.com/office/drawing/2018/hyperlinkcolor" showMasterPhAnim="0" showMasterSp="0">
-  <p:cSld>
-    <p:spTree>
-      <p:nvGrpSpPr>
-        <p:cNvPr id="266" name="Shape 266"/>
-        <p:cNvGrpSpPr/>
-        <p:nvPr/>
-      </p:nvGrpSpPr>
-      <p:grpSpPr>
-        <a:xfrm>
-          <a:off x="0" y="0"/>
-          <a:ext cx="0" cy="0"/>
-          <a:chOff x="0" y="0"/>
-          <a:chExt cx="0" cy="0"/>
-        </a:xfrm>
-      </p:grpSpPr>
-      <p:sp>
-        <p:nvSpPr>
-          <p:cNvPr id="267" name="Google Shape;267;g11193b24fb4_0_62:notes"/>
-          <p:cNvSpPr/>
-          <p:nvPr>
-            <p:ph idx="2" type="sldImg"/>
-          </p:nvPr>
-        </p:nvSpPr>
-        <p:spPr>
-          <a:xfrm>
-            <a:off x="381300" y="685800"/>
-            <a:ext cx="6096000" cy="3429000"/>
-          </a:xfrm>
-          <a:custGeom>
-            <a:rect b="b" l="l" r="r" t="t"/>
-            <a:pathLst>
-              <a:path extrusionOk="0" h="120000" w="120000">
-                <a:moveTo>
-                  <a:pt x="0" y="0"/>
-                </a:moveTo>
-                <a:lnTo>
-                  <a:pt x="120000" y="0"/>
-                </a:lnTo>
-                <a:lnTo>
-                  <a:pt x="120000" y="120000"/>
-                </a:lnTo>
-                <a:lnTo>
-                  <a:pt x="0" y="120000"/>
-                </a:lnTo>
-                <a:close/>
-              </a:path>
-            </a:pathLst>
-          </a:custGeom>
-        </p:spPr>
-      </p:sp>
-      <p:sp>
-        <p:nvSpPr>
-          <p:cNvPr id="268" name="Google Shape;268;g11193b24fb4_0_62:notes"/>
-          <p:cNvSpPr txBox="1"/>
-          <p:nvPr>
-            <p:ph idx="1" type="body"/>
-          </p:nvPr>
-        </p:nvSpPr>
-        <p:spPr>
-          <a:xfrm>
-            <a:off x="685800" y="4343400"/>
-            <a:ext cx="5486400" cy="4114800"/>
-          </a:xfrm>
-          <a:prstGeom prst="rect">
-            <a:avLst/>
-          </a:prstGeom>
-        </p:spPr>
-        <p:txBody>
-          <a:bodyPr anchorCtr="0" anchor="t" bIns="91425" lIns="91425" spcFirstLastPara="1" rIns="91425" wrap="square" tIns="91425">
-            <a:noAutofit/>
-          </a:bodyPr>
-          <a:lstStyle/>
-          <a:p>
-            <a:pPr indent="0" lvl="0" marL="0" rtl="0" algn="l">
-              <a:spcBef>
-                <a:spcPts val="0"/>
-              </a:spcBef>
-              <a:spcAft>
-                <a:spcPts val="0"/>
-              </a:spcAft>
-              <a:buNone/>
-            </a:pPr>
-            <a:r>
-              <a:t/>
-            </a:r>
-            <a:endParaRPr/>
-          </a:p>
-        </p:txBody>
-      </p:sp>
-    </p:spTree>
-  </p:cSld>
-  <p:clrMapOvr>
-    <a:masterClrMapping/>
-  </p:clrMapOvr>
-</p:notes>
-</file>
-
-<file path=ppt/notesSlides/notesSlide38.xml><?xml version="1.0" encoding="utf-8"?>
-<p:notes xmlns:a="http://schemas.openxmlformats.org/drawingml/2006/main" xmlns:r="http://schemas.openxmlformats.org/officeDocument/2006/relationships" xmlns:mc="http://schemas.openxmlformats.org/markup-compatibility/2006" xmlns:mv="urn:schemas-microsoft-com:mac:vml" xmlns:p="http://schemas.openxmlformats.org/presentationml/2006/main" xmlns:c="http://schemas.openxmlformats.org/drawingml/2006/chart" xmlns:dgm="http://schemas.openxmlformats.org/drawingml/2006/diagram" xmlns:o="urn:schemas-microsoft-com:office:office" xmlns:v="urn:schemas-microsoft-com:vml" xmlns:pvml="urn:schemas-microsoft-com:office:powerpoint" xmlns:com="http://schemas.openxmlformats.org/drawingml/2006/compatibility" xmlns:p14="http://schemas.microsoft.com/office/powerpoint/2010/main" xmlns:p15="http://schemas.microsoft.com/office/powerpoint/2012/main" xmlns:ahyp="http://schemas.microsoft.com/office/drawing/2018/hyperlinkcolor" showMasterPhAnim="0" showMasterSp="0">
-  <p:cSld>
-    <p:spTree>
-      <p:nvGrpSpPr>
-        <p:cNvPr id="271" name="Shape 271"/>
-        <p:cNvGrpSpPr/>
-        <p:nvPr/>
-      </p:nvGrpSpPr>
-      <p:grpSpPr>
-        <a:xfrm>
-          <a:off x="0" y="0"/>
-          <a:ext cx="0" cy="0"/>
-          <a:chOff x="0" y="0"/>
-          <a:chExt cx="0" cy="0"/>
-        </a:xfrm>
-      </p:grpSpPr>
-      <p:sp>
-        <p:nvSpPr>
-          <p:cNvPr id="272" name="Google Shape;272;g111b5217d00_0_320:notes"/>
-          <p:cNvSpPr/>
-          <p:nvPr>
-            <p:ph idx="2" type="sldImg"/>
-          </p:nvPr>
-        </p:nvSpPr>
-        <p:spPr>
-          <a:xfrm>
-            <a:off x="381300" y="685800"/>
-            <a:ext cx="6096000" cy="3429000"/>
-          </a:xfrm>
-          <a:custGeom>
-            <a:rect b="b" l="l" r="r" t="t"/>
-            <a:pathLst>
-              <a:path extrusionOk="0" h="120000" w="120000">
-                <a:moveTo>
-                  <a:pt x="0" y="0"/>
-                </a:moveTo>
-                <a:lnTo>
-                  <a:pt x="120000" y="0"/>
-                </a:lnTo>
-                <a:lnTo>
-                  <a:pt x="120000" y="120000"/>
-                </a:lnTo>
-                <a:lnTo>
-                  <a:pt x="0" y="120000"/>
-                </a:lnTo>
-                <a:close/>
-              </a:path>
-            </a:pathLst>
-          </a:custGeom>
-        </p:spPr>
-      </p:sp>
-      <p:sp>
-        <p:nvSpPr>
-          <p:cNvPr id="273" name="Google Shape;273;g111b5217d00_0_320:notes"/>
-          <p:cNvSpPr txBox="1"/>
-          <p:nvPr>
-            <p:ph idx="1" type="body"/>
-          </p:nvPr>
-        </p:nvSpPr>
-        <p:spPr>
-          <a:xfrm>
-            <a:off x="685800" y="4343400"/>
-            <a:ext cx="5486400" cy="4114800"/>
-          </a:xfrm>
-          <a:prstGeom prst="rect">
-            <a:avLst/>
-          </a:prstGeom>
-        </p:spPr>
-        <p:txBody>
-          <a:bodyPr anchorCtr="0" anchor="t" bIns="91425" lIns="91425" spcFirstLastPara="1" rIns="91425" wrap="square" tIns="91425">
-            <a:noAutofit/>
-          </a:bodyPr>
-          <a:lstStyle/>
-          <a:p>
-            <a:pPr indent="0" lvl="0" marL="0" rtl="0" algn="l">
-              <a:spcBef>
-                <a:spcPts val="0"/>
-              </a:spcBef>
-              <a:spcAft>
-                <a:spcPts val="0"/>
-              </a:spcAft>
-              <a:buNone/>
-            </a:pPr>
-            <a:r>
-              <a:t/>
-            </a:r>
-            <a:endParaRPr/>
-          </a:p>
-        </p:txBody>
-      </p:sp>
-    </p:spTree>
-  </p:cSld>
-  <p:clrMapOvr>
-    <a:masterClrMapping/>
-  </p:clrMapOvr>
-</p:notes>
-</file>
-
-<file path=ppt/notesSlides/notesSlide39.xml><?xml version="1.0" encoding="utf-8"?>
-<p:notes xmlns:a="http://schemas.openxmlformats.org/drawingml/2006/main" xmlns:r="http://schemas.openxmlformats.org/officeDocument/2006/relationships" xmlns:mc="http://schemas.openxmlformats.org/markup-compatibility/2006" xmlns:mv="urn:schemas-microsoft-com:mac:vml" xmlns:p="http://schemas.openxmlformats.org/presentationml/2006/main" xmlns:c="http://schemas.openxmlformats.org/drawingml/2006/chart" xmlns:dgm="http://schemas.openxmlformats.org/drawingml/2006/diagram" xmlns:o="urn:schemas-microsoft-com:office:office" xmlns:v="urn:schemas-microsoft-com:vml" xmlns:pvml="urn:schemas-microsoft-com:office:powerpoint" xmlns:com="http://schemas.openxmlformats.org/drawingml/2006/compatibility" xmlns:p14="http://schemas.microsoft.com/office/powerpoint/2010/main" xmlns:p15="http://schemas.microsoft.com/office/powerpoint/2012/main" xmlns:ahyp="http://schemas.microsoft.com/office/drawing/2018/hyperlinkcolor" showMasterPhAnim="0" showMasterSp="0">
-  <p:cSld>
-    <p:spTree>
-      <p:nvGrpSpPr>
-        <p:cNvPr id="277" name="Shape 277"/>
-        <p:cNvGrpSpPr/>
-        <p:nvPr/>
-      </p:nvGrpSpPr>
-      <p:grpSpPr>
-        <a:xfrm>
-          <a:off x="0" y="0"/>
-          <a:ext cx="0" cy="0"/>
-          <a:chOff x="0" y="0"/>
-          <a:chExt cx="0" cy="0"/>
-        </a:xfrm>
-      </p:grpSpPr>
-      <p:sp>
-        <p:nvSpPr>
-          <p:cNvPr id="278" name="Google Shape;278;g111b5217d00_0_351:notes"/>
-          <p:cNvSpPr/>
-          <p:nvPr>
-            <p:ph idx="2" type="sldImg"/>
-          </p:nvPr>
-        </p:nvSpPr>
-        <p:spPr>
-          <a:xfrm>
-            <a:off x="381300" y="685800"/>
-            <a:ext cx="6096000" cy="3429000"/>
-          </a:xfrm>
-          <a:custGeom>
-            <a:rect b="b" l="l" r="r" t="t"/>
-            <a:pathLst>
-              <a:path extrusionOk="0" h="120000" w="120000">
-                <a:moveTo>
-                  <a:pt x="0" y="0"/>
-                </a:moveTo>
-                <a:lnTo>
-                  <a:pt x="120000" y="0"/>
-                </a:lnTo>
-                <a:lnTo>
-                  <a:pt x="120000" y="120000"/>
-                </a:lnTo>
-                <a:lnTo>
-                  <a:pt x="0" y="120000"/>
-                </a:lnTo>
-                <a:close/>
-              </a:path>
-            </a:pathLst>
-          </a:custGeom>
-        </p:spPr>
-      </p:sp>
-      <p:sp>
-        <p:nvSpPr>
-          <p:cNvPr id="279" name="Google Shape;279;g111b5217d00_0_351:notes"/>
+          <p:cNvPr id="228" name="Google Shape;228;g11193b24fb4_0_67:notes"/>
           <p:cNvSpPr txBox="1"/>
           <p:nvPr>
             <p:ph idx="1" type="body"/>
@@ -4047,105 +3146,6 @@
       <p:sp>
         <p:nvSpPr>
           <p:cNvPr id="70" name="Google Shape;70;g11193b24fb4_0_28:notes"/>
-          <p:cNvSpPr txBox="1"/>
-          <p:nvPr>
-            <p:ph idx="1" type="body"/>
-          </p:nvPr>
-        </p:nvSpPr>
-        <p:spPr>
-          <a:xfrm>
-            <a:off x="685800" y="4343400"/>
-            <a:ext cx="5486400" cy="4114800"/>
-          </a:xfrm>
-          <a:prstGeom prst="rect">
-            <a:avLst/>
-          </a:prstGeom>
-        </p:spPr>
-        <p:txBody>
-          <a:bodyPr anchorCtr="0" anchor="t" bIns="91425" lIns="91425" spcFirstLastPara="1" rIns="91425" wrap="square" tIns="91425">
-            <a:noAutofit/>
-          </a:bodyPr>
-          <a:lstStyle/>
-          <a:p>
-            <a:pPr indent="0" lvl="0" marL="0" rtl="0" algn="l">
-              <a:spcBef>
-                <a:spcPts val="0"/>
-              </a:spcBef>
-              <a:spcAft>
-                <a:spcPts val="0"/>
-              </a:spcAft>
-              <a:buNone/>
-            </a:pPr>
-            <a:r>
-              <a:t/>
-            </a:r>
-            <a:endParaRPr/>
-          </a:p>
-        </p:txBody>
-      </p:sp>
-    </p:spTree>
-  </p:cSld>
-  <p:clrMapOvr>
-    <a:masterClrMapping/>
-  </p:clrMapOvr>
-</p:notes>
-</file>
-
-<file path=ppt/notesSlides/notesSlide40.xml><?xml version="1.0" encoding="utf-8"?>
-<p:notes xmlns:a="http://schemas.openxmlformats.org/drawingml/2006/main" xmlns:r="http://schemas.openxmlformats.org/officeDocument/2006/relationships" xmlns:mc="http://schemas.openxmlformats.org/markup-compatibility/2006" xmlns:mv="urn:schemas-microsoft-com:mac:vml" xmlns:p="http://schemas.openxmlformats.org/presentationml/2006/main" xmlns:c="http://schemas.openxmlformats.org/drawingml/2006/chart" xmlns:dgm="http://schemas.openxmlformats.org/drawingml/2006/diagram" xmlns:o="urn:schemas-microsoft-com:office:office" xmlns:v="urn:schemas-microsoft-com:vml" xmlns:pvml="urn:schemas-microsoft-com:office:powerpoint" xmlns:com="http://schemas.openxmlformats.org/drawingml/2006/compatibility" xmlns:p14="http://schemas.microsoft.com/office/powerpoint/2010/main" xmlns:p15="http://schemas.microsoft.com/office/powerpoint/2012/main" xmlns:ahyp="http://schemas.microsoft.com/office/drawing/2018/hyperlinkcolor" showMasterPhAnim="0" showMasterSp="0">
-  <p:cSld>
-    <p:spTree>
-      <p:nvGrpSpPr>
-        <p:cNvPr id="282" name="Shape 282"/>
-        <p:cNvGrpSpPr/>
-        <p:nvPr/>
-      </p:nvGrpSpPr>
-      <p:grpSpPr>
-        <a:xfrm>
-          <a:off x="0" y="0"/>
-          <a:ext cx="0" cy="0"/>
-          <a:chOff x="0" y="0"/>
-          <a:chExt cx="0" cy="0"/>
-        </a:xfrm>
-      </p:grpSpPr>
-      <p:sp>
-        <p:nvSpPr>
-          <p:cNvPr id="283" name="Google Shape;283;g11193b24fb4_0_67:notes"/>
-          <p:cNvSpPr/>
-          <p:nvPr>
-            <p:ph idx="2" type="sldImg"/>
-          </p:nvPr>
-        </p:nvSpPr>
-        <p:spPr>
-          <a:xfrm>
-            <a:off x="381300" y="685800"/>
-            <a:ext cx="6096000" cy="3429000"/>
-          </a:xfrm>
-          <a:custGeom>
-            <a:rect b="b" l="l" r="r" t="t"/>
-            <a:pathLst>
-              <a:path extrusionOk="0" h="120000" w="120000">
-                <a:moveTo>
-                  <a:pt x="0" y="0"/>
-                </a:moveTo>
-                <a:lnTo>
-                  <a:pt x="120000" y="0"/>
-                </a:lnTo>
-                <a:lnTo>
-                  <a:pt x="120000" y="120000"/>
-                </a:lnTo>
-                <a:lnTo>
-                  <a:pt x="0" y="120000"/>
-                </a:lnTo>
-                <a:close/>
-              </a:path>
-            </a:pathLst>
-          </a:custGeom>
-        </p:spPr>
-      </p:sp>
-      <p:sp>
-        <p:nvSpPr>
-          <p:cNvPr id="284" name="Google Shape;284;g11193b24fb4_0_67:notes"/>
           <p:cNvSpPr txBox="1"/>
           <p:nvPr>
             <p:ph idx="1" type="body"/>
@@ -9505,7 +8505,7 @@
             </a:pPr>
             <a:r>
               <a:rPr lang="en"/>
-              <a:t>Sprint 4 Summary + retrospective overview</a:t>
+              <a:t>Sprint 5 Summary + retrospective overview</a:t>
             </a:r>
             <a:endParaRPr/>
           </a:p>
@@ -9611,7 +8611,7 @@
             </a:pPr>
             <a:r>
               <a:rPr lang="en"/>
-              <a:t>Build out the contact tracing, chat, notifications, dashboards, and appointments flows</a:t>
+              <a:t>Make the chat page reactive</a:t>
             </a:r>
             <a:endParaRPr/>
           </a:p>
@@ -9628,7 +8628,7 @@
             </a:pPr>
             <a:r>
               <a:rPr lang="en"/>
-              <a:t>Refine some of the previous flows and use cases to reduce friction and the number of clicks it takes to do an action</a:t>
+              <a:t>Do some minor UI improvements</a:t>
             </a:r>
             <a:endParaRPr/>
           </a:p>
@@ -9672,7 +8672,7 @@
                   <a:srgbClr val="00FF00"/>
                 </a:highlight>
               </a:rPr>
-              <a:t>67</a:t>
+              <a:t>0</a:t>
             </a:r>
             <a:r>
               <a:rPr lang="en">
@@ -9709,7 +8709,7 @@
                   <a:srgbClr val="00FF00"/>
                 </a:highlight>
               </a:rPr>
-              <a:t>83</a:t>
+              <a:t>9</a:t>
             </a:r>
             <a:r>
               <a:rPr lang="en">
@@ -9847,8 +8847,8 @@
         </p:blipFill>
         <p:spPr>
           <a:xfrm>
-            <a:off x="1645738" y="1152476"/>
-            <a:ext cx="5852525" cy="3734550"/>
+            <a:off x="1833563" y="1152475"/>
+            <a:ext cx="5476875" cy="3562350"/>
           </a:xfrm>
           <a:prstGeom prst="rect">
             <a:avLst/>
@@ -10035,6 +9035,23 @@
             </a:pPr>
             <a:r>
               <a:rPr lang="en"/>
+              <a:t>Sprint 5 -&gt; 9 USP</a:t>
+            </a:r>
+            <a:endParaRPr/>
+          </a:p>
+          <a:p>
+            <a:pPr indent="-342900" lvl="0" marL="457200" rtl="0" algn="l">
+              <a:spcBef>
+                <a:spcPts val="0"/>
+              </a:spcBef>
+              <a:spcAft>
+                <a:spcPts val="0"/>
+              </a:spcAft>
+              <a:buSzPts val="1800"/>
+              <a:buChar char="-"/>
+            </a:pPr>
+            <a:r>
+              <a:rPr lang="en"/>
               <a:t>Velocity = </a:t>
             </a:r>
             <a:r>
@@ -10043,15 +9060,7 @@
                   <a:srgbClr val="00FF00"/>
                 </a:highlight>
               </a:rPr>
-              <a:t>72</a:t>
-            </a:r>
-            <a:r>
-              <a:rPr lang="en">
-                <a:highlight>
-                  <a:srgbClr val="00FF00"/>
-                </a:highlight>
-              </a:rPr>
-              <a:t> USP</a:t>
+              <a:t>59.4 USP</a:t>
             </a:r>
             <a:endParaRPr>
               <a:highlight>
@@ -10215,8 +9224,8 @@
         </p:blipFill>
         <p:spPr>
           <a:xfrm>
-            <a:off x="1638375" y="1088025"/>
-            <a:ext cx="5867250" cy="3826875"/>
+            <a:off x="1600200" y="1152475"/>
+            <a:ext cx="5943600" cy="3590925"/>
           </a:xfrm>
           <a:prstGeom prst="rect">
             <a:avLst/>
@@ -10399,7 +9408,7 @@
                   <a:srgbClr val="00FF00"/>
                 </a:highlight>
               </a:rPr>
-              <a:t>14 different risks</a:t>
+              <a:t>15 different risks</a:t>
             </a:r>
             <a:r>
               <a:rPr lang="en"/>
@@ -10424,11 +9433,19 @@
                   <a:srgbClr val="00FF00"/>
                 </a:highlight>
               </a:rPr>
-              <a:t>2 new risks</a:t>
+              <a:t>1 </a:t>
+            </a:r>
+            <a:r>
+              <a:rPr lang="en">
+                <a:highlight>
+                  <a:srgbClr val="00FF00"/>
+                </a:highlight>
+              </a:rPr>
+              <a:t>new risk</a:t>
             </a:r>
             <a:r>
               <a:rPr lang="en"/>
-              <a:t> were identified in S</a:t>
+              <a:t> was identified in S</a:t>
             </a:r>
             <a:r>
               <a:rPr lang="en"/>
@@ -10436,7 +9453,7 @@
             </a:r>
             <a:r>
               <a:rPr lang="en"/>
-              <a:t> 4</a:t>
+              <a:t> 5</a:t>
             </a:r>
             <a:endParaRPr/>
           </a:p>
@@ -10501,7 +9518,7 @@
             </a:pPr>
             <a:r>
               <a:rPr lang="en"/>
-              <a:t>Risk(s) identified in sprint 4</a:t>
+              <a:t>Risk(s) identified in sprint 5</a:t>
             </a:r>
             <a:endParaRPr/>
           </a:p>
@@ -10562,8 +9579,8 @@
         </p:blipFill>
         <p:spPr>
           <a:xfrm>
-            <a:off x="1481125" y="1152463"/>
-            <a:ext cx="6181725" cy="3476625"/>
+            <a:off x="911702" y="1964513"/>
+            <a:ext cx="7320601" cy="1214475"/>
           </a:xfrm>
           <a:prstGeom prst="rect">
             <a:avLst/>
@@ -10694,8 +9711,8 @@
         </p:blipFill>
         <p:spPr>
           <a:xfrm>
-            <a:off x="1873200" y="1196625"/>
-            <a:ext cx="5397601" cy="3706575"/>
+            <a:off x="1760824" y="1152474"/>
+            <a:ext cx="5622350" cy="3858125"/>
           </a:xfrm>
           <a:prstGeom prst="rect">
             <a:avLst/>
@@ -10765,7 +9782,7 @@
             </a:pPr>
             <a:r>
               <a:rPr lang="en"/>
-              <a:t>UI Prototype showcase</a:t>
+              <a:t>Architecture review + tech stack</a:t>
             </a:r>
             <a:endParaRPr/>
           </a:p>
@@ -10974,12 +9991,281 @@
           <p:cNvPr id="169" name="Google Shape;169;p32"/>
           <p:cNvSpPr txBox="1"/>
           <p:nvPr>
+            <p:ph idx="1" type="body"/>
+          </p:nvPr>
+        </p:nvSpPr>
+        <p:spPr>
+          <a:xfrm>
+            <a:off x="311700" y="1152475"/>
+            <a:ext cx="8520600" cy="3416400"/>
+          </a:xfrm>
+          <a:prstGeom prst="rect">
+            <a:avLst/>
+          </a:prstGeom>
+        </p:spPr>
+        <p:txBody>
+          <a:bodyPr anchorCtr="0" anchor="t" bIns="91425" lIns="91425" spcFirstLastPara="1" rIns="91425" wrap="square" tIns="91425">
+            <a:normAutofit/>
+          </a:bodyPr>
+          <a:lstStyle/>
+          <a:p>
+            <a:pPr indent="0" lvl="0" marL="0" rtl="0" algn="just">
+              <a:spcBef>
+                <a:spcPts val="0"/>
+              </a:spcBef>
+              <a:spcAft>
+                <a:spcPts val="0"/>
+              </a:spcAft>
+              <a:buClr>
+                <a:schemeClr val="dk1"/>
+              </a:buClr>
+              <a:buSzPts val="1100"/>
+              <a:buFont typeface="Arial"/>
+              <a:buNone/>
+            </a:pPr>
+            <a:r>
+              <a:rPr lang="en">
+                <a:solidFill>
+                  <a:schemeClr val="dk1"/>
+                </a:solidFill>
+              </a:rPr>
+              <a:t>Updated our viewpoints to the 4+1 view model</a:t>
+            </a:r>
+            <a:endParaRPr>
+              <a:solidFill>
+                <a:schemeClr val="dk1"/>
+              </a:solidFill>
+            </a:endParaRPr>
+          </a:p>
+          <a:p>
+            <a:pPr indent="0" lvl="0" marL="0" rtl="0" algn="just">
+              <a:spcBef>
+                <a:spcPts val="0"/>
+              </a:spcBef>
+              <a:spcAft>
+                <a:spcPts val="0"/>
+              </a:spcAft>
+              <a:buClr>
+                <a:schemeClr val="dk1"/>
+              </a:buClr>
+              <a:buSzPts val="1100"/>
+              <a:buFont typeface="Arial"/>
+              <a:buNone/>
+            </a:pPr>
+            <a:r>
+              <a:rPr lang="en">
+                <a:solidFill>
+                  <a:schemeClr val="dk1"/>
+                </a:solidFill>
+              </a:rPr>
+              <a:t>The following 5 viewpoints have been identified to describe CovidTracker:</a:t>
+            </a:r>
+            <a:endParaRPr>
+              <a:solidFill>
+                <a:schemeClr val="dk1"/>
+              </a:solidFill>
+            </a:endParaRPr>
+          </a:p>
+          <a:p>
+            <a:pPr indent="-342900" lvl="0" marL="457200" rtl="0" algn="just">
+              <a:spcBef>
+                <a:spcPts val="0"/>
+              </a:spcBef>
+              <a:spcAft>
+                <a:spcPts val="0"/>
+              </a:spcAft>
+              <a:buClr>
+                <a:schemeClr val="dk1"/>
+              </a:buClr>
+              <a:buSzPts val="1800"/>
+              <a:buChar char="-"/>
+            </a:pPr>
+            <a:r>
+              <a:rPr lang="en">
+                <a:solidFill>
+                  <a:schemeClr val="dk1"/>
+                </a:solidFill>
+              </a:rPr>
+              <a:t>Scenarios</a:t>
+            </a:r>
+            <a:endParaRPr>
+              <a:solidFill>
+                <a:schemeClr val="dk1"/>
+              </a:solidFill>
+            </a:endParaRPr>
+          </a:p>
+          <a:p>
+            <a:pPr indent="-342900" lvl="0" marL="457200" rtl="0" algn="just">
+              <a:spcBef>
+                <a:spcPts val="0"/>
+              </a:spcBef>
+              <a:spcAft>
+                <a:spcPts val="0"/>
+              </a:spcAft>
+              <a:buClr>
+                <a:schemeClr val="dk1"/>
+              </a:buClr>
+              <a:buSzPts val="1800"/>
+              <a:buChar char="-"/>
+            </a:pPr>
+            <a:r>
+              <a:rPr lang="en">
+                <a:solidFill>
+                  <a:schemeClr val="dk1"/>
+                </a:solidFill>
+              </a:rPr>
+              <a:t>Development View</a:t>
+            </a:r>
+            <a:endParaRPr>
+              <a:solidFill>
+                <a:schemeClr val="dk1"/>
+              </a:solidFill>
+            </a:endParaRPr>
+          </a:p>
+          <a:p>
+            <a:pPr indent="-342900" lvl="0" marL="457200" rtl="0" algn="just">
+              <a:spcBef>
+                <a:spcPts val="0"/>
+              </a:spcBef>
+              <a:spcAft>
+                <a:spcPts val="0"/>
+              </a:spcAft>
+              <a:buClr>
+                <a:schemeClr val="dk1"/>
+              </a:buClr>
+              <a:buSzPts val="1800"/>
+              <a:buChar char="-"/>
+            </a:pPr>
+            <a:r>
+              <a:rPr lang="en">
+                <a:solidFill>
+                  <a:schemeClr val="dk1"/>
+                </a:solidFill>
+              </a:rPr>
+              <a:t>Logical View</a:t>
+            </a:r>
+            <a:endParaRPr>
+              <a:solidFill>
+                <a:schemeClr val="dk1"/>
+              </a:solidFill>
+            </a:endParaRPr>
+          </a:p>
+          <a:p>
+            <a:pPr indent="-342900" lvl="0" marL="457200" rtl="0" algn="just">
+              <a:spcBef>
+                <a:spcPts val="0"/>
+              </a:spcBef>
+              <a:spcAft>
+                <a:spcPts val="0"/>
+              </a:spcAft>
+              <a:buClr>
+                <a:schemeClr val="dk1"/>
+              </a:buClr>
+              <a:buSzPts val="1800"/>
+              <a:buChar char="-"/>
+            </a:pPr>
+            <a:r>
+              <a:rPr lang="en">
+                <a:solidFill>
+                  <a:schemeClr val="dk1"/>
+                </a:solidFill>
+              </a:rPr>
+              <a:t>Process View</a:t>
+            </a:r>
+            <a:endParaRPr>
+              <a:solidFill>
+                <a:schemeClr val="dk1"/>
+              </a:solidFill>
+            </a:endParaRPr>
+          </a:p>
+          <a:p>
+            <a:pPr indent="-342900" lvl="0" marL="457200" rtl="0" algn="just">
+              <a:spcBef>
+                <a:spcPts val="0"/>
+              </a:spcBef>
+              <a:spcAft>
+                <a:spcPts val="0"/>
+              </a:spcAft>
+              <a:buClr>
+                <a:schemeClr val="dk1"/>
+              </a:buClr>
+              <a:buSzPts val="1800"/>
+              <a:buChar char="-"/>
+            </a:pPr>
+            <a:r>
+              <a:rPr lang="en">
+                <a:solidFill>
+                  <a:schemeClr val="dk1"/>
+                </a:solidFill>
+              </a:rPr>
+              <a:t>Physical View</a:t>
+            </a:r>
+            <a:endParaRPr>
+              <a:solidFill>
+                <a:schemeClr val="dk1"/>
+              </a:solidFill>
+            </a:endParaRPr>
+          </a:p>
+          <a:p>
+            <a:pPr indent="0" lvl="0" marL="0" rtl="0" algn="just">
+              <a:spcBef>
+                <a:spcPts val="0"/>
+              </a:spcBef>
+              <a:spcAft>
+                <a:spcPts val="0"/>
+              </a:spcAft>
+              <a:buNone/>
+            </a:pPr>
+            <a:r>
+              <a:t/>
+            </a:r>
+            <a:endParaRPr>
+              <a:solidFill>
+                <a:schemeClr val="dk1"/>
+              </a:solidFill>
+            </a:endParaRPr>
+          </a:p>
+          <a:p>
+            <a:pPr indent="-342900" lvl="0" marL="457200" rtl="0" algn="just">
+              <a:spcBef>
+                <a:spcPts val="0"/>
+              </a:spcBef>
+              <a:spcAft>
+                <a:spcPts val="0"/>
+              </a:spcAft>
+              <a:buClr>
+                <a:schemeClr val="dk1"/>
+              </a:buClr>
+              <a:buSzPts val="1800"/>
+              <a:buChar char="-"/>
+            </a:pPr>
+            <a:r>
+              <a:rPr lang="en">
+                <a:solidFill>
+                  <a:schemeClr val="dk1"/>
+                </a:solidFill>
+              </a:rPr>
+              <a:t>All the diagrams can be seen in the document, let me know if you want to reference any of them</a:t>
+            </a:r>
+            <a:endParaRPr>
+              <a:solidFill>
+                <a:schemeClr val="dk1"/>
+              </a:solidFill>
+            </a:endParaRPr>
+          </a:p>
+        </p:txBody>
+      </p:sp>
+      <p:sp>
+        <p:nvSpPr>
+          <p:cNvPr id="170" name="Google Shape;170;p32"/>
+          <p:cNvSpPr txBox="1"/>
+          <p:nvPr>
             <p:ph type="title"/>
           </p:nvPr>
         </p:nvSpPr>
         <p:spPr>
           <a:xfrm>
-            <a:off x="311700" y="2285400"/>
+            <a:off x="311700" y="445025"/>
             <a:ext cx="8520600" cy="572700"/>
           </a:xfrm>
           <a:prstGeom prst="rect">
@@ -10992,7 +10278,7 @@
           </a:bodyPr>
           <a:lstStyle/>
           <a:p>
-            <a:pPr indent="0" lvl="0" marL="0" rtl="0" algn="ctr">
+            <a:pPr indent="0" lvl="0" marL="0" rtl="0" algn="l">
               <a:spcBef>
                 <a:spcPts val="0"/>
               </a:spcBef>
@@ -11003,11 +10289,7 @@
             </a:pPr>
             <a:r>
               <a:rPr lang="en"/>
-              <a:t>Let's</a:t>
-            </a:r>
-            <a:r>
-              <a:rPr lang="en"/>
-              <a:t> go into Figma and see the UI mockups and interactive prototypes</a:t>
+              <a:t>Our systems viewpoints</a:t>
             </a:r>
             <a:endParaRPr/>
           </a:p>
@@ -11026,7 +10308,7 @@
   <p:cSld>
     <p:spTree>
       <p:nvGrpSpPr>
-        <p:cNvPr id="173" name="Shape 173"/>
+        <p:cNvPr id="174" name="Shape 174"/>
         <p:cNvGrpSpPr/>
         <p:nvPr/>
       </p:nvGrpSpPr>
@@ -11040,7 +10322,7 @@
       </p:grpSpPr>
       <p:sp>
         <p:nvSpPr>
-          <p:cNvPr id="174" name="Google Shape;174;p33"/>
+          <p:cNvPr id="175" name="Google Shape;175;p33"/>
           <p:cNvSpPr txBox="1"/>
           <p:nvPr>
             <p:ph type="title"/>
@@ -11048,36 +10330,161 @@
         </p:nvSpPr>
         <p:spPr>
           <a:xfrm>
-            <a:off x="311700" y="2150850"/>
-            <a:ext cx="8520600" cy="841800"/>
+            <a:off x="311700" y="445025"/>
+            <a:ext cx="8520600" cy="572700"/>
           </a:xfrm>
           <a:prstGeom prst="rect">
             <a:avLst/>
           </a:prstGeom>
         </p:spPr>
         <p:txBody>
-          <a:bodyPr anchorCtr="0" anchor="ctr" bIns="91425" lIns="91425" spcFirstLastPara="1" rIns="91425" wrap="square" tIns="91425">
+          <a:bodyPr anchorCtr="0" anchor="t" bIns="91425" lIns="91425" spcFirstLastPara="1" rIns="91425" wrap="square" tIns="91425">
+            <a:normAutofit fontScale="90000"/>
+          </a:bodyPr>
+          <a:lstStyle/>
+          <a:p>
+            <a:pPr indent="0" lvl="0" marL="0" rtl="0" algn="l">
+              <a:spcBef>
+                <a:spcPts val="0"/>
+              </a:spcBef>
+              <a:spcAft>
+                <a:spcPts val="0"/>
+              </a:spcAft>
+              <a:buNone/>
+            </a:pPr>
+            <a:r>
+              <a:rPr lang="en"/>
+              <a:t>Deployment</a:t>
+            </a:r>
+            <a:endParaRPr/>
+          </a:p>
+        </p:txBody>
+      </p:sp>
+      <p:sp>
+        <p:nvSpPr>
+          <p:cNvPr id="176" name="Google Shape;176;p33"/>
+          <p:cNvSpPr txBox="1"/>
+          <p:nvPr>
+            <p:ph idx="1" type="body"/>
+          </p:nvPr>
+        </p:nvSpPr>
+        <p:spPr>
+          <a:xfrm>
+            <a:off x="311700" y="1152475"/>
+            <a:ext cx="8520600" cy="3416400"/>
+          </a:xfrm>
+          <a:prstGeom prst="rect">
+            <a:avLst/>
+          </a:prstGeom>
+        </p:spPr>
+        <p:txBody>
+          <a:bodyPr anchorCtr="0" anchor="t" bIns="91425" lIns="91425" spcFirstLastPara="1" rIns="91425" wrap="square" tIns="91425">
             <a:normAutofit/>
           </a:bodyPr>
           <a:lstStyle/>
           <a:p>
-            <a:pPr indent="0" lvl="0" marL="0" rtl="0" algn="ctr">
-              <a:spcBef>
-                <a:spcPts val="0"/>
-              </a:spcBef>
-              <a:spcAft>
-                <a:spcPts val="0"/>
-              </a:spcAft>
-              <a:buNone/>
+            <a:pPr indent="-342900" lvl="0" marL="457200" rtl="0" algn="l">
+              <a:spcBef>
+                <a:spcPts val="0"/>
+              </a:spcBef>
+              <a:spcAft>
+                <a:spcPts val="0"/>
+              </a:spcAft>
+              <a:buSzPts val="1800"/>
+              <a:buChar char="-"/>
             </a:pPr>
             <a:r>
               <a:rPr lang="en"/>
-              <a:t>Architecture review + tech stack</a:t>
+              <a:t>Deployed on S3 + ECS</a:t>
+            </a:r>
+            <a:endParaRPr/>
+          </a:p>
+          <a:p>
+            <a:pPr indent="-342900" lvl="0" marL="457200" rtl="0" algn="l">
+              <a:spcBef>
+                <a:spcPts val="0"/>
+              </a:spcBef>
+              <a:spcAft>
+                <a:spcPts val="0"/>
+              </a:spcAft>
+              <a:buSzPts val="1800"/>
+              <a:buChar char="-"/>
+            </a:pPr>
+            <a:r>
+              <a:rPr lang="en" u="sng">
+                <a:solidFill>
+                  <a:schemeClr val="hlink"/>
+                </a:solidFill>
+                <a:hlinkClick r:id="rId3"/>
+              </a:rPr>
+              <a:t>http://covid-tracker-client-bucket.s3-website.us-east-2.amazonaws.com/</a:t>
+            </a:r>
+            <a:r>
+              <a:rPr lang="en"/>
+              <a:t> </a:t>
+            </a:r>
+            <a:endParaRPr/>
+          </a:p>
+          <a:p>
+            <a:pPr indent="0" lvl="0" marL="457200" rtl="0" algn="l">
+              <a:spcBef>
+                <a:spcPts val="1200"/>
+              </a:spcBef>
+              <a:spcAft>
+                <a:spcPts val="0"/>
+              </a:spcAft>
+              <a:buNone/>
+            </a:pPr>
+            <a:r>
+              <a:t/>
+            </a:r>
+            <a:endParaRPr/>
+          </a:p>
+          <a:p>
+            <a:pPr indent="0" lvl="0" marL="457200" rtl="0" algn="l">
+              <a:spcBef>
+                <a:spcPts val="1200"/>
+              </a:spcBef>
+              <a:spcAft>
+                <a:spcPts val="1200"/>
+              </a:spcAft>
+              <a:buNone/>
+            </a:pPr>
+            <a:r>
+              <a:t/>
             </a:r>
             <a:endParaRPr/>
           </a:p>
         </p:txBody>
       </p:sp>
+      <p:pic>
+        <p:nvPicPr>
+          <p:cNvPr id="177" name="Google Shape;177;p33"/>
+          <p:cNvPicPr preferRelativeResize="0"/>
+          <p:nvPr/>
+        </p:nvPicPr>
+        <p:blipFill>
+          <a:blip r:embed="rId4">
+            <a:alphaModFix/>
+          </a:blip>
+          <a:stretch>
+            <a:fillRect/>
+          </a:stretch>
+        </p:blipFill>
+        <p:spPr>
+          <a:xfrm>
+            <a:off x="728578" y="2211303"/>
+            <a:ext cx="7686825" cy="2594775"/>
+          </a:xfrm>
+          <a:prstGeom prst="rect">
+            <a:avLst/>
+          </a:prstGeom>
+          <a:noFill/>
+          <a:ln>
+            <a:noFill/>
+          </a:ln>
+        </p:spPr>
+      </p:pic>
     </p:spTree>
   </p:cSld>
   <p:clrMapOvr>
@@ -11091,7 +10498,7 @@
   <p:cSld>
     <p:spTree>
       <p:nvGrpSpPr>
-        <p:cNvPr id="178" name="Shape 178"/>
+        <p:cNvPr id="181" name="Shape 181"/>
         <p:cNvGrpSpPr/>
         <p:nvPr/>
       </p:nvGrpSpPr>
@@ -11105,268 +10512,28 @@
       </p:grpSpPr>
       <p:sp>
         <p:nvSpPr>
-          <p:cNvPr id="179" name="Google Shape;179;p34"/>
+          <p:cNvPr id="182" name="Google Shape;182;p34"/>
           <p:cNvSpPr txBox="1"/>
           <p:nvPr>
-            <p:ph idx="1" type="body"/>
-          </p:nvPr>
-        </p:nvSpPr>
-        <p:spPr>
-          <a:xfrm>
-            <a:off x="311700" y="1152475"/>
-            <a:ext cx="8520600" cy="3416400"/>
+            <p:ph type="title"/>
+          </p:nvPr>
+        </p:nvSpPr>
+        <p:spPr>
+          <a:xfrm>
+            <a:off x="311700" y="2150850"/>
+            <a:ext cx="8520600" cy="841800"/>
           </a:xfrm>
           <a:prstGeom prst="rect">
             <a:avLst/>
           </a:prstGeom>
         </p:spPr>
         <p:txBody>
-          <a:bodyPr anchorCtr="0" anchor="t" bIns="91425" lIns="91425" spcFirstLastPara="1" rIns="91425" wrap="square" tIns="91425">
+          <a:bodyPr anchorCtr="0" anchor="ctr" bIns="91425" lIns="91425" spcFirstLastPara="1" rIns="91425" wrap="square" tIns="91425">
             <a:normAutofit/>
           </a:bodyPr>
           <a:lstStyle/>
           <a:p>
-            <a:pPr indent="0" lvl="0" marL="0" rtl="0" algn="just">
-              <a:spcBef>
-                <a:spcPts val="0"/>
-              </a:spcBef>
-              <a:spcAft>
-                <a:spcPts val="0"/>
-              </a:spcAft>
-              <a:buClr>
-                <a:schemeClr val="dk1"/>
-              </a:buClr>
-              <a:buSzPts val="1100"/>
-              <a:buFont typeface="Arial"/>
-              <a:buNone/>
-            </a:pPr>
-            <a:r>
-              <a:rPr lang="en">
-                <a:solidFill>
-                  <a:schemeClr val="dk1"/>
-                </a:solidFill>
-              </a:rPr>
-              <a:t>The following 5 viewpoints have been identified to describe CovidTracker:</a:t>
-            </a:r>
-            <a:endParaRPr>
-              <a:solidFill>
-                <a:schemeClr val="dk1"/>
-              </a:solidFill>
-            </a:endParaRPr>
-          </a:p>
-          <a:p>
-            <a:pPr indent="-342900" lvl="0" marL="457200" rtl="0" algn="just">
-              <a:spcBef>
-                <a:spcPts val="0"/>
-              </a:spcBef>
-              <a:spcAft>
-                <a:spcPts val="0"/>
-              </a:spcAft>
-              <a:buClr>
-                <a:schemeClr val="dk1"/>
-              </a:buClr>
-              <a:buSzPts val="1800"/>
-              <a:buChar char="-"/>
-            </a:pPr>
-            <a:r>
-              <a:rPr lang="en">
-                <a:solidFill>
-                  <a:schemeClr val="dk1"/>
-                </a:solidFill>
-              </a:rPr>
-              <a:t>Context</a:t>
-            </a:r>
-            <a:endParaRPr>
-              <a:solidFill>
-                <a:schemeClr val="dk1"/>
-              </a:solidFill>
-            </a:endParaRPr>
-          </a:p>
-          <a:p>
-            <a:pPr indent="-342900" lvl="0" marL="457200" rtl="0" algn="just">
-              <a:spcBef>
-                <a:spcPts val="0"/>
-              </a:spcBef>
-              <a:spcAft>
-                <a:spcPts val="0"/>
-              </a:spcAft>
-              <a:buClr>
-                <a:schemeClr val="dk1"/>
-              </a:buClr>
-              <a:buSzPts val="1800"/>
-              <a:buChar char="-"/>
-            </a:pPr>
-            <a:r>
-              <a:rPr lang="en">
-                <a:solidFill>
-                  <a:schemeClr val="dk1"/>
-                </a:solidFill>
-              </a:rPr>
-              <a:t>Functional</a:t>
-            </a:r>
-            <a:endParaRPr>
-              <a:solidFill>
-                <a:schemeClr val="dk1"/>
-              </a:solidFill>
-            </a:endParaRPr>
-          </a:p>
-          <a:p>
-            <a:pPr indent="-342900" lvl="0" marL="457200" rtl="0" algn="just">
-              <a:spcBef>
-                <a:spcPts val="0"/>
-              </a:spcBef>
-              <a:spcAft>
-                <a:spcPts val="0"/>
-              </a:spcAft>
-              <a:buClr>
-                <a:schemeClr val="dk1"/>
-              </a:buClr>
-              <a:buSzPts val="1800"/>
-              <a:buChar char="-"/>
-            </a:pPr>
-            <a:r>
-              <a:rPr lang="en">
-                <a:solidFill>
-                  <a:schemeClr val="dk1"/>
-                </a:solidFill>
-              </a:rPr>
-              <a:t>Information</a:t>
-            </a:r>
-            <a:endParaRPr>
-              <a:solidFill>
-                <a:schemeClr val="dk1"/>
-              </a:solidFill>
-            </a:endParaRPr>
-          </a:p>
-          <a:p>
-            <a:pPr indent="-342900" lvl="0" marL="457200" rtl="0" algn="just">
-              <a:spcBef>
-                <a:spcPts val="0"/>
-              </a:spcBef>
-              <a:spcAft>
-                <a:spcPts val="0"/>
-              </a:spcAft>
-              <a:buClr>
-                <a:schemeClr val="dk1"/>
-              </a:buClr>
-              <a:buSzPts val="1800"/>
-              <a:buChar char="-"/>
-            </a:pPr>
-            <a:r>
-              <a:rPr lang="en">
-                <a:solidFill>
-                  <a:schemeClr val="dk1"/>
-                </a:solidFill>
-              </a:rPr>
-              <a:t>Development</a:t>
-            </a:r>
-            <a:endParaRPr>
-              <a:solidFill>
-                <a:schemeClr val="dk1"/>
-              </a:solidFill>
-            </a:endParaRPr>
-          </a:p>
-          <a:p>
-            <a:pPr indent="-342900" lvl="0" marL="457200" rtl="0" algn="just">
-              <a:spcBef>
-                <a:spcPts val="0"/>
-              </a:spcBef>
-              <a:spcAft>
-                <a:spcPts val="0"/>
-              </a:spcAft>
-              <a:buClr>
-                <a:schemeClr val="dk1"/>
-              </a:buClr>
-              <a:buSzPts val="1800"/>
-              <a:buChar char="-"/>
-            </a:pPr>
-            <a:r>
-              <a:rPr lang="en">
-                <a:solidFill>
-                  <a:schemeClr val="dk1"/>
-                </a:solidFill>
-              </a:rPr>
-              <a:t>Deployment</a:t>
-            </a:r>
-            <a:endParaRPr>
-              <a:solidFill>
-                <a:schemeClr val="dk1"/>
-              </a:solidFill>
-            </a:endParaRPr>
-          </a:p>
-          <a:p>
-            <a:pPr indent="0" lvl="0" marL="0" rtl="0" algn="just">
-              <a:spcBef>
-                <a:spcPts val="0"/>
-              </a:spcBef>
-              <a:spcAft>
-                <a:spcPts val="0"/>
-              </a:spcAft>
-              <a:buNone/>
-            </a:pPr>
-            <a:r>
-              <a:t/>
-            </a:r>
-            <a:endParaRPr>
-              <a:solidFill>
-                <a:schemeClr val="dk1"/>
-              </a:solidFill>
-            </a:endParaRPr>
-          </a:p>
-          <a:p>
-            <a:pPr indent="-342900" lvl="0" marL="457200" rtl="0" algn="just">
-              <a:spcBef>
-                <a:spcPts val="0"/>
-              </a:spcBef>
-              <a:spcAft>
-                <a:spcPts val="0"/>
-              </a:spcAft>
-              <a:buClr>
-                <a:schemeClr val="dk1"/>
-              </a:buClr>
-              <a:buSzPts val="1800"/>
-              <a:buChar char="-"/>
-            </a:pPr>
-            <a:r>
-              <a:rPr lang="en">
-                <a:solidFill>
-                  <a:schemeClr val="dk1"/>
-                </a:solidFill>
-              </a:rPr>
-              <a:t>All the diagrams can be seen in the document, let me know if you want to reference any of them</a:t>
-            </a:r>
-            <a:endParaRPr>
-              <a:solidFill>
-                <a:schemeClr val="dk1"/>
-              </a:solidFill>
-            </a:endParaRPr>
-          </a:p>
-        </p:txBody>
-      </p:sp>
-      <p:sp>
-        <p:nvSpPr>
-          <p:cNvPr id="180" name="Google Shape;180;p34"/>
-          <p:cNvSpPr txBox="1"/>
-          <p:nvPr>
-            <p:ph type="title"/>
-          </p:nvPr>
-        </p:nvSpPr>
-        <p:spPr>
-          <a:xfrm>
-            <a:off x="311700" y="445025"/>
-            <a:ext cx="8520600" cy="572700"/>
-          </a:xfrm>
-          <a:prstGeom prst="rect">
-            <a:avLst/>
-          </a:prstGeom>
-        </p:spPr>
-        <p:txBody>
-          <a:bodyPr anchorCtr="0" anchor="t" bIns="91425" lIns="91425" spcFirstLastPara="1" rIns="91425" wrap="square" tIns="91425">
-            <a:normAutofit fontScale="90000"/>
-          </a:bodyPr>
-          <a:lstStyle/>
-          <a:p>
-            <a:pPr indent="0" lvl="0" marL="0" rtl="0" algn="l">
+            <a:pPr indent="0" lvl="0" marL="0" rtl="0" algn="ctr">
               <a:spcBef>
                 <a:spcPts val="0"/>
               </a:spcBef>
@@ -11377,7 +10544,7 @@
             </a:pPr>
             <a:r>
               <a:rPr lang="en"/>
-              <a:t>Our systems viewpoints</a:t>
+              <a:t>Testing plan</a:t>
             </a:r>
             <a:endParaRPr/>
           </a:p>
@@ -11396,7 +10563,7 @@
   <p:cSld>
     <p:spTree>
       <p:nvGrpSpPr>
-        <p:cNvPr id="184" name="Shape 184"/>
+        <p:cNvPr id="186" name="Shape 186"/>
         <p:cNvGrpSpPr/>
         <p:nvPr/>
       </p:nvGrpSpPr>
@@ -11410,7 +10577,7 @@
       </p:grpSpPr>
       <p:sp>
         <p:nvSpPr>
-          <p:cNvPr id="185" name="Google Shape;185;p35"/>
+          <p:cNvPr id="187" name="Google Shape;187;p35"/>
           <p:cNvSpPr txBox="1"/>
           <p:nvPr>
             <p:ph type="title"/>
@@ -11442,7 +10609,7 @@
             </a:pPr>
             <a:r>
               <a:rPr lang="en"/>
-              <a:t>Context Viewpoint</a:t>
+              <a:t>Our testing plan</a:t>
             </a:r>
             <a:endParaRPr/>
           </a:p>
@@ -11450,7 +10617,7 @@
       </p:sp>
       <p:sp>
         <p:nvSpPr>
-          <p:cNvPr id="186" name="Google Shape;186;p35"/>
+          <p:cNvPr id="188" name="Google Shape;188;p35"/>
           <p:cNvSpPr txBox="1"/>
           <p:nvPr>
             <p:ph idx="1" type="body"/>
@@ -11467,13 +10634,29 @@
         </p:spPr>
         <p:txBody>
           <a:bodyPr anchorCtr="0" anchor="t" bIns="91425" lIns="91425" spcFirstLastPara="1" rIns="91425" wrap="square" tIns="91425">
-            <a:normAutofit/>
+            <a:normAutofit lnSpcReduction="10000"/>
           </a:bodyPr>
           <a:lstStyle/>
           <a:p>
+            <a:pPr indent="0" lvl="0" marL="0" rtl="0" algn="l">
+              <a:spcBef>
+                <a:spcPts val="0"/>
+              </a:spcBef>
+              <a:spcAft>
+                <a:spcPts val="0"/>
+              </a:spcAft>
+              <a:buNone/>
+            </a:pPr>
+            <a:r>
+              <a:rPr lang="en"/>
+              <a:t>We have identified 4 types of tests for our system</a:t>
+            </a:r>
+            <a:endParaRPr/>
+          </a:p>
+          <a:p>
             <a:pPr indent="-342900" lvl="0" marL="457200" rtl="0" algn="l">
               <a:spcBef>
-                <a:spcPts val="0"/>
+                <a:spcPts val="1200"/>
               </a:spcBef>
               <a:spcAft>
                 <a:spcPts val="0"/>
@@ -11483,7 +10666,7 @@
             </a:pPr>
             <a:r>
               <a:rPr lang="en"/>
-              <a:t>System Context Diagram</a:t>
+              <a:t>Unit tests</a:t>
             </a:r>
             <a:endParaRPr/>
           </a:p>
@@ -11500,24 +10683,101 @@
             </a:pPr>
             <a:r>
               <a:rPr lang="en"/>
-              <a:t>Use Case Diagrams</a:t>
-            </a:r>
-            <a:endParaRPr/>
-          </a:p>
-          <a:p>
-            <a:pPr indent="-317500" lvl="1" marL="914400" rtl="0" algn="l">
-              <a:spcBef>
-                <a:spcPts val="0"/>
-              </a:spcBef>
-              <a:spcAft>
-                <a:spcPts val="0"/>
-              </a:spcAft>
-              <a:buSzPts val="1400"/>
+              <a:t>Integration tests</a:t>
+            </a:r>
+            <a:endParaRPr/>
+          </a:p>
+          <a:p>
+            <a:pPr indent="-342900" lvl="0" marL="457200" rtl="0" algn="l">
+              <a:spcBef>
+                <a:spcPts val="0"/>
+              </a:spcBef>
+              <a:spcAft>
+                <a:spcPts val="0"/>
+              </a:spcAft>
+              <a:buSzPts val="1800"/>
               <a:buChar char="-"/>
             </a:pPr>
             <a:r>
               <a:rPr lang="en"/>
-              <a:t>Split by user role</a:t>
+              <a:t>System tests</a:t>
+            </a:r>
+            <a:endParaRPr/>
+          </a:p>
+          <a:p>
+            <a:pPr indent="-342900" lvl="0" marL="457200" rtl="0" algn="l">
+              <a:spcBef>
+                <a:spcPts val="0"/>
+              </a:spcBef>
+              <a:spcAft>
+                <a:spcPts val="0"/>
+              </a:spcAft>
+              <a:buSzPts val="1800"/>
+              <a:buChar char="-"/>
+            </a:pPr>
+            <a:r>
+              <a:rPr lang="en"/>
+              <a:t>Acceptance</a:t>
+            </a:r>
+            <a:r>
+              <a:rPr lang="en"/>
+              <a:t> tests</a:t>
+            </a:r>
+            <a:endParaRPr/>
+          </a:p>
+          <a:p>
+            <a:pPr indent="0" lvl="0" marL="0" rtl="0" algn="l">
+              <a:spcBef>
+                <a:spcPts val="1200"/>
+              </a:spcBef>
+              <a:spcAft>
+                <a:spcPts val="0"/>
+              </a:spcAft>
+              <a:buNone/>
+            </a:pPr>
+            <a:r>
+              <a:rPr lang="en"/>
+              <a:t>Most are automated some are manual</a:t>
+            </a:r>
+            <a:endParaRPr/>
+          </a:p>
+          <a:p>
+            <a:pPr indent="0" lvl="0" marL="0" rtl="0" algn="l">
+              <a:spcBef>
+                <a:spcPts val="1200"/>
+              </a:spcBef>
+              <a:spcAft>
+                <a:spcPts val="0"/>
+              </a:spcAft>
+              <a:buNone/>
+            </a:pPr>
+            <a:r>
+              <a:rPr lang="en"/>
+              <a:t>Some have output reports</a:t>
+            </a:r>
+            <a:endParaRPr/>
+          </a:p>
+          <a:p>
+            <a:pPr indent="0" lvl="0" marL="0" rtl="0" algn="l">
+              <a:spcBef>
+                <a:spcPts val="1200"/>
+              </a:spcBef>
+              <a:spcAft>
+                <a:spcPts val="1200"/>
+              </a:spcAft>
+              <a:buNone/>
+            </a:pPr>
+            <a:r>
+              <a:rPr lang="en"/>
+              <a:t>**More about the specific packages we use for our testing framework </a:t>
+            </a:r>
+            <a:r>
+              <a:rPr lang="en"/>
+              <a:t>and a comparison between all of them</a:t>
+            </a:r>
+            <a:r>
+              <a:rPr lang="en"/>
+              <a:t> can be found in the document**</a:t>
             </a:r>
             <a:endParaRPr/>
           </a:p>
@@ -11536,7 +10796,7 @@
   <p:cSld>
     <p:spTree>
       <p:nvGrpSpPr>
-        <p:cNvPr id="190" name="Shape 190"/>
+        <p:cNvPr id="192" name="Shape 192"/>
         <p:cNvGrpSpPr/>
         <p:nvPr/>
       </p:nvGrpSpPr>
@@ -11550,7 +10810,7 @@
       </p:grpSpPr>
       <p:sp>
         <p:nvSpPr>
-          <p:cNvPr id="191" name="Google Shape;191;p36"/>
+          <p:cNvPr id="193" name="Google Shape;193;p36"/>
           <p:cNvSpPr txBox="1"/>
           <p:nvPr>
             <p:ph type="title"/>
@@ -11582,7 +10842,7 @@
             </a:pPr>
             <a:r>
               <a:rPr lang="en"/>
-              <a:t>Functional Viewpoint</a:t>
+              <a:t>Unit test report</a:t>
             </a:r>
             <a:endParaRPr/>
           </a:p>
@@ -11590,7 +10850,7 @@
       </p:sp>
       <p:sp>
         <p:nvSpPr>
-          <p:cNvPr id="192" name="Google Shape;192;p36"/>
+          <p:cNvPr id="194" name="Google Shape;194;p36"/>
           <p:cNvSpPr txBox="1"/>
           <p:nvPr>
             <p:ph idx="1" type="body"/>
@@ -11599,7 +10859,7 @@
         <p:spPr>
           <a:xfrm>
             <a:off x="311700" y="1152475"/>
-            <a:ext cx="8520600" cy="3416400"/>
+            <a:ext cx="4020900" cy="3416400"/>
           </a:xfrm>
           <a:prstGeom prst="rect">
             <a:avLst/>
@@ -11622,14 +10882,26 @@
               <a:buChar char="-"/>
             </a:pPr>
             <a:r>
-              <a:rPr lang="en"/>
-              <a:t>Component</a:t>
-            </a:r>
-            <a:r>
-              <a:rPr lang="en"/>
-              <a:t> Diagram</a:t>
-            </a:r>
-            <a:endParaRPr/>
+              <a:rPr lang="en">
+                <a:highlight>
+                  <a:srgbClr val="00FF00"/>
+                </a:highlight>
+              </a:rPr>
+              <a:t>91</a:t>
+            </a:r>
+            <a:r>
+              <a:rPr lang="en">
+                <a:highlight>
+                  <a:srgbClr val="00FF00"/>
+                </a:highlight>
+              </a:rPr>
+              <a:t> unit tests</a:t>
+            </a:r>
+            <a:endParaRPr>
+              <a:highlight>
+                <a:srgbClr val="00FF00"/>
+              </a:highlight>
+            </a:endParaRPr>
           </a:p>
           <a:p>
             <a:pPr indent="-342900" lvl="0" marL="457200" rtl="0" algn="l">
@@ -11643,13 +10915,87 @@
               <a:buChar char="-"/>
             </a:pPr>
             <a:r>
+              <a:rPr lang="en">
+                <a:highlight>
+                  <a:srgbClr val="00FF00"/>
+                </a:highlight>
+              </a:rPr>
+              <a:t>57 integration tests</a:t>
+            </a:r>
+            <a:endParaRPr>
+              <a:highlight>
+                <a:srgbClr val="00FF00"/>
+              </a:highlight>
+            </a:endParaRPr>
+          </a:p>
+          <a:p>
+            <a:pPr indent="-342900" lvl="0" marL="457200" rtl="0" algn="l">
+              <a:spcBef>
+                <a:spcPts val="0"/>
+              </a:spcBef>
+              <a:spcAft>
+                <a:spcPts val="0"/>
+              </a:spcAft>
+              <a:buSzPts val="1800"/>
+              <a:buChar char="-"/>
+            </a:pPr>
+            <a:r>
               <a:rPr lang="en"/>
-              <a:t>Architecture Level Component Diagram</a:t>
+              <a:t>41</a:t>
+            </a:r>
+            <a:r>
+              <a:rPr lang="en"/>
+              <a:t> test suites</a:t>
+            </a:r>
+            <a:endParaRPr/>
+          </a:p>
+          <a:p>
+            <a:pPr indent="-342900" lvl="0" marL="457200" rtl="0" algn="l">
+              <a:spcBef>
+                <a:spcPts val="0"/>
+              </a:spcBef>
+              <a:spcAft>
+                <a:spcPts val="0"/>
+              </a:spcAft>
+              <a:buSzPts val="1800"/>
+              <a:buChar char="-"/>
+            </a:pPr>
+            <a:r>
+              <a:rPr lang="en"/>
+              <a:t>0 failures</a:t>
             </a:r>
             <a:endParaRPr/>
           </a:p>
         </p:txBody>
       </p:sp>
+      <p:pic>
+        <p:nvPicPr>
+          <p:cNvPr id="195" name="Google Shape;195;p36"/>
+          <p:cNvPicPr preferRelativeResize="0"/>
+          <p:nvPr/>
+        </p:nvPicPr>
+        <p:blipFill>
+          <a:blip r:embed="rId3">
+            <a:alphaModFix/>
+          </a:blip>
+          <a:stretch>
+            <a:fillRect/>
+          </a:stretch>
+        </p:blipFill>
+        <p:spPr>
+          <a:xfrm>
+            <a:off x="4443425" y="0"/>
+            <a:ext cx="3990748" cy="5143500"/>
+          </a:xfrm>
+          <a:prstGeom prst="rect">
+            <a:avLst/>
+          </a:prstGeom>
+          <a:noFill/>
+          <a:ln>
+            <a:noFill/>
+          </a:ln>
+        </p:spPr>
+      </p:pic>
     </p:spTree>
   </p:cSld>
   <p:clrMapOvr>
@@ -11663,7 +11009,7 @@
   <p:cSld>
     <p:spTree>
       <p:nvGrpSpPr>
-        <p:cNvPr id="196" name="Shape 196"/>
+        <p:cNvPr id="199" name="Shape 199"/>
         <p:cNvGrpSpPr/>
         <p:nvPr/>
       </p:nvGrpSpPr>
@@ -11677,7 +11023,7 @@
       </p:grpSpPr>
       <p:sp>
         <p:nvSpPr>
-          <p:cNvPr id="197" name="Google Shape;197;p37"/>
+          <p:cNvPr id="200" name="Google Shape;200;p37"/>
           <p:cNvSpPr txBox="1"/>
           <p:nvPr>
             <p:ph type="title"/>
@@ -11709,7 +11055,7 @@
             </a:pPr>
             <a:r>
               <a:rPr lang="en"/>
-              <a:t>Information Viewpoint</a:t>
+              <a:t>Code coverage report</a:t>
             </a:r>
             <a:endParaRPr/>
           </a:p>
@@ -11717,7 +11063,7 @@
       </p:sp>
       <p:sp>
         <p:nvSpPr>
-          <p:cNvPr id="198" name="Google Shape;198;p37"/>
+          <p:cNvPr id="201" name="Google Shape;201;p37"/>
           <p:cNvSpPr txBox="1"/>
           <p:nvPr>
             <p:ph idx="1" type="body"/>
@@ -11738,24 +11084,50 @@
           </a:bodyPr>
           <a:lstStyle/>
           <a:p>
-            <a:pPr indent="-342900" lvl="0" marL="457200" rtl="0" algn="l">
-              <a:spcBef>
-                <a:spcPts val="0"/>
-              </a:spcBef>
-              <a:spcAft>
-                <a:spcPts val="0"/>
-              </a:spcAft>
-              <a:buSzPts val="1800"/>
-              <a:buChar char="-"/>
-            </a:pPr>
-            <a:r>
-              <a:rPr lang="en"/>
-              <a:t>Domain Model Diagram</a:t>
+            <a:pPr indent="0" lvl="0" marL="0" rtl="0" algn="l">
+              <a:spcBef>
+                <a:spcPts val="0"/>
+              </a:spcBef>
+              <a:spcAft>
+                <a:spcPts val="1200"/>
+              </a:spcAft>
+              <a:buNone/>
+            </a:pPr>
+            <a:r>
+              <a:t/>
             </a:r>
             <a:endParaRPr/>
           </a:p>
         </p:txBody>
       </p:sp>
+      <p:pic>
+        <p:nvPicPr>
+          <p:cNvPr id="202" name="Google Shape;202;p37"/>
+          <p:cNvPicPr preferRelativeResize="0"/>
+          <p:nvPr/>
+        </p:nvPicPr>
+        <p:blipFill>
+          <a:blip r:embed="rId3">
+            <a:alphaModFix/>
+          </a:blip>
+          <a:stretch>
+            <a:fillRect/>
+          </a:stretch>
+        </p:blipFill>
+        <p:spPr>
+          <a:xfrm>
+            <a:off x="1498346" y="1152475"/>
+            <a:ext cx="6147301" cy="3512726"/>
+          </a:xfrm>
+          <a:prstGeom prst="rect">
+            <a:avLst/>
+          </a:prstGeom>
+          <a:noFill/>
+          <a:ln>
+            <a:noFill/>
+          </a:ln>
+        </p:spPr>
+      </p:pic>
     </p:spTree>
   </p:cSld>
   <p:clrMapOvr>
@@ -11769,7 +11141,7 @@
   <p:cSld>
     <p:spTree>
       <p:nvGrpSpPr>
-        <p:cNvPr id="202" name="Shape 202"/>
+        <p:cNvPr id="206" name="Shape 206"/>
         <p:cNvGrpSpPr/>
         <p:nvPr/>
       </p:nvGrpSpPr>
@@ -11783,7 +11155,7 @@
       </p:grpSpPr>
       <p:sp>
         <p:nvSpPr>
-          <p:cNvPr id="203" name="Google Shape;203;p38"/>
+          <p:cNvPr id="207" name="Google Shape;207;p38"/>
           <p:cNvSpPr txBox="1"/>
           <p:nvPr>
             <p:ph type="title"/>
@@ -11815,7 +11187,7 @@
             </a:pPr>
             <a:r>
               <a:rPr lang="en"/>
-              <a:t>Development Viewpoint</a:t>
+              <a:t>Integration tests</a:t>
             </a:r>
             <a:endParaRPr/>
           </a:p>
@@ -11823,7 +11195,7 @@
       </p:sp>
       <p:sp>
         <p:nvSpPr>
-          <p:cNvPr id="204" name="Google Shape;204;p38"/>
+          <p:cNvPr id="208" name="Google Shape;208;p38"/>
           <p:cNvSpPr txBox="1"/>
           <p:nvPr>
             <p:ph idx="1" type="body"/>
@@ -11856,7 +11228,7 @@
             </a:pPr>
             <a:r>
               <a:rPr lang="en"/>
-              <a:t>Sequence Diagrams</a:t>
+              <a:t>Our integration tests are automated tests</a:t>
             </a:r>
             <a:endParaRPr/>
           </a:p>
@@ -11873,47 +11245,24 @@
             </a:pPr>
             <a:r>
               <a:rPr lang="en"/>
-              <a:t>Activity Diagrams</a:t>
-            </a:r>
-            <a:endParaRPr/>
-          </a:p>
-          <a:p>
-            <a:pPr indent="0" lvl="0" marL="0" rtl="0" algn="l">
-              <a:spcBef>
-                <a:spcPts val="1200"/>
-              </a:spcBef>
-              <a:spcAft>
-                <a:spcPts val="0"/>
-              </a:spcAft>
-              <a:buNone/>
-            </a:pPr>
-            <a:r>
-              <a:t/>
-            </a:r>
-            <a:endParaRPr/>
-          </a:p>
-          <a:p>
-            <a:pPr indent="-342900" lvl="0" marL="457200" rtl="0" algn="l">
-              <a:spcBef>
-                <a:spcPts val="1200"/>
-              </a:spcBef>
-              <a:spcAft>
-                <a:spcPts val="0"/>
-              </a:spcAft>
-              <a:buSzPts val="1800"/>
+              <a:t>The tests use a full PostgreSQL DB instance running in docker</a:t>
+            </a:r>
+            <a:endParaRPr/>
+          </a:p>
+          <a:p>
+            <a:pPr indent="-317500" lvl="1" marL="914400" rtl="0" algn="l">
+              <a:spcBef>
+                <a:spcPts val="0"/>
+              </a:spcBef>
+              <a:spcAft>
+                <a:spcPts val="0"/>
+              </a:spcAft>
+              <a:buSzPts val="1400"/>
               <a:buChar char="-"/>
             </a:pPr>
             <a:r>
               <a:rPr lang="en"/>
-              <a:t>This viewpoint is split by main development focuses (matches very </a:t>
-            </a:r>
-            <a:r>
-              <a:rPr lang="en"/>
-              <a:t>closely</a:t>
-            </a:r>
-            <a:r>
-              <a:rPr lang="en"/>
-              <a:t> with the structure of our projects epics)</a:t>
+              <a:t>We have written db initialization and seeding scripts to help scaffold the tests</a:t>
             </a:r>
             <a:endParaRPr/>
           </a:p>
@@ -11932,7 +11281,7 @@
   <p:cSld>
     <p:spTree>
       <p:nvGrpSpPr>
-        <p:cNvPr id="208" name="Shape 208"/>
+        <p:cNvPr id="212" name="Shape 212"/>
         <p:cNvGrpSpPr/>
         <p:nvPr/>
       </p:nvGrpSpPr>
@@ -11946,7 +11295,7 @@
       </p:grpSpPr>
       <p:sp>
         <p:nvSpPr>
-          <p:cNvPr id="209" name="Google Shape;209;p39"/>
+          <p:cNvPr id="213" name="Google Shape;213;p39"/>
           <p:cNvSpPr txBox="1"/>
           <p:nvPr>
             <p:ph type="title"/>
@@ -11978,7 +11327,7 @@
             </a:pPr>
             <a:r>
               <a:rPr lang="en"/>
-              <a:t>Deployment Viewpoint</a:t>
+              <a:t>System Tests</a:t>
             </a:r>
             <a:endParaRPr/>
           </a:p>
@@ -11986,7 +11335,7 @@
       </p:sp>
       <p:sp>
         <p:nvSpPr>
-          <p:cNvPr id="210" name="Google Shape;210;p39"/>
+          <p:cNvPr id="214" name="Google Shape;214;p39"/>
           <p:cNvSpPr txBox="1"/>
           <p:nvPr>
             <p:ph idx="1" type="body"/>
@@ -12019,7 +11368,82 @@
             </a:pPr>
             <a:r>
               <a:rPr lang="en"/>
-              <a:t>Deployment Diagram</a:t>
+              <a:t>Run </a:t>
+            </a:r>
+            <a:r>
+              <a:rPr lang="en"/>
+              <a:t>manually</a:t>
+            </a:r>
+            <a:endParaRPr/>
+          </a:p>
+          <a:p>
+            <a:pPr indent="-317500" lvl="1" marL="914400" rtl="0" algn="l">
+              <a:spcBef>
+                <a:spcPts val="0"/>
+              </a:spcBef>
+              <a:spcAft>
+                <a:spcPts val="0"/>
+              </a:spcAft>
+              <a:buSzPts val="1400"/>
+              <a:buChar char="-"/>
+            </a:pPr>
+            <a:r>
+              <a:rPr lang="en"/>
+              <a:t>Can be automated but not on our roadmap</a:t>
+            </a:r>
+            <a:endParaRPr/>
+          </a:p>
+          <a:p>
+            <a:pPr indent="-342900" lvl="0" marL="457200" rtl="0" algn="l">
+              <a:spcBef>
+                <a:spcPts val="0"/>
+              </a:spcBef>
+              <a:spcAft>
+                <a:spcPts val="0"/>
+              </a:spcAft>
+              <a:buSzPts val="1800"/>
+              <a:buChar char="-"/>
+            </a:pPr>
+            <a:r>
+              <a:rPr lang="en"/>
+              <a:t>Tests the systems functionalities end-to-end</a:t>
+            </a:r>
+            <a:endParaRPr/>
+          </a:p>
+          <a:p>
+            <a:pPr indent="-342900" lvl="0" marL="457200" rtl="0" algn="l">
+              <a:spcBef>
+                <a:spcPts val="0"/>
+              </a:spcBef>
+              <a:spcAft>
+                <a:spcPts val="0"/>
+              </a:spcAft>
+              <a:buSzPts val="1800"/>
+              <a:buChar char="-"/>
+            </a:pPr>
+            <a:r>
+              <a:rPr lang="en"/>
+              <a:t>Format is steps / action for the tester to perform and the associated outcome for each</a:t>
+            </a:r>
+            <a:endParaRPr/>
+          </a:p>
+          <a:p>
+            <a:pPr indent="0" lvl="0" marL="0" rtl="0" algn="l">
+              <a:spcBef>
+                <a:spcPts val="1200"/>
+              </a:spcBef>
+              <a:spcAft>
+                <a:spcPts val="1200"/>
+              </a:spcAft>
+              <a:buNone/>
+            </a:pPr>
+            <a:r>
+              <a:rPr lang="en"/>
+              <a:t>System</a:t>
+            </a:r>
+            <a:r>
+              <a:rPr lang="en"/>
+              <a:t> tests for each user story can be found in the submission document</a:t>
             </a:r>
             <a:endParaRPr/>
           </a:p>
@@ -12038,7 +11462,7 @@
   <p:cSld>
     <p:spTree>
       <p:nvGrpSpPr>
-        <p:cNvPr id="214" name="Shape 214"/>
+        <p:cNvPr id="218" name="Shape 218"/>
         <p:cNvGrpSpPr/>
         <p:nvPr/>
       </p:nvGrpSpPr>
@@ -12052,7 +11476,7 @@
       </p:grpSpPr>
       <p:sp>
         <p:nvSpPr>
-          <p:cNvPr id="215" name="Google Shape;215;p40"/>
+          <p:cNvPr id="219" name="Google Shape;219;p40"/>
           <p:cNvSpPr txBox="1"/>
           <p:nvPr>
             <p:ph type="title"/>
@@ -12084,7 +11508,11 @@
             </a:pPr>
             <a:r>
               <a:rPr lang="en"/>
-              <a:t>Deployment</a:t>
+              <a:t>Acceptance</a:t>
+            </a:r>
+            <a:r>
+              <a:rPr lang="en"/>
+              <a:t> Tests</a:t>
             </a:r>
             <a:endParaRPr/>
           </a:p>
@@ -12092,7 +11520,7 @@
       </p:sp>
       <p:sp>
         <p:nvSpPr>
-          <p:cNvPr id="216" name="Google Shape;216;p40"/>
+          <p:cNvPr id="220" name="Google Shape;220;p40"/>
           <p:cNvSpPr txBox="1"/>
           <p:nvPr>
             <p:ph idx="1" type="body"/>
@@ -12125,7 +11553,24 @@
             </a:pPr>
             <a:r>
               <a:rPr lang="en"/>
-              <a:t>Deployed on S3 + ECS</a:t>
+              <a:t>Run manually</a:t>
+            </a:r>
+            <a:endParaRPr/>
+          </a:p>
+          <a:p>
+            <a:pPr indent="-317500" lvl="1" marL="914400" rtl="0" algn="l">
+              <a:spcBef>
+                <a:spcPts val="0"/>
+              </a:spcBef>
+              <a:spcAft>
+                <a:spcPts val="0"/>
+              </a:spcAft>
+              <a:buSzPts val="1400"/>
+              <a:buChar char="-"/>
+            </a:pPr>
+            <a:r>
+              <a:rPr lang="en"/>
+              <a:t>Can be automated but not on our roadmap</a:t>
             </a:r>
             <a:endParaRPr/>
           </a:p>
@@ -12141,80 +11586,63 @@
               <a:buChar char="-"/>
             </a:pPr>
             <a:r>
-              <a:rPr lang="en" u="sng">
-                <a:solidFill>
-                  <a:schemeClr val="hlink"/>
-                </a:solidFill>
-                <a:hlinkClick r:id="rId3"/>
-              </a:rPr>
-              <a:t>http://covid-tracker-client-bucket.s3-website.us-east-2.amazonaws.com/</a:t>
-            </a:r>
-            <a:r>
               <a:rPr lang="en"/>
-              <a:t> </a:t>
-            </a:r>
-            <a:endParaRPr/>
-          </a:p>
-          <a:p>
-            <a:pPr indent="0" lvl="0" marL="457200" rtl="0" algn="l">
+              <a:t>Tests the system according to the requirements</a:t>
+            </a:r>
+            <a:endParaRPr/>
+          </a:p>
+          <a:p>
+            <a:pPr indent="-317500" lvl="1" marL="914400" rtl="0" algn="l">
+              <a:spcBef>
+                <a:spcPts val="0"/>
+              </a:spcBef>
+              <a:spcAft>
+                <a:spcPts val="0"/>
+              </a:spcAft>
+              <a:buSzPts val="1400"/>
+              <a:buChar char="-"/>
+            </a:pPr>
+            <a:r>
+              <a:rPr lang="en"/>
+              <a:t>For use this means they are derived directly from our user stories</a:t>
+            </a:r>
+            <a:endParaRPr/>
+          </a:p>
+          <a:p>
+            <a:pPr indent="-342900" lvl="0" marL="457200" rtl="0" algn="l">
+              <a:spcBef>
+                <a:spcPts val="0"/>
+              </a:spcBef>
+              <a:spcAft>
+                <a:spcPts val="0"/>
+              </a:spcAft>
+              <a:buSzPts val="1800"/>
+              <a:buChar char="-"/>
+            </a:pPr>
+            <a:r>
+              <a:rPr lang="en"/>
+              <a:t>Format is Gherkin Syntax which is a behavioral driven development (BDD) syntax that allows us to define our tests in terms of user state and behavior</a:t>
+            </a:r>
+            <a:endParaRPr/>
+          </a:p>
+          <a:p>
+            <a:pPr indent="0" lvl="0" marL="0" rtl="0" algn="l">
               <a:spcBef>
                 <a:spcPts val="1200"/>
               </a:spcBef>
               <a:spcAft>
-                <a:spcPts val="0"/>
-              </a:spcAft>
-              <a:buNone/>
-            </a:pPr>
-            <a:r>
-              <a:t/>
-            </a:r>
-            <a:endParaRPr/>
-          </a:p>
-          <a:p>
-            <a:pPr indent="0" lvl="0" marL="457200" rtl="0" algn="l">
-              <a:spcBef>
                 <a:spcPts val="1200"/>
-              </a:spcBef>
-              <a:spcAft>
-                <a:spcPts val="1200"/>
-              </a:spcAft>
-              <a:buNone/>
-            </a:pPr>
-            <a:r>
-              <a:t/>
+              </a:spcAft>
+              <a:buNone/>
+            </a:pPr>
+            <a:r>
+              <a:rPr lang="en"/>
+              <a:t>Acceptance tests for each user story can be found in the submission document</a:t>
             </a:r>
             <a:endParaRPr/>
           </a:p>
         </p:txBody>
       </p:sp>
-      <p:pic>
-        <p:nvPicPr>
-          <p:cNvPr id="217" name="Google Shape;217;p40"/>
-          <p:cNvPicPr preferRelativeResize="0"/>
-          <p:nvPr/>
-        </p:nvPicPr>
-        <p:blipFill>
-          <a:blip r:embed="rId4">
-            <a:alphaModFix/>
-          </a:blip>
-          <a:stretch>
-            <a:fillRect/>
-          </a:stretch>
-        </p:blipFill>
-        <p:spPr>
-          <a:xfrm>
-            <a:off x="728578" y="2211303"/>
-            <a:ext cx="7686825" cy="2594775"/>
-          </a:xfrm>
-          <a:prstGeom prst="rect">
-            <a:avLst/>
-          </a:prstGeom>
-          <a:noFill/>
-          <a:ln>
-            <a:noFill/>
-          </a:ln>
-        </p:spPr>
-      </p:pic>
     </p:spTree>
   </p:cSld>
   <p:clrMapOvr>
@@ -12228,7 +11656,7 @@
   <p:cSld>
     <p:spTree>
       <p:nvGrpSpPr>
-        <p:cNvPr id="221" name="Shape 221"/>
+        <p:cNvPr id="224" name="Shape 224"/>
         <p:cNvGrpSpPr/>
         <p:nvPr/>
       </p:nvGrpSpPr>
@@ -12242,7 +11670,7 @@
       </p:grpSpPr>
       <p:sp>
         <p:nvSpPr>
-          <p:cNvPr id="222" name="Google Shape;222;p41"/>
+          <p:cNvPr id="225" name="Google Shape;225;p41"/>
           <p:cNvSpPr txBox="1"/>
           <p:nvPr>
             <p:ph type="title"/>
@@ -12274,7 +11702,7 @@
             </a:pPr>
             <a:r>
               <a:rPr lang="en"/>
-              <a:t>Testing plan</a:t>
+              <a:t>Live demo</a:t>
             </a:r>
             <a:endParaRPr/>
           </a:p>
@@ -12397,7 +11825,7 @@
             </a:pPr>
             <a:r>
               <a:rPr lang="en"/>
-              <a:t>Sprint 4 Summary + retrospective overview</a:t>
+              <a:t>Sprint 5 Summary + retrospective overview</a:t>
             </a:r>
             <a:endParaRPr/>
           </a:p>
@@ -12431,7 +11859,7 @@
             </a:pPr>
             <a:r>
               <a:rPr lang="en"/>
-              <a:t>UI Prototype showcase</a:t>
+              <a:t>Architecture review + tech stack</a:t>
             </a:r>
             <a:endParaRPr/>
           </a:p>
@@ -12448,7 +11876,7 @@
             </a:pPr>
             <a:r>
               <a:rPr lang="en"/>
-              <a:t>Architecture review + tech stack</a:t>
+              <a:t>Testing plan</a:t>
             </a:r>
             <a:endParaRPr/>
           </a:p>
@@ -12465,41 +11893,7 @@
             </a:pPr>
             <a:r>
               <a:rPr lang="en"/>
-              <a:t>Testing plan</a:t>
-            </a:r>
-            <a:endParaRPr/>
-          </a:p>
-          <a:p>
-            <a:pPr indent="-342900" lvl="0" marL="457200" rtl="0" algn="l">
-              <a:spcBef>
-                <a:spcPts val="0"/>
-              </a:spcBef>
-              <a:spcAft>
-                <a:spcPts val="0"/>
-              </a:spcAft>
-              <a:buSzPts val="1800"/>
-              <a:buAutoNum type="arabicPeriod"/>
-            </a:pPr>
-            <a:r>
-              <a:rPr lang="en"/>
               <a:t>Live demo</a:t>
-            </a:r>
-            <a:endParaRPr/>
-          </a:p>
-          <a:p>
-            <a:pPr indent="-342900" lvl="0" marL="457200" rtl="0" algn="l">
-              <a:spcBef>
-                <a:spcPts val="0"/>
-              </a:spcBef>
-              <a:spcAft>
-                <a:spcPts val="0"/>
-              </a:spcAft>
-              <a:buSzPts val="1800"/>
-              <a:buAutoNum type="arabicPeriod"/>
-            </a:pPr>
-            <a:r>
-              <a:rPr lang="en"/>
-              <a:t>Sprint 5 planning</a:t>
             </a:r>
             <a:endParaRPr/>
           </a:p>
@@ -12535,7 +11929,7 @@
   <p:cSld>
     <p:spTree>
       <p:nvGrpSpPr>
-        <p:cNvPr id="226" name="Shape 226"/>
+        <p:cNvPr id="229" name="Shape 229"/>
         <p:cNvGrpSpPr/>
         <p:nvPr/>
       </p:nvGrpSpPr>
@@ -12549,1100 +11943,7 @@
       </p:grpSpPr>
       <p:sp>
         <p:nvSpPr>
-          <p:cNvPr id="227" name="Google Shape;227;p42"/>
-          <p:cNvSpPr txBox="1"/>
-          <p:nvPr>
-            <p:ph type="title"/>
-          </p:nvPr>
-        </p:nvSpPr>
-        <p:spPr>
-          <a:xfrm>
-            <a:off x="311700" y="445025"/>
-            <a:ext cx="8520600" cy="572700"/>
-          </a:xfrm>
-          <a:prstGeom prst="rect">
-            <a:avLst/>
-          </a:prstGeom>
-        </p:spPr>
-        <p:txBody>
-          <a:bodyPr anchorCtr="0" anchor="t" bIns="91425" lIns="91425" spcFirstLastPara="1" rIns="91425" wrap="square" tIns="91425">
-            <a:normAutofit fontScale="90000"/>
-          </a:bodyPr>
-          <a:lstStyle/>
-          <a:p>
-            <a:pPr indent="0" lvl="0" marL="0" rtl="0" algn="l">
-              <a:spcBef>
-                <a:spcPts val="0"/>
-              </a:spcBef>
-              <a:spcAft>
-                <a:spcPts val="0"/>
-              </a:spcAft>
-              <a:buNone/>
-            </a:pPr>
-            <a:r>
-              <a:rPr lang="en"/>
-              <a:t>Our testing plan</a:t>
-            </a:r>
-            <a:endParaRPr/>
-          </a:p>
-        </p:txBody>
-      </p:sp>
-      <p:sp>
-        <p:nvSpPr>
-          <p:cNvPr id="228" name="Google Shape;228;p42"/>
-          <p:cNvSpPr txBox="1"/>
-          <p:nvPr>
-            <p:ph idx="1" type="body"/>
-          </p:nvPr>
-        </p:nvSpPr>
-        <p:spPr>
-          <a:xfrm>
-            <a:off x="311700" y="1152475"/>
-            <a:ext cx="8520600" cy="3416400"/>
-          </a:xfrm>
-          <a:prstGeom prst="rect">
-            <a:avLst/>
-          </a:prstGeom>
-        </p:spPr>
-        <p:txBody>
-          <a:bodyPr anchorCtr="0" anchor="t" bIns="91425" lIns="91425" spcFirstLastPara="1" rIns="91425" wrap="square" tIns="91425">
-            <a:normAutofit lnSpcReduction="10000"/>
-          </a:bodyPr>
-          <a:lstStyle/>
-          <a:p>
-            <a:pPr indent="0" lvl="0" marL="0" rtl="0" algn="l">
-              <a:spcBef>
-                <a:spcPts val="0"/>
-              </a:spcBef>
-              <a:spcAft>
-                <a:spcPts val="0"/>
-              </a:spcAft>
-              <a:buNone/>
-            </a:pPr>
-            <a:r>
-              <a:rPr lang="en"/>
-              <a:t>We have identified 4 types of tests for our system</a:t>
-            </a:r>
-            <a:endParaRPr/>
-          </a:p>
-          <a:p>
-            <a:pPr indent="-342900" lvl="0" marL="457200" rtl="0" algn="l">
-              <a:spcBef>
-                <a:spcPts val="1200"/>
-              </a:spcBef>
-              <a:spcAft>
-                <a:spcPts val="0"/>
-              </a:spcAft>
-              <a:buSzPts val="1800"/>
-              <a:buChar char="-"/>
-            </a:pPr>
-            <a:r>
-              <a:rPr lang="en"/>
-              <a:t>Unit tests</a:t>
-            </a:r>
-            <a:endParaRPr/>
-          </a:p>
-          <a:p>
-            <a:pPr indent="-342900" lvl="0" marL="457200" rtl="0" algn="l">
-              <a:spcBef>
-                <a:spcPts val="0"/>
-              </a:spcBef>
-              <a:spcAft>
-                <a:spcPts val="0"/>
-              </a:spcAft>
-              <a:buSzPts val="1800"/>
-              <a:buChar char="-"/>
-            </a:pPr>
-            <a:r>
-              <a:rPr lang="en"/>
-              <a:t>Integration tests</a:t>
-            </a:r>
-            <a:endParaRPr/>
-          </a:p>
-          <a:p>
-            <a:pPr indent="-342900" lvl="0" marL="457200" rtl="0" algn="l">
-              <a:spcBef>
-                <a:spcPts val="0"/>
-              </a:spcBef>
-              <a:spcAft>
-                <a:spcPts val="0"/>
-              </a:spcAft>
-              <a:buSzPts val="1800"/>
-              <a:buChar char="-"/>
-            </a:pPr>
-            <a:r>
-              <a:rPr lang="en"/>
-              <a:t>System tests</a:t>
-            </a:r>
-            <a:endParaRPr/>
-          </a:p>
-          <a:p>
-            <a:pPr indent="-342900" lvl="0" marL="457200" rtl="0" algn="l">
-              <a:spcBef>
-                <a:spcPts val="0"/>
-              </a:spcBef>
-              <a:spcAft>
-                <a:spcPts val="0"/>
-              </a:spcAft>
-              <a:buSzPts val="1800"/>
-              <a:buChar char="-"/>
-            </a:pPr>
-            <a:r>
-              <a:rPr lang="en"/>
-              <a:t>Acceptance</a:t>
-            </a:r>
-            <a:r>
-              <a:rPr lang="en"/>
-              <a:t> tests</a:t>
-            </a:r>
-            <a:endParaRPr/>
-          </a:p>
-          <a:p>
-            <a:pPr indent="0" lvl="0" marL="0" rtl="0" algn="l">
-              <a:spcBef>
-                <a:spcPts val="1200"/>
-              </a:spcBef>
-              <a:spcAft>
-                <a:spcPts val="0"/>
-              </a:spcAft>
-              <a:buNone/>
-            </a:pPr>
-            <a:r>
-              <a:rPr lang="en"/>
-              <a:t>Most are automated some are manual</a:t>
-            </a:r>
-            <a:endParaRPr/>
-          </a:p>
-          <a:p>
-            <a:pPr indent="0" lvl="0" marL="0" rtl="0" algn="l">
-              <a:spcBef>
-                <a:spcPts val="1200"/>
-              </a:spcBef>
-              <a:spcAft>
-                <a:spcPts val="0"/>
-              </a:spcAft>
-              <a:buNone/>
-            </a:pPr>
-            <a:r>
-              <a:rPr lang="en"/>
-              <a:t>Some have output reports</a:t>
-            </a:r>
-            <a:endParaRPr/>
-          </a:p>
-          <a:p>
-            <a:pPr indent="0" lvl="0" marL="0" rtl="0" algn="l">
-              <a:spcBef>
-                <a:spcPts val="1200"/>
-              </a:spcBef>
-              <a:spcAft>
-                <a:spcPts val="1200"/>
-              </a:spcAft>
-              <a:buNone/>
-            </a:pPr>
-            <a:r>
-              <a:rPr lang="en"/>
-              <a:t>**More about the specific packages we use for our testing framework </a:t>
-            </a:r>
-            <a:r>
-              <a:rPr lang="en"/>
-              <a:t>and a comparison between all of them</a:t>
-            </a:r>
-            <a:r>
-              <a:rPr lang="en"/>
-              <a:t> can be found in the document**</a:t>
-            </a:r>
-            <a:endParaRPr/>
-          </a:p>
-        </p:txBody>
-      </p:sp>
-    </p:spTree>
-  </p:cSld>
-  <p:clrMapOvr>
-    <a:masterClrMapping/>
-  </p:clrMapOvr>
-</p:sld>
-</file>
-
-<file path=ppt/slides/slide31.xml><?xml version="1.0" encoding="utf-8"?>
-<p:sld xmlns:a="http://schemas.openxmlformats.org/drawingml/2006/main" xmlns:r="http://schemas.openxmlformats.org/officeDocument/2006/relationships" xmlns:mc="http://schemas.openxmlformats.org/markup-compatibility/2006" xmlns:mv="urn:schemas-microsoft-com:mac:vml" xmlns:p="http://schemas.openxmlformats.org/presentationml/2006/main" xmlns:c="http://schemas.openxmlformats.org/drawingml/2006/chart" xmlns:dgm="http://schemas.openxmlformats.org/drawingml/2006/diagram" xmlns:o="urn:schemas-microsoft-com:office:office" xmlns:v="urn:schemas-microsoft-com:vml" xmlns:pvml="urn:schemas-microsoft-com:office:powerpoint" xmlns:com="http://schemas.openxmlformats.org/drawingml/2006/compatibility" xmlns:p14="http://schemas.microsoft.com/office/powerpoint/2010/main" xmlns:p15="http://schemas.microsoft.com/office/powerpoint/2012/main" xmlns:ahyp="http://schemas.microsoft.com/office/drawing/2018/hyperlinkcolor">
-  <p:cSld>
-    <p:spTree>
-      <p:nvGrpSpPr>
-        <p:cNvPr id="232" name="Shape 232"/>
-        <p:cNvGrpSpPr/>
-        <p:nvPr/>
-      </p:nvGrpSpPr>
-      <p:grpSpPr>
-        <a:xfrm>
-          <a:off x="0" y="0"/>
-          <a:ext cx="0" cy="0"/>
-          <a:chOff x="0" y="0"/>
-          <a:chExt cx="0" cy="0"/>
-        </a:xfrm>
-      </p:grpSpPr>
-      <p:sp>
-        <p:nvSpPr>
-          <p:cNvPr id="233" name="Google Shape;233;p43"/>
-          <p:cNvSpPr txBox="1"/>
-          <p:nvPr>
-            <p:ph type="title"/>
-          </p:nvPr>
-        </p:nvSpPr>
-        <p:spPr>
-          <a:xfrm>
-            <a:off x="311700" y="445025"/>
-            <a:ext cx="8520600" cy="572700"/>
-          </a:xfrm>
-          <a:prstGeom prst="rect">
-            <a:avLst/>
-          </a:prstGeom>
-        </p:spPr>
-        <p:txBody>
-          <a:bodyPr anchorCtr="0" anchor="t" bIns="91425" lIns="91425" spcFirstLastPara="1" rIns="91425" wrap="square" tIns="91425">
-            <a:normAutofit fontScale="90000"/>
-          </a:bodyPr>
-          <a:lstStyle/>
-          <a:p>
-            <a:pPr indent="0" lvl="0" marL="0" rtl="0" algn="l">
-              <a:spcBef>
-                <a:spcPts val="0"/>
-              </a:spcBef>
-              <a:spcAft>
-                <a:spcPts val="0"/>
-              </a:spcAft>
-              <a:buNone/>
-            </a:pPr>
-            <a:r>
-              <a:rPr lang="en"/>
-              <a:t>Unit test report</a:t>
-            </a:r>
-            <a:endParaRPr/>
-          </a:p>
-        </p:txBody>
-      </p:sp>
-      <p:sp>
-        <p:nvSpPr>
-          <p:cNvPr id="234" name="Google Shape;234;p43"/>
-          <p:cNvSpPr txBox="1"/>
-          <p:nvPr>
-            <p:ph idx="1" type="body"/>
-          </p:nvPr>
-        </p:nvSpPr>
-        <p:spPr>
-          <a:xfrm>
-            <a:off x="311700" y="1152475"/>
-            <a:ext cx="4020900" cy="3416400"/>
-          </a:xfrm>
-          <a:prstGeom prst="rect">
-            <a:avLst/>
-          </a:prstGeom>
-        </p:spPr>
-        <p:txBody>
-          <a:bodyPr anchorCtr="0" anchor="t" bIns="91425" lIns="91425" spcFirstLastPara="1" rIns="91425" wrap="square" tIns="91425">
-            <a:normAutofit/>
-          </a:bodyPr>
-          <a:lstStyle/>
-          <a:p>
-            <a:pPr indent="-342900" lvl="0" marL="457200" rtl="0" algn="l">
-              <a:spcBef>
-                <a:spcPts val="0"/>
-              </a:spcBef>
-              <a:spcAft>
-                <a:spcPts val="0"/>
-              </a:spcAft>
-              <a:buSzPts val="1800"/>
-              <a:buChar char="-"/>
-            </a:pPr>
-            <a:r>
-              <a:rPr lang="en">
-                <a:highlight>
-                  <a:srgbClr val="00FF00"/>
-                </a:highlight>
-              </a:rPr>
-              <a:t>91</a:t>
-            </a:r>
-            <a:r>
-              <a:rPr lang="en">
-                <a:highlight>
-                  <a:srgbClr val="00FF00"/>
-                </a:highlight>
-              </a:rPr>
-              <a:t> unit tests</a:t>
-            </a:r>
-            <a:endParaRPr>
-              <a:highlight>
-                <a:srgbClr val="00FF00"/>
-              </a:highlight>
-            </a:endParaRPr>
-          </a:p>
-          <a:p>
-            <a:pPr indent="-342900" lvl="0" marL="457200" rtl="0" algn="l">
-              <a:spcBef>
-                <a:spcPts val="0"/>
-              </a:spcBef>
-              <a:spcAft>
-                <a:spcPts val="0"/>
-              </a:spcAft>
-              <a:buSzPts val="1800"/>
-              <a:buChar char="-"/>
-            </a:pPr>
-            <a:r>
-              <a:rPr lang="en">
-                <a:highlight>
-                  <a:srgbClr val="00FF00"/>
-                </a:highlight>
-              </a:rPr>
-              <a:t>57 integration tests</a:t>
-            </a:r>
-            <a:endParaRPr>
-              <a:highlight>
-                <a:srgbClr val="00FF00"/>
-              </a:highlight>
-            </a:endParaRPr>
-          </a:p>
-          <a:p>
-            <a:pPr indent="-342900" lvl="0" marL="457200" rtl="0" algn="l">
-              <a:spcBef>
-                <a:spcPts val="0"/>
-              </a:spcBef>
-              <a:spcAft>
-                <a:spcPts val="0"/>
-              </a:spcAft>
-              <a:buSzPts val="1800"/>
-              <a:buChar char="-"/>
-            </a:pPr>
-            <a:r>
-              <a:rPr lang="en"/>
-              <a:t>41</a:t>
-            </a:r>
-            <a:r>
-              <a:rPr lang="en"/>
-              <a:t> test suites</a:t>
-            </a:r>
-            <a:endParaRPr/>
-          </a:p>
-          <a:p>
-            <a:pPr indent="-342900" lvl="0" marL="457200" rtl="0" algn="l">
-              <a:spcBef>
-                <a:spcPts val="0"/>
-              </a:spcBef>
-              <a:spcAft>
-                <a:spcPts val="0"/>
-              </a:spcAft>
-              <a:buSzPts val="1800"/>
-              <a:buChar char="-"/>
-            </a:pPr>
-            <a:r>
-              <a:rPr lang="en"/>
-              <a:t>0 failures</a:t>
-            </a:r>
-            <a:endParaRPr/>
-          </a:p>
-        </p:txBody>
-      </p:sp>
-      <p:pic>
-        <p:nvPicPr>
-          <p:cNvPr id="235" name="Google Shape;235;p43"/>
-          <p:cNvPicPr preferRelativeResize="0"/>
-          <p:nvPr/>
-        </p:nvPicPr>
-        <p:blipFill>
-          <a:blip r:embed="rId3">
-            <a:alphaModFix/>
-          </a:blip>
-          <a:stretch>
-            <a:fillRect/>
-          </a:stretch>
-        </p:blipFill>
-        <p:spPr>
-          <a:xfrm>
-            <a:off x="4443425" y="0"/>
-            <a:ext cx="3990748" cy="5143500"/>
-          </a:xfrm>
-          <a:prstGeom prst="rect">
-            <a:avLst/>
-          </a:prstGeom>
-          <a:noFill/>
-          <a:ln>
-            <a:noFill/>
-          </a:ln>
-        </p:spPr>
-      </p:pic>
-    </p:spTree>
-  </p:cSld>
-  <p:clrMapOvr>
-    <a:masterClrMapping/>
-  </p:clrMapOvr>
-</p:sld>
-</file>
-
-<file path=ppt/slides/slide32.xml><?xml version="1.0" encoding="utf-8"?>
-<p:sld xmlns:a="http://schemas.openxmlformats.org/drawingml/2006/main" xmlns:r="http://schemas.openxmlformats.org/officeDocument/2006/relationships" xmlns:mc="http://schemas.openxmlformats.org/markup-compatibility/2006" xmlns:mv="urn:schemas-microsoft-com:mac:vml" xmlns:p="http://schemas.openxmlformats.org/presentationml/2006/main" xmlns:c="http://schemas.openxmlformats.org/drawingml/2006/chart" xmlns:dgm="http://schemas.openxmlformats.org/drawingml/2006/diagram" xmlns:o="urn:schemas-microsoft-com:office:office" xmlns:v="urn:schemas-microsoft-com:vml" xmlns:pvml="urn:schemas-microsoft-com:office:powerpoint" xmlns:com="http://schemas.openxmlformats.org/drawingml/2006/compatibility" xmlns:p14="http://schemas.microsoft.com/office/powerpoint/2010/main" xmlns:p15="http://schemas.microsoft.com/office/powerpoint/2012/main" xmlns:ahyp="http://schemas.microsoft.com/office/drawing/2018/hyperlinkcolor">
-  <p:cSld>
-    <p:spTree>
-      <p:nvGrpSpPr>
-        <p:cNvPr id="239" name="Shape 239"/>
-        <p:cNvGrpSpPr/>
-        <p:nvPr/>
-      </p:nvGrpSpPr>
-      <p:grpSpPr>
-        <a:xfrm>
-          <a:off x="0" y="0"/>
-          <a:ext cx="0" cy="0"/>
-          <a:chOff x="0" y="0"/>
-          <a:chExt cx="0" cy="0"/>
-        </a:xfrm>
-      </p:grpSpPr>
-      <p:sp>
-        <p:nvSpPr>
-          <p:cNvPr id="240" name="Google Shape;240;p44"/>
-          <p:cNvSpPr txBox="1"/>
-          <p:nvPr>
-            <p:ph type="title"/>
-          </p:nvPr>
-        </p:nvSpPr>
-        <p:spPr>
-          <a:xfrm>
-            <a:off x="311700" y="445025"/>
-            <a:ext cx="8520600" cy="572700"/>
-          </a:xfrm>
-          <a:prstGeom prst="rect">
-            <a:avLst/>
-          </a:prstGeom>
-        </p:spPr>
-        <p:txBody>
-          <a:bodyPr anchorCtr="0" anchor="t" bIns="91425" lIns="91425" spcFirstLastPara="1" rIns="91425" wrap="square" tIns="91425">
-            <a:normAutofit fontScale="90000"/>
-          </a:bodyPr>
-          <a:lstStyle/>
-          <a:p>
-            <a:pPr indent="0" lvl="0" marL="0" rtl="0" algn="l">
-              <a:spcBef>
-                <a:spcPts val="0"/>
-              </a:spcBef>
-              <a:spcAft>
-                <a:spcPts val="0"/>
-              </a:spcAft>
-              <a:buNone/>
-            </a:pPr>
-            <a:r>
-              <a:rPr lang="en"/>
-              <a:t>Code coverage report</a:t>
-            </a:r>
-            <a:endParaRPr/>
-          </a:p>
-        </p:txBody>
-      </p:sp>
-      <p:sp>
-        <p:nvSpPr>
-          <p:cNvPr id="241" name="Google Shape;241;p44"/>
-          <p:cNvSpPr txBox="1"/>
-          <p:nvPr>
-            <p:ph idx="1" type="body"/>
-          </p:nvPr>
-        </p:nvSpPr>
-        <p:spPr>
-          <a:xfrm>
-            <a:off x="311700" y="1152475"/>
-            <a:ext cx="8520600" cy="3416400"/>
-          </a:xfrm>
-          <a:prstGeom prst="rect">
-            <a:avLst/>
-          </a:prstGeom>
-        </p:spPr>
-        <p:txBody>
-          <a:bodyPr anchorCtr="0" anchor="t" bIns="91425" lIns="91425" spcFirstLastPara="1" rIns="91425" wrap="square" tIns="91425">
-            <a:normAutofit/>
-          </a:bodyPr>
-          <a:lstStyle/>
-          <a:p>
-            <a:pPr indent="0" lvl="0" marL="0" rtl="0" algn="l">
-              <a:spcBef>
-                <a:spcPts val="0"/>
-              </a:spcBef>
-              <a:spcAft>
-                <a:spcPts val="1200"/>
-              </a:spcAft>
-              <a:buNone/>
-            </a:pPr>
-            <a:r>
-              <a:t/>
-            </a:r>
-            <a:endParaRPr/>
-          </a:p>
-        </p:txBody>
-      </p:sp>
-      <p:pic>
-        <p:nvPicPr>
-          <p:cNvPr id="242" name="Google Shape;242;p44"/>
-          <p:cNvPicPr preferRelativeResize="0"/>
-          <p:nvPr/>
-        </p:nvPicPr>
-        <p:blipFill>
-          <a:blip r:embed="rId3">
-            <a:alphaModFix/>
-          </a:blip>
-          <a:stretch>
-            <a:fillRect/>
-          </a:stretch>
-        </p:blipFill>
-        <p:spPr>
-          <a:xfrm>
-            <a:off x="1498346" y="1152475"/>
-            <a:ext cx="6147301" cy="3512726"/>
-          </a:xfrm>
-          <a:prstGeom prst="rect">
-            <a:avLst/>
-          </a:prstGeom>
-          <a:noFill/>
-          <a:ln>
-            <a:noFill/>
-          </a:ln>
-        </p:spPr>
-      </p:pic>
-    </p:spTree>
-  </p:cSld>
-  <p:clrMapOvr>
-    <a:masterClrMapping/>
-  </p:clrMapOvr>
-</p:sld>
-</file>
-
-<file path=ppt/slides/slide33.xml><?xml version="1.0" encoding="utf-8"?>
-<p:sld xmlns:a="http://schemas.openxmlformats.org/drawingml/2006/main" xmlns:r="http://schemas.openxmlformats.org/officeDocument/2006/relationships" xmlns:mc="http://schemas.openxmlformats.org/markup-compatibility/2006" xmlns:mv="urn:schemas-microsoft-com:mac:vml" xmlns:p="http://schemas.openxmlformats.org/presentationml/2006/main" xmlns:c="http://schemas.openxmlformats.org/drawingml/2006/chart" xmlns:dgm="http://schemas.openxmlformats.org/drawingml/2006/diagram" xmlns:o="urn:schemas-microsoft-com:office:office" xmlns:v="urn:schemas-microsoft-com:vml" xmlns:pvml="urn:schemas-microsoft-com:office:powerpoint" xmlns:com="http://schemas.openxmlformats.org/drawingml/2006/compatibility" xmlns:p14="http://schemas.microsoft.com/office/powerpoint/2010/main" xmlns:p15="http://schemas.microsoft.com/office/powerpoint/2012/main" xmlns:ahyp="http://schemas.microsoft.com/office/drawing/2018/hyperlinkcolor">
-  <p:cSld>
-    <p:spTree>
-      <p:nvGrpSpPr>
-        <p:cNvPr id="246" name="Shape 246"/>
-        <p:cNvGrpSpPr/>
-        <p:nvPr/>
-      </p:nvGrpSpPr>
-      <p:grpSpPr>
-        <a:xfrm>
-          <a:off x="0" y="0"/>
-          <a:ext cx="0" cy="0"/>
-          <a:chOff x="0" y="0"/>
-          <a:chExt cx="0" cy="0"/>
-        </a:xfrm>
-      </p:grpSpPr>
-      <p:sp>
-        <p:nvSpPr>
-          <p:cNvPr id="247" name="Google Shape;247;p45"/>
-          <p:cNvSpPr txBox="1"/>
-          <p:nvPr>
-            <p:ph type="title"/>
-          </p:nvPr>
-        </p:nvSpPr>
-        <p:spPr>
-          <a:xfrm>
-            <a:off x="311700" y="445025"/>
-            <a:ext cx="8520600" cy="572700"/>
-          </a:xfrm>
-          <a:prstGeom prst="rect">
-            <a:avLst/>
-          </a:prstGeom>
-        </p:spPr>
-        <p:txBody>
-          <a:bodyPr anchorCtr="0" anchor="t" bIns="91425" lIns="91425" spcFirstLastPara="1" rIns="91425" wrap="square" tIns="91425">
-            <a:normAutofit fontScale="90000"/>
-          </a:bodyPr>
-          <a:lstStyle/>
-          <a:p>
-            <a:pPr indent="0" lvl="0" marL="0" rtl="0" algn="l">
-              <a:spcBef>
-                <a:spcPts val="0"/>
-              </a:spcBef>
-              <a:spcAft>
-                <a:spcPts val="0"/>
-              </a:spcAft>
-              <a:buNone/>
-            </a:pPr>
-            <a:r>
-              <a:rPr lang="en"/>
-              <a:t>Integration tests</a:t>
-            </a:r>
-            <a:endParaRPr/>
-          </a:p>
-        </p:txBody>
-      </p:sp>
-      <p:sp>
-        <p:nvSpPr>
-          <p:cNvPr id="248" name="Google Shape;248;p45"/>
-          <p:cNvSpPr txBox="1"/>
-          <p:nvPr>
-            <p:ph idx="1" type="body"/>
-          </p:nvPr>
-        </p:nvSpPr>
-        <p:spPr>
-          <a:xfrm>
-            <a:off x="311700" y="1152475"/>
-            <a:ext cx="8520600" cy="3416400"/>
-          </a:xfrm>
-          <a:prstGeom prst="rect">
-            <a:avLst/>
-          </a:prstGeom>
-        </p:spPr>
-        <p:txBody>
-          <a:bodyPr anchorCtr="0" anchor="t" bIns="91425" lIns="91425" spcFirstLastPara="1" rIns="91425" wrap="square" tIns="91425">
-            <a:normAutofit/>
-          </a:bodyPr>
-          <a:lstStyle/>
-          <a:p>
-            <a:pPr indent="-342900" lvl="0" marL="457200" rtl="0" algn="l">
-              <a:spcBef>
-                <a:spcPts val="0"/>
-              </a:spcBef>
-              <a:spcAft>
-                <a:spcPts val="0"/>
-              </a:spcAft>
-              <a:buSzPts val="1800"/>
-              <a:buChar char="-"/>
-            </a:pPr>
-            <a:r>
-              <a:rPr lang="en"/>
-              <a:t>Our integration tests are automated tests</a:t>
-            </a:r>
-            <a:endParaRPr/>
-          </a:p>
-          <a:p>
-            <a:pPr indent="-342900" lvl="0" marL="457200" rtl="0" algn="l">
-              <a:spcBef>
-                <a:spcPts val="0"/>
-              </a:spcBef>
-              <a:spcAft>
-                <a:spcPts val="0"/>
-              </a:spcAft>
-              <a:buSzPts val="1800"/>
-              <a:buChar char="-"/>
-            </a:pPr>
-            <a:r>
-              <a:rPr lang="en"/>
-              <a:t>The tests use a full PostgreSQL DB instance running in docker</a:t>
-            </a:r>
-            <a:endParaRPr/>
-          </a:p>
-          <a:p>
-            <a:pPr indent="-317500" lvl="1" marL="914400" rtl="0" algn="l">
-              <a:spcBef>
-                <a:spcPts val="0"/>
-              </a:spcBef>
-              <a:spcAft>
-                <a:spcPts val="0"/>
-              </a:spcAft>
-              <a:buSzPts val="1400"/>
-              <a:buChar char="-"/>
-            </a:pPr>
-            <a:r>
-              <a:rPr lang="en"/>
-              <a:t>We have written db initialization and seeding scripts to help scaffold the tests</a:t>
-            </a:r>
-            <a:endParaRPr/>
-          </a:p>
-        </p:txBody>
-      </p:sp>
-    </p:spTree>
-  </p:cSld>
-  <p:clrMapOvr>
-    <a:masterClrMapping/>
-  </p:clrMapOvr>
-</p:sld>
-</file>
-
-<file path=ppt/slides/slide34.xml><?xml version="1.0" encoding="utf-8"?>
-<p:sld xmlns:a="http://schemas.openxmlformats.org/drawingml/2006/main" xmlns:r="http://schemas.openxmlformats.org/officeDocument/2006/relationships" xmlns:mc="http://schemas.openxmlformats.org/markup-compatibility/2006" xmlns:mv="urn:schemas-microsoft-com:mac:vml" xmlns:p="http://schemas.openxmlformats.org/presentationml/2006/main" xmlns:c="http://schemas.openxmlformats.org/drawingml/2006/chart" xmlns:dgm="http://schemas.openxmlformats.org/drawingml/2006/diagram" xmlns:o="urn:schemas-microsoft-com:office:office" xmlns:v="urn:schemas-microsoft-com:vml" xmlns:pvml="urn:schemas-microsoft-com:office:powerpoint" xmlns:com="http://schemas.openxmlformats.org/drawingml/2006/compatibility" xmlns:p14="http://schemas.microsoft.com/office/powerpoint/2010/main" xmlns:p15="http://schemas.microsoft.com/office/powerpoint/2012/main" xmlns:ahyp="http://schemas.microsoft.com/office/drawing/2018/hyperlinkcolor">
-  <p:cSld>
-    <p:spTree>
-      <p:nvGrpSpPr>
-        <p:cNvPr id="252" name="Shape 252"/>
-        <p:cNvGrpSpPr/>
-        <p:nvPr/>
-      </p:nvGrpSpPr>
-      <p:grpSpPr>
-        <a:xfrm>
-          <a:off x="0" y="0"/>
-          <a:ext cx="0" cy="0"/>
-          <a:chOff x="0" y="0"/>
-          <a:chExt cx="0" cy="0"/>
-        </a:xfrm>
-      </p:grpSpPr>
-      <p:sp>
-        <p:nvSpPr>
-          <p:cNvPr id="253" name="Google Shape;253;p46"/>
-          <p:cNvSpPr txBox="1"/>
-          <p:nvPr>
-            <p:ph type="title"/>
-          </p:nvPr>
-        </p:nvSpPr>
-        <p:spPr>
-          <a:xfrm>
-            <a:off x="311700" y="445025"/>
-            <a:ext cx="8520600" cy="572700"/>
-          </a:xfrm>
-          <a:prstGeom prst="rect">
-            <a:avLst/>
-          </a:prstGeom>
-        </p:spPr>
-        <p:txBody>
-          <a:bodyPr anchorCtr="0" anchor="t" bIns="91425" lIns="91425" spcFirstLastPara="1" rIns="91425" wrap="square" tIns="91425">
-            <a:normAutofit fontScale="90000"/>
-          </a:bodyPr>
-          <a:lstStyle/>
-          <a:p>
-            <a:pPr indent="0" lvl="0" marL="0" rtl="0" algn="l">
-              <a:spcBef>
-                <a:spcPts val="0"/>
-              </a:spcBef>
-              <a:spcAft>
-                <a:spcPts val="0"/>
-              </a:spcAft>
-              <a:buNone/>
-            </a:pPr>
-            <a:r>
-              <a:rPr lang="en"/>
-              <a:t>System Tests</a:t>
-            </a:r>
-            <a:endParaRPr/>
-          </a:p>
-        </p:txBody>
-      </p:sp>
-      <p:sp>
-        <p:nvSpPr>
-          <p:cNvPr id="254" name="Google Shape;254;p46"/>
-          <p:cNvSpPr txBox="1"/>
-          <p:nvPr>
-            <p:ph idx="1" type="body"/>
-          </p:nvPr>
-        </p:nvSpPr>
-        <p:spPr>
-          <a:xfrm>
-            <a:off x="311700" y="1152475"/>
-            <a:ext cx="8520600" cy="3416400"/>
-          </a:xfrm>
-          <a:prstGeom prst="rect">
-            <a:avLst/>
-          </a:prstGeom>
-        </p:spPr>
-        <p:txBody>
-          <a:bodyPr anchorCtr="0" anchor="t" bIns="91425" lIns="91425" spcFirstLastPara="1" rIns="91425" wrap="square" tIns="91425">
-            <a:normAutofit/>
-          </a:bodyPr>
-          <a:lstStyle/>
-          <a:p>
-            <a:pPr indent="-342900" lvl="0" marL="457200" rtl="0" algn="l">
-              <a:spcBef>
-                <a:spcPts val="0"/>
-              </a:spcBef>
-              <a:spcAft>
-                <a:spcPts val="0"/>
-              </a:spcAft>
-              <a:buSzPts val="1800"/>
-              <a:buChar char="-"/>
-            </a:pPr>
-            <a:r>
-              <a:rPr lang="en"/>
-              <a:t>Run </a:t>
-            </a:r>
-            <a:r>
-              <a:rPr lang="en"/>
-              <a:t>manually</a:t>
-            </a:r>
-            <a:endParaRPr/>
-          </a:p>
-          <a:p>
-            <a:pPr indent="-317500" lvl="1" marL="914400" rtl="0" algn="l">
-              <a:spcBef>
-                <a:spcPts val="0"/>
-              </a:spcBef>
-              <a:spcAft>
-                <a:spcPts val="0"/>
-              </a:spcAft>
-              <a:buSzPts val="1400"/>
-              <a:buChar char="-"/>
-            </a:pPr>
-            <a:r>
-              <a:rPr lang="en"/>
-              <a:t>Can be automated but not on our roadmap</a:t>
-            </a:r>
-            <a:endParaRPr/>
-          </a:p>
-          <a:p>
-            <a:pPr indent="-342900" lvl="0" marL="457200" rtl="0" algn="l">
-              <a:spcBef>
-                <a:spcPts val="0"/>
-              </a:spcBef>
-              <a:spcAft>
-                <a:spcPts val="0"/>
-              </a:spcAft>
-              <a:buSzPts val="1800"/>
-              <a:buChar char="-"/>
-            </a:pPr>
-            <a:r>
-              <a:rPr lang="en"/>
-              <a:t>Tests the systems functionalities end-to-end</a:t>
-            </a:r>
-            <a:endParaRPr/>
-          </a:p>
-          <a:p>
-            <a:pPr indent="-342900" lvl="0" marL="457200" rtl="0" algn="l">
-              <a:spcBef>
-                <a:spcPts val="0"/>
-              </a:spcBef>
-              <a:spcAft>
-                <a:spcPts val="0"/>
-              </a:spcAft>
-              <a:buSzPts val="1800"/>
-              <a:buChar char="-"/>
-            </a:pPr>
-            <a:r>
-              <a:rPr lang="en"/>
-              <a:t>Format is steps / action for the tester to perform and the associated outcome for each</a:t>
-            </a:r>
-            <a:endParaRPr/>
-          </a:p>
-          <a:p>
-            <a:pPr indent="0" lvl="0" marL="0" rtl="0" algn="l">
-              <a:spcBef>
-                <a:spcPts val="1200"/>
-              </a:spcBef>
-              <a:spcAft>
-                <a:spcPts val="1200"/>
-              </a:spcAft>
-              <a:buNone/>
-            </a:pPr>
-            <a:r>
-              <a:rPr lang="en"/>
-              <a:t>System</a:t>
-            </a:r>
-            <a:r>
-              <a:rPr lang="en"/>
-              <a:t> tests for each user story can be found in the submission document</a:t>
-            </a:r>
-            <a:endParaRPr/>
-          </a:p>
-        </p:txBody>
-      </p:sp>
-    </p:spTree>
-  </p:cSld>
-  <p:clrMapOvr>
-    <a:masterClrMapping/>
-  </p:clrMapOvr>
-</p:sld>
-</file>
-
-<file path=ppt/slides/slide35.xml><?xml version="1.0" encoding="utf-8"?>
-<p:sld xmlns:a="http://schemas.openxmlformats.org/drawingml/2006/main" xmlns:r="http://schemas.openxmlformats.org/officeDocument/2006/relationships" xmlns:mc="http://schemas.openxmlformats.org/markup-compatibility/2006" xmlns:mv="urn:schemas-microsoft-com:mac:vml" xmlns:p="http://schemas.openxmlformats.org/presentationml/2006/main" xmlns:c="http://schemas.openxmlformats.org/drawingml/2006/chart" xmlns:dgm="http://schemas.openxmlformats.org/drawingml/2006/diagram" xmlns:o="urn:schemas-microsoft-com:office:office" xmlns:v="urn:schemas-microsoft-com:vml" xmlns:pvml="urn:schemas-microsoft-com:office:powerpoint" xmlns:com="http://schemas.openxmlformats.org/drawingml/2006/compatibility" xmlns:p14="http://schemas.microsoft.com/office/powerpoint/2010/main" xmlns:p15="http://schemas.microsoft.com/office/powerpoint/2012/main" xmlns:ahyp="http://schemas.microsoft.com/office/drawing/2018/hyperlinkcolor">
-  <p:cSld>
-    <p:spTree>
-      <p:nvGrpSpPr>
-        <p:cNvPr id="258" name="Shape 258"/>
-        <p:cNvGrpSpPr/>
-        <p:nvPr/>
-      </p:nvGrpSpPr>
-      <p:grpSpPr>
-        <a:xfrm>
-          <a:off x="0" y="0"/>
-          <a:ext cx="0" cy="0"/>
-          <a:chOff x="0" y="0"/>
-          <a:chExt cx="0" cy="0"/>
-        </a:xfrm>
-      </p:grpSpPr>
-      <p:sp>
-        <p:nvSpPr>
-          <p:cNvPr id="259" name="Google Shape;259;p47"/>
-          <p:cNvSpPr txBox="1"/>
-          <p:nvPr>
-            <p:ph type="title"/>
-          </p:nvPr>
-        </p:nvSpPr>
-        <p:spPr>
-          <a:xfrm>
-            <a:off x="311700" y="445025"/>
-            <a:ext cx="8520600" cy="572700"/>
-          </a:xfrm>
-          <a:prstGeom prst="rect">
-            <a:avLst/>
-          </a:prstGeom>
-        </p:spPr>
-        <p:txBody>
-          <a:bodyPr anchorCtr="0" anchor="t" bIns="91425" lIns="91425" spcFirstLastPara="1" rIns="91425" wrap="square" tIns="91425">
-            <a:normAutofit fontScale="90000"/>
-          </a:bodyPr>
-          <a:lstStyle/>
-          <a:p>
-            <a:pPr indent="0" lvl="0" marL="0" rtl="0" algn="l">
-              <a:spcBef>
-                <a:spcPts val="0"/>
-              </a:spcBef>
-              <a:spcAft>
-                <a:spcPts val="0"/>
-              </a:spcAft>
-              <a:buNone/>
-            </a:pPr>
-            <a:r>
-              <a:rPr lang="en"/>
-              <a:t>Acceptance</a:t>
-            </a:r>
-            <a:r>
-              <a:rPr lang="en"/>
-              <a:t> Tests</a:t>
-            </a:r>
-            <a:endParaRPr/>
-          </a:p>
-        </p:txBody>
-      </p:sp>
-      <p:sp>
-        <p:nvSpPr>
-          <p:cNvPr id="260" name="Google Shape;260;p47"/>
-          <p:cNvSpPr txBox="1"/>
-          <p:nvPr>
-            <p:ph idx="1" type="body"/>
-          </p:nvPr>
-        </p:nvSpPr>
-        <p:spPr>
-          <a:xfrm>
-            <a:off x="311700" y="1152475"/>
-            <a:ext cx="8520600" cy="3416400"/>
-          </a:xfrm>
-          <a:prstGeom prst="rect">
-            <a:avLst/>
-          </a:prstGeom>
-        </p:spPr>
-        <p:txBody>
-          <a:bodyPr anchorCtr="0" anchor="t" bIns="91425" lIns="91425" spcFirstLastPara="1" rIns="91425" wrap="square" tIns="91425">
-            <a:normAutofit/>
-          </a:bodyPr>
-          <a:lstStyle/>
-          <a:p>
-            <a:pPr indent="-342900" lvl="0" marL="457200" rtl="0" algn="l">
-              <a:spcBef>
-                <a:spcPts val="0"/>
-              </a:spcBef>
-              <a:spcAft>
-                <a:spcPts val="0"/>
-              </a:spcAft>
-              <a:buSzPts val="1800"/>
-              <a:buChar char="-"/>
-            </a:pPr>
-            <a:r>
-              <a:rPr lang="en"/>
-              <a:t>Run manually</a:t>
-            </a:r>
-            <a:endParaRPr/>
-          </a:p>
-          <a:p>
-            <a:pPr indent="-317500" lvl="1" marL="914400" rtl="0" algn="l">
-              <a:spcBef>
-                <a:spcPts val="0"/>
-              </a:spcBef>
-              <a:spcAft>
-                <a:spcPts val="0"/>
-              </a:spcAft>
-              <a:buSzPts val="1400"/>
-              <a:buChar char="-"/>
-            </a:pPr>
-            <a:r>
-              <a:rPr lang="en"/>
-              <a:t>Can be automated but not on our roadmap</a:t>
-            </a:r>
-            <a:endParaRPr/>
-          </a:p>
-          <a:p>
-            <a:pPr indent="-342900" lvl="0" marL="457200" rtl="0" algn="l">
-              <a:spcBef>
-                <a:spcPts val="0"/>
-              </a:spcBef>
-              <a:spcAft>
-                <a:spcPts val="0"/>
-              </a:spcAft>
-              <a:buSzPts val="1800"/>
-              <a:buChar char="-"/>
-            </a:pPr>
-            <a:r>
-              <a:rPr lang="en"/>
-              <a:t>Tests the system according to the requirements</a:t>
-            </a:r>
-            <a:endParaRPr/>
-          </a:p>
-          <a:p>
-            <a:pPr indent="-317500" lvl="1" marL="914400" rtl="0" algn="l">
-              <a:spcBef>
-                <a:spcPts val="0"/>
-              </a:spcBef>
-              <a:spcAft>
-                <a:spcPts val="0"/>
-              </a:spcAft>
-              <a:buSzPts val="1400"/>
-              <a:buChar char="-"/>
-            </a:pPr>
-            <a:r>
-              <a:rPr lang="en"/>
-              <a:t>For use this means they are derived directly from our user stories</a:t>
-            </a:r>
-            <a:endParaRPr/>
-          </a:p>
-          <a:p>
-            <a:pPr indent="-342900" lvl="0" marL="457200" rtl="0" algn="l">
-              <a:spcBef>
-                <a:spcPts val="0"/>
-              </a:spcBef>
-              <a:spcAft>
-                <a:spcPts val="0"/>
-              </a:spcAft>
-              <a:buSzPts val="1800"/>
-              <a:buChar char="-"/>
-            </a:pPr>
-            <a:r>
-              <a:rPr lang="en"/>
-              <a:t>Format is Gherkin Syntax which is a behavioral driven development (BDD) syntax that allows us to define our tests in terms of user state and behavior</a:t>
-            </a:r>
-            <a:endParaRPr/>
-          </a:p>
-          <a:p>
-            <a:pPr indent="0" lvl="0" marL="0" rtl="0" algn="l">
-              <a:spcBef>
-                <a:spcPts val="1200"/>
-              </a:spcBef>
-              <a:spcAft>
-                <a:spcPts val="1200"/>
-              </a:spcAft>
-              <a:buNone/>
-            </a:pPr>
-            <a:r>
-              <a:rPr lang="en"/>
-              <a:t>Acceptance tests for each user story can be found in the submission document</a:t>
-            </a:r>
-            <a:endParaRPr/>
-          </a:p>
-        </p:txBody>
-      </p:sp>
-    </p:spTree>
-  </p:cSld>
-  <p:clrMapOvr>
-    <a:masterClrMapping/>
-  </p:clrMapOvr>
-</p:sld>
-</file>
-
-<file path=ppt/slides/slide36.xml><?xml version="1.0" encoding="utf-8"?>
-<p:sld xmlns:a="http://schemas.openxmlformats.org/drawingml/2006/main" xmlns:r="http://schemas.openxmlformats.org/officeDocument/2006/relationships" xmlns:mc="http://schemas.openxmlformats.org/markup-compatibility/2006" xmlns:mv="urn:schemas-microsoft-com:mac:vml" xmlns:p="http://schemas.openxmlformats.org/presentationml/2006/main" xmlns:c="http://schemas.openxmlformats.org/drawingml/2006/chart" xmlns:dgm="http://schemas.openxmlformats.org/drawingml/2006/diagram" xmlns:o="urn:schemas-microsoft-com:office:office" xmlns:v="urn:schemas-microsoft-com:vml" xmlns:pvml="urn:schemas-microsoft-com:office:powerpoint" xmlns:com="http://schemas.openxmlformats.org/drawingml/2006/compatibility" xmlns:p14="http://schemas.microsoft.com/office/powerpoint/2010/main" xmlns:p15="http://schemas.microsoft.com/office/powerpoint/2012/main" xmlns:ahyp="http://schemas.microsoft.com/office/drawing/2018/hyperlinkcolor">
-  <p:cSld>
-    <p:spTree>
-      <p:nvGrpSpPr>
-        <p:cNvPr id="264" name="Shape 264"/>
-        <p:cNvGrpSpPr/>
-        <p:nvPr/>
-      </p:nvGrpSpPr>
-      <p:grpSpPr>
-        <a:xfrm>
-          <a:off x="0" y="0"/>
-          <a:ext cx="0" cy="0"/>
-          <a:chOff x="0" y="0"/>
-          <a:chExt cx="0" cy="0"/>
-        </a:xfrm>
-      </p:grpSpPr>
-      <p:sp>
-        <p:nvSpPr>
-          <p:cNvPr id="265" name="Google Shape;265;p48"/>
+          <p:cNvPr id="230" name="Google Shape;230;p42"/>
           <p:cNvSpPr txBox="1"/>
           <p:nvPr>
             <p:ph type="title"/>
@@ -13674,327 +11975,12 @@
             </a:pPr>
             <a:r>
               <a:rPr lang="en"/>
-              <a:t>Live demo</a:t>
+              <a:t>Questions?</a:t>
             </a:r>
             <a:endParaRPr/>
           </a:p>
         </p:txBody>
       </p:sp>
-    </p:spTree>
-  </p:cSld>
-  <p:clrMapOvr>
-    <a:masterClrMapping/>
-  </p:clrMapOvr>
-</p:sld>
-</file>
-
-<file path=ppt/slides/slide37.xml><?xml version="1.0" encoding="utf-8"?>
-<p:sld xmlns:a="http://schemas.openxmlformats.org/drawingml/2006/main" xmlns:r="http://schemas.openxmlformats.org/officeDocument/2006/relationships" xmlns:mc="http://schemas.openxmlformats.org/markup-compatibility/2006" xmlns:mv="urn:schemas-microsoft-com:mac:vml" xmlns:p="http://schemas.openxmlformats.org/presentationml/2006/main" xmlns:c="http://schemas.openxmlformats.org/drawingml/2006/chart" xmlns:dgm="http://schemas.openxmlformats.org/drawingml/2006/diagram" xmlns:o="urn:schemas-microsoft-com:office:office" xmlns:v="urn:schemas-microsoft-com:vml" xmlns:pvml="urn:schemas-microsoft-com:office:powerpoint" xmlns:com="http://schemas.openxmlformats.org/drawingml/2006/compatibility" xmlns:p14="http://schemas.microsoft.com/office/powerpoint/2010/main" xmlns:p15="http://schemas.microsoft.com/office/powerpoint/2012/main" xmlns:ahyp="http://schemas.microsoft.com/office/drawing/2018/hyperlinkcolor">
-  <p:cSld>
-    <p:spTree>
-      <p:nvGrpSpPr>
-        <p:cNvPr id="269" name="Shape 269"/>
-        <p:cNvGrpSpPr/>
-        <p:nvPr/>
-      </p:nvGrpSpPr>
-      <p:grpSpPr>
-        <a:xfrm>
-          <a:off x="0" y="0"/>
-          <a:ext cx="0" cy="0"/>
-          <a:chOff x="0" y="0"/>
-          <a:chExt cx="0" cy="0"/>
-        </a:xfrm>
-      </p:grpSpPr>
-      <p:sp>
-        <p:nvSpPr>
-          <p:cNvPr id="270" name="Google Shape;270;p49"/>
-          <p:cNvSpPr txBox="1"/>
-          <p:nvPr>
-            <p:ph type="title"/>
-          </p:nvPr>
-        </p:nvSpPr>
-        <p:spPr>
-          <a:xfrm>
-            <a:off x="311700" y="2150850"/>
-            <a:ext cx="8520600" cy="841800"/>
-          </a:xfrm>
-          <a:prstGeom prst="rect">
-            <a:avLst/>
-          </a:prstGeom>
-        </p:spPr>
-        <p:txBody>
-          <a:bodyPr anchorCtr="0" anchor="ctr" bIns="91425" lIns="91425" spcFirstLastPara="1" rIns="91425" wrap="square" tIns="91425">
-            <a:normAutofit/>
-          </a:bodyPr>
-          <a:lstStyle/>
-          <a:p>
-            <a:pPr indent="0" lvl="0" marL="0" rtl="0" algn="ctr">
-              <a:spcBef>
-                <a:spcPts val="0"/>
-              </a:spcBef>
-              <a:spcAft>
-                <a:spcPts val="0"/>
-              </a:spcAft>
-              <a:buNone/>
-            </a:pPr>
-            <a:r>
-              <a:rPr lang="en"/>
-              <a:t>Sprint 5 planning</a:t>
-            </a:r>
-            <a:endParaRPr/>
-          </a:p>
-        </p:txBody>
-      </p:sp>
-    </p:spTree>
-  </p:cSld>
-  <p:clrMapOvr>
-    <a:masterClrMapping/>
-  </p:clrMapOvr>
-</p:sld>
-</file>
-
-<file path=ppt/slides/slide38.xml><?xml version="1.0" encoding="utf-8"?>
-<p:sld xmlns:a="http://schemas.openxmlformats.org/drawingml/2006/main" xmlns:r="http://schemas.openxmlformats.org/officeDocument/2006/relationships" xmlns:mc="http://schemas.openxmlformats.org/markup-compatibility/2006" xmlns:mv="urn:schemas-microsoft-com:mac:vml" xmlns:p="http://schemas.openxmlformats.org/presentationml/2006/main" xmlns:c="http://schemas.openxmlformats.org/drawingml/2006/chart" xmlns:dgm="http://schemas.openxmlformats.org/drawingml/2006/diagram" xmlns:o="urn:schemas-microsoft-com:office:office" xmlns:v="urn:schemas-microsoft-com:vml" xmlns:pvml="urn:schemas-microsoft-com:office:powerpoint" xmlns:com="http://schemas.openxmlformats.org/drawingml/2006/compatibility" xmlns:p14="http://schemas.microsoft.com/office/powerpoint/2010/main" xmlns:p15="http://schemas.microsoft.com/office/powerpoint/2012/main" xmlns:ahyp="http://schemas.microsoft.com/office/drawing/2018/hyperlinkcolor">
-  <p:cSld>
-    <p:spTree>
-      <p:nvGrpSpPr>
-        <p:cNvPr id="274" name="Shape 274"/>
-        <p:cNvGrpSpPr/>
-        <p:nvPr/>
-      </p:nvGrpSpPr>
-      <p:grpSpPr>
-        <a:xfrm>
-          <a:off x="0" y="0"/>
-          <a:ext cx="0" cy="0"/>
-          <a:chOff x="0" y="0"/>
-          <a:chExt cx="0" cy="0"/>
-        </a:xfrm>
-      </p:grpSpPr>
-      <p:sp>
-        <p:nvSpPr>
-          <p:cNvPr id="275" name="Google Shape;275;p50"/>
-          <p:cNvSpPr txBox="1"/>
-          <p:nvPr>
-            <p:ph type="title"/>
-          </p:nvPr>
-        </p:nvSpPr>
-        <p:spPr>
-          <a:xfrm>
-            <a:off x="311700" y="445025"/>
-            <a:ext cx="8520600" cy="572700"/>
-          </a:xfrm>
-          <a:prstGeom prst="rect">
-            <a:avLst/>
-          </a:prstGeom>
-        </p:spPr>
-        <p:txBody>
-          <a:bodyPr anchorCtr="0" anchor="t" bIns="91425" lIns="91425" spcFirstLastPara="1" rIns="91425" wrap="square" tIns="91425">
-            <a:normAutofit fontScale="90000"/>
-          </a:bodyPr>
-          <a:lstStyle/>
-          <a:p>
-            <a:pPr indent="0" lvl="0" marL="0" rtl="0" algn="l">
-              <a:spcBef>
-                <a:spcPts val="0"/>
-              </a:spcBef>
-              <a:spcAft>
-                <a:spcPts val="0"/>
-              </a:spcAft>
-              <a:buNone/>
-            </a:pPr>
-            <a:r>
-              <a:rPr lang="en"/>
-              <a:t>What’s next in Sprint 5?</a:t>
-            </a:r>
-            <a:endParaRPr/>
-          </a:p>
-        </p:txBody>
-      </p:sp>
-      <p:sp>
-        <p:nvSpPr>
-          <p:cNvPr id="276" name="Google Shape;276;p50"/>
-          <p:cNvSpPr txBox="1"/>
-          <p:nvPr>
-            <p:ph idx="1" type="body"/>
-          </p:nvPr>
-        </p:nvSpPr>
-        <p:spPr>
-          <a:xfrm>
-            <a:off x="311700" y="1152475"/>
-            <a:ext cx="8520600" cy="3416400"/>
-          </a:xfrm>
-          <a:prstGeom prst="rect">
-            <a:avLst/>
-          </a:prstGeom>
-        </p:spPr>
-        <p:txBody>
-          <a:bodyPr anchorCtr="0" anchor="t" bIns="91425" lIns="91425" spcFirstLastPara="1" rIns="91425" wrap="square" tIns="91425">
-            <a:normAutofit/>
-          </a:bodyPr>
-          <a:lstStyle/>
-          <a:p>
-            <a:pPr indent="-342900" lvl="0" marL="457200" rtl="0" algn="l">
-              <a:spcBef>
-                <a:spcPts val="0"/>
-              </a:spcBef>
-              <a:spcAft>
-                <a:spcPts val="0"/>
-              </a:spcAft>
-              <a:buSzPts val="1800"/>
-              <a:buChar char="-"/>
-            </a:pPr>
-            <a:r>
-              <a:rPr lang="en"/>
-              <a:t>We have finished all the user stories we committed to for the project and have </a:t>
-            </a:r>
-            <a:r>
-              <a:rPr lang="en"/>
-              <a:t>nothing</a:t>
-            </a:r>
-            <a:r>
-              <a:rPr lang="en"/>
-              <a:t> left unfinished in our backlog</a:t>
-            </a:r>
-            <a:endParaRPr/>
-          </a:p>
-          <a:p>
-            <a:pPr indent="-342900" lvl="0" marL="457200" rtl="0" algn="l">
-              <a:spcBef>
-                <a:spcPts val="0"/>
-              </a:spcBef>
-              <a:spcAft>
-                <a:spcPts val="0"/>
-              </a:spcAft>
-              <a:buSzPts val="1800"/>
-              <a:buChar char="-"/>
-            </a:pPr>
-            <a:r>
-              <a:rPr lang="en"/>
-              <a:t>Our focus will be on</a:t>
-            </a:r>
-            <a:endParaRPr/>
-          </a:p>
-          <a:p>
-            <a:pPr indent="-317500" lvl="1" marL="914400" rtl="0" algn="l">
-              <a:spcBef>
-                <a:spcPts val="0"/>
-              </a:spcBef>
-              <a:spcAft>
-                <a:spcPts val="0"/>
-              </a:spcAft>
-              <a:buSzPts val="1400"/>
-              <a:buChar char="-"/>
-            </a:pPr>
-            <a:r>
-              <a:rPr lang="en"/>
-              <a:t>Fixing any bugs we find</a:t>
-            </a:r>
-            <a:endParaRPr/>
-          </a:p>
-          <a:p>
-            <a:pPr indent="-317500" lvl="1" marL="914400" rtl="0" algn="l">
-              <a:spcBef>
-                <a:spcPts val="0"/>
-              </a:spcBef>
-              <a:spcAft>
-                <a:spcPts val="0"/>
-              </a:spcAft>
-              <a:buSzPts val="1400"/>
-              <a:buChar char="-"/>
-            </a:pPr>
-            <a:r>
-              <a:rPr lang="en"/>
-              <a:t>Refining any issues in the flows</a:t>
-            </a:r>
-            <a:endParaRPr/>
-          </a:p>
-          <a:p>
-            <a:pPr indent="0" lvl="0" marL="0" rtl="0" algn="l">
-              <a:spcBef>
-                <a:spcPts val="1200"/>
-              </a:spcBef>
-              <a:spcAft>
-                <a:spcPts val="0"/>
-              </a:spcAft>
-              <a:buNone/>
-            </a:pPr>
-            <a:r>
-              <a:t/>
-            </a:r>
-            <a:endParaRPr/>
-          </a:p>
-          <a:p>
-            <a:pPr indent="-342900" lvl="0" marL="457200" rtl="0" algn="l">
-              <a:spcBef>
-                <a:spcPts val="1200"/>
-              </a:spcBef>
-              <a:spcAft>
-                <a:spcPts val="0"/>
-              </a:spcAft>
-              <a:buSzPts val="1800"/>
-              <a:buChar char="-"/>
-            </a:pPr>
-            <a:r>
-              <a:rPr lang="en"/>
-              <a:t>Sprint 5 contains 0 story points</a:t>
-            </a:r>
-            <a:endParaRPr/>
-          </a:p>
-        </p:txBody>
-      </p:sp>
-    </p:spTree>
-  </p:cSld>
-  <p:clrMapOvr>
-    <a:masterClrMapping/>
-  </p:clrMapOvr>
-</p:sld>
-</file>
-
-<file path=ppt/slides/slide39.xml><?xml version="1.0" encoding="utf-8"?>
-<p:sld xmlns:a="http://schemas.openxmlformats.org/drawingml/2006/main" xmlns:r="http://schemas.openxmlformats.org/officeDocument/2006/relationships" xmlns:mc="http://schemas.openxmlformats.org/markup-compatibility/2006" xmlns:mv="urn:schemas-microsoft-com:mac:vml" xmlns:p="http://schemas.openxmlformats.org/presentationml/2006/main" xmlns:c="http://schemas.openxmlformats.org/drawingml/2006/chart" xmlns:dgm="http://schemas.openxmlformats.org/drawingml/2006/diagram" xmlns:o="urn:schemas-microsoft-com:office:office" xmlns:v="urn:schemas-microsoft-com:vml" xmlns:pvml="urn:schemas-microsoft-com:office:powerpoint" xmlns:com="http://schemas.openxmlformats.org/drawingml/2006/compatibility" xmlns:p14="http://schemas.microsoft.com/office/powerpoint/2010/main" xmlns:p15="http://schemas.microsoft.com/office/powerpoint/2012/main" xmlns:ahyp="http://schemas.microsoft.com/office/drawing/2018/hyperlinkcolor">
-  <p:cSld>
-    <p:spTree>
-      <p:nvGrpSpPr>
-        <p:cNvPr id="280" name="Shape 280"/>
-        <p:cNvGrpSpPr/>
-        <p:nvPr/>
-      </p:nvGrpSpPr>
-      <p:grpSpPr>
-        <a:xfrm>
-          <a:off x="0" y="0"/>
-          <a:ext cx="0" cy="0"/>
-          <a:chOff x="0" y="0"/>
-          <a:chExt cx="0" cy="0"/>
-        </a:xfrm>
-      </p:grpSpPr>
-      <p:pic>
-        <p:nvPicPr>
-          <p:cNvPr id="281" name="Google Shape;281;p51"/>
-          <p:cNvPicPr preferRelativeResize="0"/>
-          <p:nvPr/>
-        </p:nvPicPr>
-        <p:blipFill>
-          <a:blip r:embed="rId3">
-            <a:alphaModFix/>
-          </a:blip>
-          <a:stretch>
-            <a:fillRect/>
-          </a:stretch>
-        </p:blipFill>
-        <p:spPr>
-          <a:xfrm>
-            <a:off x="152400" y="1081275"/>
-            <a:ext cx="8839201" cy="836063"/>
-          </a:xfrm>
-          <a:prstGeom prst="rect">
-            <a:avLst/>
-          </a:prstGeom>
-          <a:noFill/>
-          <a:ln>
-            <a:noFill/>
-          </a:ln>
-        </p:spPr>
-      </p:pic>
     </p:spTree>
   </p:cSld>
   <p:clrMapOvr>
@@ -14055,71 +12041,6 @@
             <a:r>
               <a:rPr lang="en"/>
               <a:t>Project Outline</a:t>
-            </a:r>
-            <a:endParaRPr/>
-          </a:p>
-        </p:txBody>
-      </p:sp>
-    </p:spTree>
-  </p:cSld>
-  <p:clrMapOvr>
-    <a:masterClrMapping/>
-  </p:clrMapOvr>
-</p:sld>
-</file>
-
-<file path=ppt/slides/slide40.xml><?xml version="1.0" encoding="utf-8"?>
-<p:sld xmlns:a="http://schemas.openxmlformats.org/drawingml/2006/main" xmlns:r="http://schemas.openxmlformats.org/officeDocument/2006/relationships" xmlns:mc="http://schemas.openxmlformats.org/markup-compatibility/2006" xmlns:mv="urn:schemas-microsoft-com:mac:vml" xmlns:p="http://schemas.openxmlformats.org/presentationml/2006/main" xmlns:c="http://schemas.openxmlformats.org/drawingml/2006/chart" xmlns:dgm="http://schemas.openxmlformats.org/drawingml/2006/diagram" xmlns:o="urn:schemas-microsoft-com:office:office" xmlns:v="urn:schemas-microsoft-com:vml" xmlns:pvml="urn:schemas-microsoft-com:office:powerpoint" xmlns:com="http://schemas.openxmlformats.org/drawingml/2006/compatibility" xmlns:p14="http://schemas.microsoft.com/office/powerpoint/2010/main" xmlns:p15="http://schemas.microsoft.com/office/powerpoint/2012/main" xmlns:ahyp="http://schemas.microsoft.com/office/drawing/2018/hyperlinkcolor">
-  <p:cSld>
-    <p:spTree>
-      <p:nvGrpSpPr>
-        <p:cNvPr id="285" name="Shape 285"/>
-        <p:cNvGrpSpPr/>
-        <p:nvPr/>
-      </p:nvGrpSpPr>
-      <p:grpSpPr>
-        <a:xfrm>
-          <a:off x="0" y="0"/>
-          <a:ext cx="0" cy="0"/>
-          <a:chOff x="0" y="0"/>
-          <a:chExt cx="0" cy="0"/>
-        </a:xfrm>
-      </p:grpSpPr>
-      <p:sp>
-        <p:nvSpPr>
-          <p:cNvPr id="286" name="Google Shape;286;p52"/>
-          <p:cNvSpPr txBox="1"/>
-          <p:nvPr>
-            <p:ph type="title"/>
-          </p:nvPr>
-        </p:nvSpPr>
-        <p:spPr>
-          <a:xfrm>
-            <a:off x="311700" y="2150850"/>
-            <a:ext cx="8520600" cy="841800"/>
-          </a:xfrm>
-          <a:prstGeom prst="rect">
-            <a:avLst/>
-          </a:prstGeom>
-        </p:spPr>
-        <p:txBody>
-          <a:bodyPr anchorCtr="0" anchor="ctr" bIns="91425" lIns="91425" spcFirstLastPara="1" rIns="91425" wrap="square" tIns="91425">
-            <a:normAutofit/>
-          </a:bodyPr>
-          <a:lstStyle/>
-          <a:p>
-            <a:pPr indent="0" lvl="0" marL="0" rtl="0" algn="ctr">
-              <a:spcBef>
-                <a:spcPts val="0"/>
-              </a:spcBef>
-              <a:spcAft>
-                <a:spcPts val="0"/>
-              </a:spcAft>
-              <a:buNone/>
-            </a:pPr>
-            <a:r>
-              <a:rPr lang="en"/>
-              <a:t>Questions?</a:t>
             </a:r>
             <a:endParaRPr/>
           </a:p>
@@ -14699,8 +12620,8 @@
         </p:blipFill>
         <p:spPr>
           <a:xfrm>
-            <a:off x="831938" y="1152478"/>
-            <a:ext cx="7480117" cy="3416400"/>
+            <a:off x="599150" y="1152475"/>
+            <a:ext cx="7945699" cy="3603575"/>
           </a:xfrm>
           <a:prstGeom prst="rect">
             <a:avLst/>
@@ -14845,7 +12766,7 @@
             </a:pPr>
             <a:r>
               <a:rPr lang="en"/>
-              <a:t>No new bugs found in Sprint 4</a:t>
+              <a:t>No new bugs found in Sprint 5</a:t>
             </a:r>
             <a:endParaRPr/>
           </a:p>

</xml_diff>